<commit_message>
Update from home machine.
</commit_message>
<xml_diff>
--- a/Modeling Workflows with Event Driven DFA.pptx
+++ b/Modeling Workflows with Event Driven DFA.pptx
@@ -5,7 +5,7 @@
     <p:sldMasterId id="2147483648" r:id="rId1"/>
   </p:sldMasterIdLst>
   <p:notesMasterIdLst>
-    <p:notesMasterId r:id="rId7"/>
+    <p:notesMasterId r:id="rId9"/>
   </p:notesMasterIdLst>
   <p:sldIdLst>
     <p:sldId id="256" r:id="rId2"/>
@@ -13,6 +13,8 @@
     <p:sldId id="258" r:id="rId4"/>
     <p:sldId id="259" r:id="rId5"/>
     <p:sldId id="260" r:id="rId6"/>
+    <p:sldId id="261" r:id="rId7"/>
+    <p:sldId id="262" r:id="rId8"/>
   </p:sldIdLst>
   <p:sldSz cx="9144000" cy="6858000" type="screen4x3"/>
   <p:notesSz cx="6858000" cy="9144000"/>
@@ -212,7 +214,7 @@
           <a:p>
             <a:fld id="{D0F15B3C-1181-4445-BB6A-6BED1DF2958C}" type="datetimeFigureOut">
               <a:rPr lang="en-US" smtClean="0"/>
-              <a:t>3/15/2015</a:t>
+              <a:t>3/18/2015</a:t>
             </a:fld>
             <a:endParaRPr lang="en-US"/>
           </a:p>
@@ -829,7 +831,7 @@
           <a:p>
             <a:fld id="{2927DE08-9B48-44D6-83D4-230A82F93FAE}" type="datetime1">
               <a:rPr lang="en-US" smtClean="0"/>
-              <a:t>3/15/2015</a:t>
+              <a:t>3/18/2015</a:t>
             </a:fld>
             <a:endParaRPr lang="en-US"/>
           </a:p>
@@ -995,7 +997,7 @@
           <a:p>
             <a:fld id="{5D95C52C-C3C1-4927-8E70-C103DE1C3321}" type="datetime1">
               <a:rPr lang="en-US" smtClean="0"/>
-              <a:t>3/15/2015</a:t>
+              <a:t>3/18/2015</a:t>
             </a:fld>
             <a:endParaRPr lang="en-US"/>
           </a:p>
@@ -1171,7 +1173,7 @@
           <a:p>
             <a:fld id="{90E3D6A5-38A1-4FEC-A43A-47F48DEDEFD3}" type="datetime1">
               <a:rPr lang="en-US" smtClean="0"/>
-              <a:t>3/15/2015</a:t>
+              <a:t>3/18/2015</a:t>
             </a:fld>
             <a:endParaRPr lang="en-US"/>
           </a:p>
@@ -1337,7 +1339,7 @@
           <a:p>
             <a:fld id="{D8E26438-717D-40FF-AE1C-BA0484F53167}" type="datetime1">
               <a:rPr lang="en-US" smtClean="0"/>
-              <a:t>3/15/2015</a:t>
+              <a:t>3/18/2015</a:t>
             </a:fld>
             <a:endParaRPr lang="en-US"/>
           </a:p>
@@ -1579,7 +1581,7 @@
           <a:p>
             <a:fld id="{204240F7-7708-4F95-8DF5-779CE1EBFAFE}" type="datetime1">
               <a:rPr lang="en-US" smtClean="0"/>
-              <a:t>3/15/2015</a:t>
+              <a:t>3/18/2015</a:t>
             </a:fld>
             <a:endParaRPr lang="en-US"/>
           </a:p>
@@ -1863,7 +1865,7 @@
           <a:p>
             <a:fld id="{9AB1B8F5-007F-4624-9D09-74A4BB144A1B}" type="datetime1">
               <a:rPr lang="en-US" smtClean="0"/>
-              <a:t>3/15/2015</a:t>
+              <a:t>3/18/2015</a:t>
             </a:fld>
             <a:endParaRPr lang="en-US"/>
           </a:p>
@@ -2281,7 +2283,7 @@
           <a:p>
             <a:fld id="{33652302-F773-471B-A447-C9E7D11FB526}" type="datetime1">
               <a:rPr lang="en-US" smtClean="0"/>
-              <a:t>3/15/2015</a:t>
+              <a:t>3/18/2015</a:t>
             </a:fld>
             <a:endParaRPr lang="en-US"/>
           </a:p>
@@ -2395,7 +2397,7 @@
           <a:p>
             <a:fld id="{505FC5C8-7D30-45A5-B6D7-01D5FFF04AAA}" type="datetime1">
               <a:rPr lang="en-US" smtClean="0"/>
-              <a:t>3/15/2015</a:t>
+              <a:t>3/18/2015</a:t>
             </a:fld>
             <a:endParaRPr lang="en-US"/>
           </a:p>
@@ -2486,7 +2488,7 @@
           <a:p>
             <a:fld id="{2203C164-A71A-4152-83A1-27E2B515D187}" type="datetime1">
               <a:rPr lang="en-US" smtClean="0"/>
-              <a:t>3/15/2015</a:t>
+              <a:t>3/18/2015</a:t>
             </a:fld>
             <a:endParaRPr lang="en-US"/>
           </a:p>
@@ -2759,7 +2761,7 @@
           <a:p>
             <a:fld id="{0B77CF3C-9740-4894-A406-34BF11EA8119}" type="datetime1">
               <a:rPr lang="en-US" smtClean="0"/>
-              <a:t>3/15/2015</a:t>
+              <a:t>3/18/2015</a:t>
             </a:fld>
             <a:endParaRPr lang="en-US"/>
           </a:p>
@@ -3008,7 +3010,7 @@
           <a:p>
             <a:fld id="{65AEF08F-C222-4314-9819-054B5D3660D4}" type="datetime1">
               <a:rPr lang="en-US" smtClean="0"/>
-              <a:t>3/15/2015</a:t>
+              <a:t>3/18/2015</a:t>
             </a:fld>
             <a:endParaRPr lang="en-US"/>
           </a:p>
@@ -3217,7 +3219,7 @@
           <a:p>
             <a:fld id="{97CA4D54-662E-4D1F-9D66-59ED33158556}" type="datetime1">
               <a:rPr lang="en-US" smtClean="0"/>
-              <a:t>3/15/2015</a:t>
+              <a:t>3/18/2015</a:t>
             </a:fld>
             <a:endParaRPr lang="en-US"/>
           </a:p>
@@ -3770,7 +3772,11 @@
             </a:r>
             <a:r>
               <a:rPr lang="en-US" dirty="0"/>
-              <a:t>. Software Engineer for Hewlett Packard for the Army at Ft. Knox </a:t>
+              <a:t>. Software Engineer for Hewlett Packard for the Army at Ft. </a:t>
+            </a:r>
+            <a:r>
+              <a:rPr lang="en-US" dirty="0" smtClean="0"/>
+              <a:t>Knox</a:t>
             </a:r>
             <a:endParaRPr lang="en-US" dirty="0" smtClean="0"/>
           </a:p>
@@ -3902,7 +3908,17 @@
           <a:p>
             <a:r>
               <a:rPr lang="en-US" dirty="0" smtClean="0"/>
-              <a:t>Customer wanted long running complex workflow implemented</a:t>
+              <a:t>Customer wanted long running complex workflow </a:t>
+            </a:r>
+            <a:r>
+              <a:rPr lang="en-US" dirty="0" smtClean="0"/>
+              <a:t>implemented</a:t>
+            </a:r>
+          </a:p>
+          <a:p>
+            <a:r>
+              <a:rPr lang="en-US" dirty="0" smtClean="0"/>
+              <a:t>[Workflow Image Here]</a:t>
             </a:r>
             <a:endParaRPr lang="en-US" dirty="0"/>
           </a:p>
@@ -4081,13 +4097,13 @@
         <p:spPr/>
         <p:txBody>
           <a:bodyPr>
-            <a:normAutofit fontScale="90000"/>
+            <a:normAutofit/>
           </a:bodyPr>
           <a:lstStyle/>
           <a:p>
             <a:r>
               <a:rPr lang="en-US" dirty="0" smtClean="0"/>
-              <a:t>Deterministic Finite Automata (DFA)</a:t>
+              <a:t>Finite State Machine</a:t>
             </a:r>
             <a:endParaRPr lang="en-US" dirty="0"/>
           </a:p>
@@ -4108,7 +4124,16 @@
           <a:bodyPr/>
           <a:lstStyle/>
           <a:p>
-            <a:endParaRPr lang="en-US" dirty="0"/>
+            <a:r>
+              <a:rPr lang="en-US" dirty="0" smtClean="0"/>
+              <a:t>A finite state machine is a mathematical abstraction that accepts or rejects a string based on states and transitions.</a:t>
+            </a:r>
+          </a:p>
+          <a:p>
+            <a:r>
+              <a:rPr lang="en-US" dirty="0" smtClean="0"/>
+              <a:t>[Insert FSM diagram that accepts a*b.]</a:t>
+            </a:r>
           </a:p>
         </p:txBody>
       </p:sp>
@@ -4140,6 +4165,218 @@
     <p:extLst>
       <p:ext uri="{BB962C8B-B14F-4D97-AF65-F5344CB8AC3E}">
         <p14:creationId xmlns:p14="http://schemas.microsoft.com/office/powerpoint/2010/main" val="1078491454"/>
+      </p:ext>
+    </p:extLst>
+  </p:cSld>
+  <p:clrMapOvr>
+    <a:masterClrMapping/>
+  </p:clrMapOvr>
+</p:sld>
+</file>
+
+<file path=ppt/slides/slide6.xml><?xml version="1.0" encoding="utf-8"?>
+<p:sld xmlns:a="http://schemas.openxmlformats.org/drawingml/2006/main" xmlns:r="http://schemas.openxmlformats.org/officeDocument/2006/relationships" xmlns:p="http://schemas.openxmlformats.org/presentationml/2006/main">
+  <p:cSld>
+    <p:spTree>
+      <p:nvGrpSpPr>
+        <p:cNvPr id="1" name=""/>
+        <p:cNvGrpSpPr/>
+        <p:nvPr/>
+      </p:nvGrpSpPr>
+      <p:grpSpPr>
+        <a:xfrm>
+          <a:off x="0" y="0"/>
+          <a:ext cx="0" cy="0"/>
+          <a:chOff x="0" y="0"/>
+          <a:chExt cx="0" cy="0"/>
+        </a:xfrm>
+      </p:grpSpPr>
+      <p:sp>
+        <p:nvSpPr>
+          <p:cNvPr id="2" name="Title 1"/>
+          <p:cNvSpPr>
+            <a:spLocks noGrp="1"/>
+          </p:cNvSpPr>
+          <p:nvPr>
+            <p:ph type="title"/>
+          </p:nvPr>
+        </p:nvSpPr>
+        <p:spPr/>
+        <p:txBody>
+          <a:bodyPr>
+            <a:normAutofit fontScale="90000"/>
+          </a:bodyPr>
+          <a:lstStyle/>
+          <a:p>
+            <a:r>
+              <a:rPr lang="en-US" dirty="0" smtClean="0"/>
+              <a:t>Event Driven Deterministic Finite Automata</a:t>
+            </a:r>
+            <a:endParaRPr lang="en-US" dirty="0"/>
+          </a:p>
+        </p:txBody>
+      </p:sp>
+      <p:sp>
+        <p:nvSpPr>
+          <p:cNvPr id="3" name="Content Placeholder 2"/>
+          <p:cNvSpPr>
+            <a:spLocks noGrp="1"/>
+          </p:cNvSpPr>
+          <p:nvPr>
+            <p:ph idx="1"/>
+          </p:nvPr>
+        </p:nvSpPr>
+        <p:spPr/>
+        <p:txBody>
+          <a:bodyPr/>
+          <a:lstStyle/>
+          <a:p>
+            <a:r>
+              <a:rPr lang="en-US" dirty="0" smtClean="0"/>
+              <a:t>A finite state machine that uses events instead of an alphabet.</a:t>
+            </a:r>
+          </a:p>
+          <a:p>
+            <a:r>
+              <a:rPr lang="en-US" dirty="0" smtClean="0"/>
+              <a:t>States can convey meanings besides ‘Accept’ and ‘Reject’</a:t>
+            </a:r>
+          </a:p>
+          <a:p>
+            <a:r>
+              <a:rPr lang="en-US" dirty="0" smtClean="0"/>
+              <a:t>Commonly used in embedded systems to track or implement complex hardware state.</a:t>
+            </a:r>
+            <a:endParaRPr lang="en-US" dirty="0"/>
+          </a:p>
+        </p:txBody>
+      </p:sp>
+      <p:sp>
+        <p:nvSpPr>
+          <p:cNvPr id="4" name="Slide Number Placeholder 3"/>
+          <p:cNvSpPr>
+            <a:spLocks noGrp="1"/>
+          </p:cNvSpPr>
+          <p:nvPr>
+            <p:ph type="sldNum" sz="quarter" idx="12"/>
+          </p:nvPr>
+        </p:nvSpPr>
+        <p:spPr/>
+        <p:txBody>
+          <a:bodyPr/>
+          <a:lstStyle/>
+          <a:p>
+            <a:fld id="{B6F15528-21DE-4FAA-801E-634DDDAF4B2B}" type="slidenum">
+              <a:rPr lang="en-US" smtClean="0"/>
+              <a:pPr/>
+              <a:t>6</a:t>
+            </a:fld>
+            <a:endParaRPr lang="en-US"/>
+          </a:p>
+        </p:txBody>
+      </p:sp>
+    </p:spTree>
+    <p:extLst>
+      <p:ext uri="{BB962C8B-B14F-4D97-AF65-F5344CB8AC3E}">
+        <p14:creationId xmlns:p14="http://schemas.microsoft.com/office/powerpoint/2010/main" val="2979760053"/>
+      </p:ext>
+    </p:extLst>
+  </p:cSld>
+  <p:clrMapOvr>
+    <a:masterClrMapping/>
+  </p:clrMapOvr>
+</p:sld>
+</file>
+
+<file path=ppt/slides/slide7.xml><?xml version="1.0" encoding="utf-8"?>
+<p:sld xmlns:a="http://schemas.openxmlformats.org/drawingml/2006/main" xmlns:r="http://schemas.openxmlformats.org/officeDocument/2006/relationships" xmlns:p="http://schemas.openxmlformats.org/presentationml/2006/main">
+  <p:cSld>
+    <p:spTree>
+      <p:nvGrpSpPr>
+        <p:cNvPr id="1" name=""/>
+        <p:cNvGrpSpPr/>
+        <p:nvPr/>
+      </p:nvGrpSpPr>
+      <p:grpSpPr>
+        <a:xfrm>
+          <a:off x="0" y="0"/>
+          <a:ext cx="0" cy="0"/>
+          <a:chOff x="0" y="0"/>
+          <a:chExt cx="0" cy="0"/>
+        </a:xfrm>
+      </p:grpSpPr>
+      <p:sp>
+        <p:nvSpPr>
+          <p:cNvPr id="2" name="Title 1"/>
+          <p:cNvSpPr>
+            <a:spLocks noGrp="1"/>
+          </p:cNvSpPr>
+          <p:nvPr>
+            <p:ph type="title"/>
+          </p:nvPr>
+        </p:nvSpPr>
+        <p:spPr/>
+        <p:txBody>
+          <a:bodyPr>
+            <a:normAutofit fontScale="90000"/>
+          </a:bodyPr>
+          <a:lstStyle/>
+          <a:p>
+            <a:r>
+              <a:rPr lang="en-US" dirty="0" smtClean="0"/>
+              <a:t>Database Representation of an Event Driven DFA</a:t>
+            </a:r>
+            <a:endParaRPr lang="en-US" dirty="0"/>
+          </a:p>
+        </p:txBody>
+      </p:sp>
+      <p:sp>
+        <p:nvSpPr>
+          <p:cNvPr id="3" name="Content Placeholder 2"/>
+          <p:cNvSpPr>
+            <a:spLocks noGrp="1"/>
+          </p:cNvSpPr>
+          <p:nvPr>
+            <p:ph idx="1"/>
+          </p:nvPr>
+        </p:nvSpPr>
+        <p:spPr/>
+        <p:txBody>
+          <a:bodyPr/>
+          <a:lstStyle/>
+          <a:p>
+            <a:endParaRPr lang="en-US" dirty="0"/>
+          </a:p>
+        </p:txBody>
+      </p:sp>
+      <p:sp>
+        <p:nvSpPr>
+          <p:cNvPr id="4" name="Slide Number Placeholder 3"/>
+          <p:cNvSpPr>
+            <a:spLocks noGrp="1"/>
+          </p:cNvSpPr>
+          <p:nvPr>
+            <p:ph type="sldNum" sz="quarter" idx="12"/>
+          </p:nvPr>
+        </p:nvSpPr>
+        <p:spPr/>
+        <p:txBody>
+          <a:bodyPr/>
+          <a:lstStyle/>
+          <a:p>
+            <a:fld id="{B6F15528-21DE-4FAA-801E-634DDDAF4B2B}" type="slidenum">
+              <a:rPr lang="en-US" smtClean="0"/>
+              <a:pPr/>
+              <a:t>7</a:t>
+            </a:fld>
+            <a:endParaRPr lang="en-US"/>
+          </a:p>
+        </p:txBody>
+      </p:sp>
+    </p:spTree>
+    <p:extLst>
+      <p:ext uri="{BB962C8B-B14F-4D97-AF65-F5344CB8AC3E}">
+        <p14:creationId xmlns:p14="http://schemas.microsoft.com/office/powerpoint/2010/main" val="1119797094"/>
       </p:ext>
     </p:extLst>
   </p:cSld>

</xml_diff>

<commit_message>
Added descriptions for LKUP_EVENT, LKUP_STATE, and LKUP_STATE_EVENT_TRANS.
</commit_message>
<xml_diff>
--- a/Modeling Workflows with Event Driven DFA.pptx
+++ b/Modeling Workflows with Event Driven DFA.pptx
@@ -5,7 +5,7 @@
     <p:sldMasterId id="2147483648" r:id="rId1"/>
   </p:sldMasterIdLst>
   <p:notesMasterIdLst>
-    <p:notesMasterId r:id="rId9"/>
+    <p:notesMasterId r:id="rId13"/>
   </p:notesMasterIdLst>
   <p:sldIdLst>
     <p:sldId id="256" r:id="rId2"/>
@@ -14,7 +14,11 @@
     <p:sldId id="259" r:id="rId5"/>
     <p:sldId id="260" r:id="rId6"/>
     <p:sldId id="261" r:id="rId7"/>
-    <p:sldId id="262" r:id="rId8"/>
+    <p:sldId id="265" r:id="rId8"/>
+    <p:sldId id="262" r:id="rId9"/>
+    <p:sldId id="263" r:id="rId10"/>
+    <p:sldId id="264" r:id="rId11"/>
+    <p:sldId id="266" r:id="rId12"/>
   </p:sldIdLst>
   <p:sldSz cx="9144000" cy="6858000" type="screen4x3"/>
   <p:notesSz cx="6858000" cy="9144000"/>
@@ -214,7 +218,7 @@
           <a:p>
             <a:fld id="{D0F15B3C-1181-4445-BB6A-6BED1DF2958C}" type="datetimeFigureOut">
               <a:rPr lang="en-US" smtClean="0"/>
-              <a:t>3/18/2015</a:t>
+              <a:t>3/19/2015</a:t>
             </a:fld>
             <a:endParaRPr lang="en-US"/>
           </a:p>
@@ -831,7 +835,7 @@
           <a:p>
             <a:fld id="{2927DE08-9B48-44D6-83D4-230A82F93FAE}" type="datetime1">
               <a:rPr lang="en-US" smtClean="0"/>
-              <a:t>3/18/2015</a:t>
+              <a:t>3/19/2015</a:t>
             </a:fld>
             <a:endParaRPr lang="en-US"/>
           </a:p>
@@ -997,7 +1001,7 @@
           <a:p>
             <a:fld id="{5D95C52C-C3C1-4927-8E70-C103DE1C3321}" type="datetime1">
               <a:rPr lang="en-US" smtClean="0"/>
-              <a:t>3/18/2015</a:t>
+              <a:t>3/19/2015</a:t>
             </a:fld>
             <a:endParaRPr lang="en-US"/>
           </a:p>
@@ -1173,7 +1177,7 @@
           <a:p>
             <a:fld id="{90E3D6A5-38A1-4FEC-A43A-47F48DEDEFD3}" type="datetime1">
               <a:rPr lang="en-US" smtClean="0"/>
-              <a:t>3/18/2015</a:t>
+              <a:t>3/19/2015</a:t>
             </a:fld>
             <a:endParaRPr lang="en-US"/>
           </a:p>
@@ -1339,7 +1343,7 @@
           <a:p>
             <a:fld id="{D8E26438-717D-40FF-AE1C-BA0484F53167}" type="datetime1">
               <a:rPr lang="en-US" smtClean="0"/>
-              <a:t>3/18/2015</a:t>
+              <a:t>3/19/2015</a:t>
             </a:fld>
             <a:endParaRPr lang="en-US"/>
           </a:p>
@@ -1581,7 +1585,7 @@
           <a:p>
             <a:fld id="{204240F7-7708-4F95-8DF5-779CE1EBFAFE}" type="datetime1">
               <a:rPr lang="en-US" smtClean="0"/>
-              <a:t>3/18/2015</a:t>
+              <a:t>3/19/2015</a:t>
             </a:fld>
             <a:endParaRPr lang="en-US"/>
           </a:p>
@@ -1865,7 +1869,7 @@
           <a:p>
             <a:fld id="{9AB1B8F5-007F-4624-9D09-74A4BB144A1B}" type="datetime1">
               <a:rPr lang="en-US" smtClean="0"/>
-              <a:t>3/18/2015</a:t>
+              <a:t>3/19/2015</a:t>
             </a:fld>
             <a:endParaRPr lang="en-US"/>
           </a:p>
@@ -2283,7 +2287,7 @@
           <a:p>
             <a:fld id="{33652302-F773-471B-A447-C9E7D11FB526}" type="datetime1">
               <a:rPr lang="en-US" smtClean="0"/>
-              <a:t>3/18/2015</a:t>
+              <a:t>3/19/2015</a:t>
             </a:fld>
             <a:endParaRPr lang="en-US"/>
           </a:p>
@@ -2397,7 +2401,7 @@
           <a:p>
             <a:fld id="{505FC5C8-7D30-45A5-B6D7-01D5FFF04AAA}" type="datetime1">
               <a:rPr lang="en-US" smtClean="0"/>
-              <a:t>3/18/2015</a:t>
+              <a:t>3/19/2015</a:t>
             </a:fld>
             <a:endParaRPr lang="en-US"/>
           </a:p>
@@ -2488,7 +2492,7 @@
           <a:p>
             <a:fld id="{2203C164-A71A-4152-83A1-27E2B515D187}" type="datetime1">
               <a:rPr lang="en-US" smtClean="0"/>
-              <a:t>3/18/2015</a:t>
+              <a:t>3/19/2015</a:t>
             </a:fld>
             <a:endParaRPr lang="en-US"/>
           </a:p>
@@ -2761,7 +2765,7 @@
           <a:p>
             <a:fld id="{0B77CF3C-9740-4894-A406-34BF11EA8119}" type="datetime1">
               <a:rPr lang="en-US" smtClean="0"/>
-              <a:t>3/18/2015</a:t>
+              <a:t>3/19/2015</a:t>
             </a:fld>
             <a:endParaRPr lang="en-US"/>
           </a:p>
@@ -3010,7 +3014,7 @@
           <a:p>
             <a:fld id="{65AEF08F-C222-4314-9819-054B5D3660D4}" type="datetime1">
               <a:rPr lang="en-US" smtClean="0"/>
-              <a:t>3/18/2015</a:t>
+              <a:t>3/19/2015</a:t>
             </a:fld>
             <a:endParaRPr lang="en-US"/>
           </a:p>
@@ -3219,7 +3223,7 @@
           <a:p>
             <a:fld id="{97CA4D54-662E-4D1F-9D66-59ED33158556}" type="datetime1">
               <a:rPr lang="en-US" smtClean="0"/>
-              <a:t>3/18/2015</a:t>
+              <a:t>3/19/2015</a:t>
             </a:fld>
             <a:endParaRPr lang="en-US"/>
           </a:p>
@@ -3674,6 +3678,254 @@
 </p:sld>
 </file>
 
+<file path=ppt/slides/slide10.xml><?xml version="1.0" encoding="utf-8"?>
+<p:sld xmlns:a="http://schemas.openxmlformats.org/drawingml/2006/main" xmlns:r="http://schemas.openxmlformats.org/officeDocument/2006/relationships" xmlns:p="http://schemas.openxmlformats.org/presentationml/2006/main">
+  <p:cSld>
+    <p:spTree>
+      <p:nvGrpSpPr>
+        <p:cNvPr id="1" name=""/>
+        <p:cNvGrpSpPr/>
+        <p:nvPr/>
+      </p:nvGrpSpPr>
+      <p:grpSpPr>
+        <a:xfrm>
+          <a:off x="0" y="0"/>
+          <a:ext cx="0" cy="0"/>
+          <a:chOff x="0" y="0"/>
+          <a:chExt cx="0" cy="0"/>
+        </a:xfrm>
+      </p:grpSpPr>
+      <p:sp>
+        <p:nvSpPr>
+          <p:cNvPr id="2" name="Title 1"/>
+          <p:cNvSpPr>
+            <a:spLocks noGrp="1"/>
+          </p:cNvSpPr>
+          <p:nvPr>
+            <p:ph type="title"/>
+          </p:nvPr>
+        </p:nvSpPr>
+        <p:spPr/>
+        <p:txBody>
+          <a:bodyPr/>
+          <a:lstStyle/>
+          <a:p>
+            <a:r>
+              <a:rPr lang="en-US" dirty="0" smtClean="0"/>
+              <a:t>LKUP_STATE</a:t>
+            </a:r>
+            <a:endParaRPr lang="en-US" dirty="0"/>
+          </a:p>
+        </p:txBody>
+      </p:sp>
+      <p:sp>
+        <p:nvSpPr>
+          <p:cNvPr id="3" name="Content Placeholder 2"/>
+          <p:cNvSpPr>
+            <a:spLocks noGrp="1"/>
+          </p:cNvSpPr>
+          <p:nvPr>
+            <p:ph idx="1"/>
+          </p:nvPr>
+        </p:nvSpPr>
+        <p:spPr/>
+        <p:txBody>
+          <a:bodyPr/>
+          <a:lstStyle/>
+          <a:p>
+            <a:r>
+              <a:rPr lang="en-US" dirty="0" smtClean="0"/>
+              <a:t>Defines the DFA states.</a:t>
+            </a:r>
+          </a:p>
+          <a:p>
+            <a:r>
+              <a:rPr lang="en-US" dirty="0" smtClean="0"/>
+              <a:t>Defines display name (or key).</a:t>
+            </a:r>
+          </a:p>
+          <a:p>
+            <a:r>
+              <a:rPr lang="en-US" dirty="0" smtClean="0"/>
+              <a:t>May define an expected event.</a:t>
+            </a:r>
+          </a:p>
+          <a:p>
+            <a:r>
+              <a:rPr lang="en-US" dirty="0" smtClean="0"/>
+              <a:t>Has constraints that must be satisfied to enter.</a:t>
+            </a:r>
+          </a:p>
+          <a:p>
+            <a:r>
+              <a:rPr lang="en-US" dirty="0" smtClean="0"/>
+              <a:t>May define an alternate state that is tried if constraints are unsatisfied.</a:t>
+            </a:r>
+          </a:p>
+          <a:p>
+            <a:r>
+              <a:rPr lang="en-US" dirty="0" smtClean="0"/>
+              <a:t>Constraints + alternate states are a way to implement conditional branching in the DFA.</a:t>
+            </a:r>
+            <a:endParaRPr lang="en-US" dirty="0"/>
+          </a:p>
+        </p:txBody>
+      </p:sp>
+      <p:sp>
+        <p:nvSpPr>
+          <p:cNvPr id="4" name="Slide Number Placeholder 3"/>
+          <p:cNvSpPr>
+            <a:spLocks noGrp="1"/>
+          </p:cNvSpPr>
+          <p:nvPr>
+            <p:ph type="sldNum" sz="quarter" idx="12"/>
+          </p:nvPr>
+        </p:nvSpPr>
+        <p:spPr/>
+        <p:txBody>
+          <a:bodyPr/>
+          <a:lstStyle/>
+          <a:p>
+            <a:fld id="{B6F15528-21DE-4FAA-801E-634DDDAF4B2B}" type="slidenum">
+              <a:rPr lang="en-US" smtClean="0"/>
+              <a:pPr/>
+              <a:t>10</a:t>
+            </a:fld>
+            <a:endParaRPr lang="en-US"/>
+          </a:p>
+        </p:txBody>
+      </p:sp>
+    </p:spTree>
+    <p:extLst>
+      <p:ext uri="{BB962C8B-B14F-4D97-AF65-F5344CB8AC3E}">
+        <p14:creationId xmlns:p14="http://schemas.microsoft.com/office/powerpoint/2010/main" val="769201018"/>
+      </p:ext>
+    </p:extLst>
+  </p:cSld>
+  <p:clrMapOvr>
+    <a:masterClrMapping/>
+  </p:clrMapOvr>
+</p:sld>
+</file>
+
+<file path=ppt/slides/slide11.xml><?xml version="1.0" encoding="utf-8"?>
+<p:sld xmlns:a="http://schemas.openxmlformats.org/drawingml/2006/main" xmlns:r="http://schemas.openxmlformats.org/officeDocument/2006/relationships" xmlns:p="http://schemas.openxmlformats.org/presentationml/2006/main">
+  <p:cSld>
+    <p:spTree>
+      <p:nvGrpSpPr>
+        <p:cNvPr id="1" name=""/>
+        <p:cNvGrpSpPr/>
+        <p:nvPr/>
+      </p:nvGrpSpPr>
+      <p:grpSpPr>
+        <a:xfrm>
+          <a:off x="0" y="0"/>
+          <a:ext cx="0" cy="0"/>
+          <a:chOff x="0" y="0"/>
+          <a:chExt cx="0" cy="0"/>
+        </a:xfrm>
+      </p:grpSpPr>
+      <p:sp>
+        <p:nvSpPr>
+          <p:cNvPr id="2" name="Title 1"/>
+          <p:cNvSpPr>
+            <a:spLocks noGrp="1"/>
+          </p:cNvSpPr>
+          <p:nvPr>
+            <p:ph type="title"/>
+          </p:nvPr>
+        </p:nvSpPr>
+        <p:spPr/>
+        <p:txBody>
+          <a:bodyPr/>
+          <a:lstStyle/>
+          <a:p>
+            <a:r>
+              <a:rPr lang="en-US" dirty="0" smtClean="0"/>
+              <a:t>LKUP_STATE_EVENT_TRANS</a:t>
+            </a:r>
+            <a:endParaRPr lang="en-US" dirty="0"/>
+          </a:p>
+        </p:txBody>
+      </p:sp>
+      <p:sp>
+        <p:nvSpPr>
+          <p:cNvPr id="3" name="Content Placeholder 2"/>
+          <p:cNvSpPr>
+            <a:spLocks noGrp="1"/>
+          </p:cNvSpPr>
+          <p:nvPr>
+            <p:ph idx="1"/>
+          </p:nvPr>
+        </p:nvSpPr>
+        <p:spPr/>
+        <p:txBody>
+          <a:bodyPr/>
+          <a:lstStyle/>
+          <a:p>
+            <a:r>
+              <a:rPr lang="en-US" dirty="0" smtClean="0"/>
+              <a:t>Defines the transitions (vertices) between two states.</a:t>
+            </a:r>
+          </a:p>
+          <a:p>
+            <a:r>
+              <a:rPr lang="en-US" dirty="0" smtClean="0"/>
+              <a:t>May override the display name from LKUP_EVENT.</a:t>
+            </a:r>
+          </a:p>
+          <a:p>
+            <a:r>
+              <a:rPr lang="en-US" dirty="0" smtClean="0"/>
+              <a:t>Has constraints that must be satisfied to </a:t>
+            </a:r>
+            <a:r>
+              <a:rPr lang="en-US" smtClean="0"/>
+              <a:t>be valid.</a:t>
+            </a:r>
+          </a:p>
+          <a:p>
+            <a:endParaRPr lang="en-US" dirty="0"/>
+          </a:p>
+        </p:txBody>
+      </p:sp>
+      <p:sp>
+        <p:nvSpPr>
+          <p:cNvPr id="4" name="Slide Number Placeholder 3"/>
+          <p:cNvSpPr>
+            <a:spLocks noGrp="1"/>
+          </p:cNvSpPr>
+          <p:nvPr>
+            <p:ph type="sldNum" sz="quarter" idx="12"/>
+          </p:nvPr>
+        </p:nvSpPr>
+        <p:spPr/>
+        <p:txBody>
+          <a:bodyPr/>
+          <a:lstStyle/>
+          <a:p>
+            <a:fld id="{B6F15528-21DE-4FAA-801E-634DDDAF4B2B}" type="slidenum">
+              <a:rPr lang="en-US" smtClean="0"/>
+              <a:pPr/>
+              <a:t>11</a:t>
+            </a:fld>
+            <a:endParaRPr lang="en-US"/>
+          </a:p>
+        </p:txBody>
+      </p:sp>
+    </p:spTree>
+    <p:extLst>
+      <p:ext uri="{BB962C8B-B14F-4D97-AF65-F5344CB8AC3E}">
+        <p14:creationId xmlns:p14="http://schemas.microsoft.com/office/powerpoint/2010/main" val="621509983"/>
+      </p:ext>
+    </p:extLst>
+  </p:cSld>
+  <p:clrMapOvr>
+    <a:masterClrMapping/>
+  </p:clrMapOvr>
+</p:sld>
+</file>
+
 <file path=ppt/slides/slide2.xml><?xml version="1.0" encoding="utf-8"?>
 <p:sld xmlns:a="http://schemas.openxmlformats.org/drawingml/2006/main" xmlns:r="http://schemas.openxmlformats.org/officeDocument/2006/relationships" xmlns:p="http://schemas.openxmlformats.org/presentationml/2006/main">
   <p:cSld>
@@ -3778,7 +4030,6 @@
               <a:rPr lang="en-US" dirty="0" smtClean="0"/>
               <a:t>Knox</a:t>
             </a:r>
-            <a:endParaRPr lang="en-US" dirty="0" smtClean="0"/>
           </a:p>
           <a:p>
             <a:r>
@@ -3908,11 +4159,7 @@
           <a:p>
             <a:r>
               <a:rPr lang="en-US" dirty="0" smtClean="0"/>
-              <a:t>Customer wanted long running complex workflow </a:t>
-            </a:r>
-            <a:r>
-              <a:rPr lang="en-US" dirty="0" smtClean="0"/>
-              <a:t>implemented</a:t>
+              <a:t>Customer wanted long running complex workflow implemented</a:t>
             </a:r>
           </a:p>
           <a:p>
@@ -4210,7 +4457,11 @@
           <a:p>
             <a:r>
               <a:rPr lang="en-US" dirty="0" smtClean="0"/>
-              <a:t>Event Driven Deterministic Finite Automata</a:t>
+              <a:t>Event Driven Deterministic Finite </a:t>
+            </a:r>
+            <a:r>
+              <a:rPr lang="en-US" dirty="0" smtClean="0"/>
+              <a:t>Automata (DFA)</a:t>
             </a:r>
             <a:endParaRPr lang="en-US" dirty="0"/>
           </a:p>
@@ -4318,6 +4569,144 @@
         <p:spPr/>
         <p:txBody>
           <a:bodyPr>
+            <a:normAutofit/>
+          </a:bodyPr>
+          <a:lstStyle/>
+          <a:p>
+            <a:r>
+              <a:rPr lang="en-US" dirty="0" smtClean="0"/>
+              <a:t>Graph Theoretical Model</a:t>
+            </a:r>
+            <a:endParaRPr lang="en-US" dirty="0"/>
+          </a:p>
+        </p:txBody>
+      </p:sp>
+      <p:sp>
+        <p:nvSpPr>
+          <p:cNvPr id="3" name="Content Placeholder 2"/>
+          <p:cNvSpPr>
+            <a:spLocks noGrp="1"/>
+          </p:cNvSpPr>
+          <p:nvPr>
+            <p:ph idx="1"/>
+          </p:nvPr>
+        </p:nvSpPr>
+        <p:spPr>
+          <a:xfrm>
+            <a:off x="457200" y="1417638"/>
+            <a:ext cx="8229600" cy="4938712"/>
+          </a:xfrm>
+        </p:spPr>
+        <p:txBody>
+          <a:bodyPr>
+            <a:normAutofit fontScale="92500" lnSpcReduction="20000"/>
+          </a:bodyPr>
+          <a:lstStyle/>
+          <a:p>
+            <a:r>
+              <a:rPr lang="en-US" dirty="0" smtClean="0"/>
+              <a:t>All of the DFA states exist in a graph.</a:t>
+            </a:r>
+          </a:p>
+          <a:p>
+            <a:r>
+              <a:rPr lang="en-US" dirty="0" smtClean="0"/>
+              <a:t>Each DFA state may connect to zero or more states (including itself) with vertices associated with events.</a:t>
+            </a:r>
+          </a:p>
+          <a:p>
+            <a:r>
+              <a:rPr lang="en-US" dirty="0" smtClean="0"/>
+              <a:t>A state uses an event no more than once.</a:t>
+            </a:r>
+          </a:p>
+          <a:p>
+            <a:r>
+              <a:rPr lang="en-US" dirty="0" smtClean="0"/>
+              <a:t>A workflow is an entry point at a specific state.  </a:t>
+            </a:r>
+          </a:p>
+          <a:p>
+            <a:r>
+              <a:rPr lang="en-US" dirty="0" smtClean="0"/>
+              <a:t>Closure: the state, its events, vertices and neighbors, and the neighbors closure.</a:t>
+            </a:r>
+          </a:p>
+          <a:p>
+            <a:r>
+              <a:rPr lang="en-US" dirty="0" smtClean="0"/>
+              <a:t>When working with a workflow, it is useful to view it as a graph defined by the closure of its entry point.</a:t>
+            </a:r>
+          </a:p>
+        </p:txBody>
+      </p:sp>
+      <p:sp>
+        <p:nvSpPr>
+          <p:cNvPr id="4" name="Slide Number Placeholder 3"/>
+          <p:cNvSpPr>
+            <a:spLocks noGrp="1"/>
+          </p:cNvSpPr>
+          <p:nvPr>
+            <p:ph type="sldNum" sz="quarter" idx="12"/>
+          </p:nvPr>
+        </p:nvSpPr>
+        <p:spPr/>
+        <p:txBody>
+          <a:bodyPr/>
+          <a:lstStyle/>
+          <a:p>
+            <a:fld id="{B6F15528-21DE-4FAA-801E-634DDDAF4B2B}" type="slidenum">
+              <a:rPr lang="en-US" smtClean="0"/>
+              <a:pPr/>
+              <a:t>7</a:t>
+            </a:fld>
+            <a:endParaRPr lang="en-US"/>
+          </a:p>
+        </p:txBody>
+      </p:sp>
+    </p:spTree>
+    <p:extLst>
+      <p:ext uri="{BB962C8B-B14F-4D97-AF65-F5344CB8AC3E}">
+        <p14:creationId xmlns:p14="http://schemas.microsoft.com/office/powerpoint/2010/main" val="2674337966"/>
+      </p:ext>
+    </p:extLst>
+  </p:cSld>
+  <p:clrMapOvr>
+    <a:masterClrMapping/>
+  </p:clrMapOvr>
+</p:sld>
+</file>
+
+<file path=ppt/slides/slide8.xml><?xml version="1.0" encoding="utf-8"?>
+<p:sld xmlns:a="http://schemas.openxmlformats.org/drawingml/2006/main" xmlns:r="http://schemas.openxmlformats.org/officeDocument/2006/relationships" xmlns:p="http://schemas.openxmlformats.org/presentationml/2006/main">
+  <p:cSld>
+    <p:spTree>
+      <p:nvGrpSpPr>
+        <p:cNvPr id="1" name=""/>
+        <p:cNvGrpSpPr/>
+        <p:nvPr/>
+      </p:nvGrpSpPr>
+      <p:grpSpPr>
+        <a:xfrm>
+          <a:off x="0" y="0"/>
+          <a:ext cx="0" cy="0"/>
+          <a:chOff x="0" y="0"/>
+          <a:chExt cx="0" cy="0"/>
+        </a:xfrm>
+      </p:grpSpPr>
+      <p:sp>
+        <p:nvSpPr>
+          <p:cNvPr id="2" name="Title 1"/>
+          <p:cNvSpPr>
+            <a:spLocks noGrp="1"/>
+          </p:cNvSpPr>
+          <p:nvPr>
+            <p:ph type="title"/>
+          </p:nvPr>
+        </p:nvSpPr>
+        <p:spPr/>
+        <p:txBody>
+          <a:bodyPr>
             <a:normAutofit fontScale="90000"/>
           </a:bodyPr>
           <a:lstStyle/>
@@ -4345,6 +4734,10 @@
           <a:bodyPr/>
           <a:lstStyle/>
           <a:p>
+            <a:r>
+              <a:rPr lang="en-US" dirty="0" smtClean="0"/>
+              <a:t>[Insert Picture of Schema Here]</a:t>
+            </a:r>
             <a:endParaRPr lang="en-US" dirty="0"/>
           </a:p>
         </p:txBody>
@@ -4367,7 +4760,7 @@
             <a:fld id="{B6F15528-21DE-4FAA-801E-634DDDAF4B2B}" type="slidenum">
               <a:rPr lang="en-US" smtClean="0"/>
               <a:pPr/>
-              <a:t>7</a:t>
+              <a:t>8</a:t>
             </a:fld>
             <a:endParaRPr lang="en-US"/>
           </a:p>
@@ -4377,6 +4770,117 @@
     <p:extLst>
       <p:ext uri="{BB962C8B-B14F-4D97-AF65-F5344CB8AC3E}">
         <p14:creationId xmlns:p14="http://schemas.microsoft.com/office/powerpoint/2010/main" val="1119797094"/>
+      </p:ext>
+    </p:extLst>
+  </p:cSld>
+  <p:clrMapOvr>
+    <a:masterClrMapping/>
+  </p:clrMapOvr>
+</p:sld>
+</file>
+
+<file path=ppt/slides/slide9.xml><?xml version="1.0" encoding="utf-8"?>
+<p:sld xmlns:a="http://schemas.openxmlformats.org/drawingml/2006/main" xmlns:r="http://schemas.openxmlformats.org/officeDocument/2006/relationships" xmlns:p="http://schemas.openxmlformats.org/presentationml/2006/main">
+  <p:cSld>
+    <p:spTree>
+      <p:nvGrpSpPr>
+        <p:cNvPr id="1" name=""/>
+        <p:cNvGrpSpPr/>
+        <p:nvPr/>
+      </p:nvGrpSpPr>
+      <p:grpSpPr>
+        <a:xfrm>
+          <a:off x="0" y="0"/>
+          <a:ext cx="0" cy="0"/>
+          <a:chOff x="0" y="0"/>
+          <a:chExt cx="0" cy="0"/>
+        </a:xfrm>
+      </p:grpSpPr>
+      <p:sp>
+        <p:nvSpPr>
+          <p:cNvPr id="2" name="Title 1"/>
+          <p:cNvSpPr>
+            <a:spLocks noGrp="1"/>
+          </p:cNvSpPr>
+          <p:nvPr>
+            <p:ph type="title"/>
+          </p:nvPr>
+        </p:nvSpPr>
+        <p:spPr/>
+        <p:txBody>
+          <a:bodyPr/>
+          <a:lstStyle/>
+          <a:p>
+            <a:r>
+              <a:rPr lang="en-US" dirty="0" smtClean="0"/>
+              <a:t>LKUP_EVENT</a:t>
+            </a:r>
+            <a:endParaRPr lang="en-US" dirty="0"/>
+          </a:p>
+        </p:txBody>
+      </p:sp>
+      <p:sp>
+        <p:nvSpPr>
+          <p:cNvPr id="3" name="Content Placeholder 2"/>
+          <p:cNvSpPr>
+            <a:spLocks noGrp="1"/>
+          </p:cNvSpPr>
+          <p:nvPr>
+            <p:ph idx="1"/>
+          </p:nvPr>
+        </p:nvSpPr>
+        <p:spPr/>
+        <p:txBody>
+          <a:bodyPr/>
+          <a:lstStyle/>
+          <a:p>
+            <a:r>
+              <a:rPr lang="en-US" dirty="0" smtClean="0"/>
+              <a:t>The elements in this table define the events, which correspond to the set of symbols available to a classical FSM.</a:t>
+            </a:r>
+          </a:p>
+          <a:p>
+            <a:r>
+              <a:rPr lang="en-US" dirty="0" smtClean="0"/>
+              <a:t>Defines the default display name (or resource key) and if the event is passive (the resulting state does not become the current state).</a:t>
+            </a:r>
+          </a:p>
+          <a:p>
+            <a:r>
+              <a:rPr lang="en-US" dirty="0" smtClean="0"/>
+              <a:t>Passive events are useful for features such as leaving comments.</a:t>
+            </a:r>
+          </a:p>
+        </p:txBody>
+      </p:sp>
+      <p:sp>
+        <p:nvSpPr>
+          <p:cNvPr id="4" name="Slide Number Placeholder 3"/>
+          <p:cNvSpPr>
+            <a:spLocks noGrp="1"/>
+          </p:cNvSpPr>
+          <p:nvPr>
+            <p:ph type="sldNum" sz="quarter" idx="12"/>
+          </p:nvPr>
+        </p:nvSpPr>
+        <p:spPr/>
+        <p:txBody>
+          <a:bodyPr/>
+          <a:lstStyle/>
+          <a:p>
+            <a:fld id="{B6F15528-21DE-4FAA-801E-634DDDAF4B2B}" type="slidenum">
+              <a:rPr lang="en-US" smtClean="0"/>
+              <a:pPr/>
+              <a:t>9</a:t>
+            </a:fld>
+            <a:endParaRPr lang="en-US"/>
+          </a:p>
+        </p:txBody>
+      </p:sp>
+    </p:spTree>
+    <p:extLst>
+      <p:ext uri="{BB962C8B-B14F-4D97-AF65-F5344CB8AC3E}">
+        <p14:creationId xmlns:p14="http://schemas.microsoft.com/office/powerpoint/2010/main" val="2005962276"/>
       </p:ext>
     </p:extLst>
   </p:cSld>

</xml_diff>

<commit_message>
In progress, changes at home.
</commit_message>
<xml_diff>
--- a/Modeling Workflows with Event Driven DFA.pptx
+++ b/Modeling Workflows with Event Driven DFA.pptx
@@ -5,7 +5,7 @@
     <p:sldMasterId id="2147483648" r:id="rId1"/>
   </p:sldMasterIdLst>
   <p:notesMasterIdLst>
-    <p:notesMasterId r:id="rId13"/>
+    <p:notesMasterId r:id="rId18"/>
   </p:notesMasterIdLst>
   <p:sldIdLst>
     <p:sldId id="256" r:id="rId2"/>
@@ -17,8 +17,13 @@
     <p:sldId id="265" r:id="rId8"/>
     <p:sldId id="262" r:id="rId9"/>
     <p:sldId id="263" r:id="rId10"/>
-    <p:sldId id="264" r:id="rId11"/>
-    <p:sldId id="266" r:id="rId12"/>
+    <p:sldId id="268" r:id="rId11"/>
+    <p:sldId id="264" r:id="rId12"/>
+    <p:sldId id="266" r:id="rId13"/>
+    <p:sldId id="267" r:id="rId14"/>
+    <p:sldId id="269" r:id="rId15"/>
+    <p:sldId id="270" r:id="rId16"/>
+    <p:sldId id="271" r:id="rId17"/>
   </p:sldIdLst>
   <p:sldSz cx="9144000" cy="6858000" type="screen4x3"/>
   <p:notesSz cx="6858000" cy="9144000"/>
@@ -218,7 +223,7 @@
           <a:p>
             <a:fld id="{D0F15B3C-1181-4445-BB6A-6BED1DF2958C}" type="datetimeFigureOut">
               <a:rPr lang="en-US" smtClean="0"/>
-              <a:t>3/19/2015</a:t>
+              <a:t>3/21/2015</a:t>
             </a:fld>
             <a:endParaRPr lang="en-US"/>
           </a:p>
@@ -835,7 +840,7 @@
           <a:p>
             <a:fld id="{2927DE08-9B48-44D6-83D4-230A82F93FAE}" type="datetime1">
               <a:rPr lang="en-US" smtClean="0"/>
-              <a:t>3/19/2015</a:t>
+              <a:t>3/21/2015</a:t>
             </a:fld>
             <a:endParaRPr lang="en-US"/>
           </a:p>
@@ -1001,7 +1006,7 @@
           <a:p>
             <a:fld id="{5D95C52C-C3C1-4927-8E70-C103DE1C3321}" type="datetime1">
               <a:rPr lang="en-US" smtClean="0"/>
-              <a:t>3/19/2015</a:t>
+              <a:t>3/21/2015</a:t>
             </a:fld>
             <a:endParaRPr lang="en-US"/>
           </a:p>
@@ -1177,7 +1182,7 @@
           <a:p>
             <a:fld id="{90E3D6A5-38A1-4FEC-A43A-47F48DEDEFD3}" type="datetime1">
               <a:rPr lang="en-US" smtClean="0"/>
-              <a:t>3/19/2015</a:t>
+              <a:t>3/21/2015</a:t>
             </a:fld>
             <a:endParaRPr lang="en-US"/>
           </a:p>
@@ -1343,7 +1348,7 @@
           <a:p>
             <a:fld id="{D8E26438-717D-40FF-AE1C-BA0484F53167}" type="datetime1">
               <a:rPr lang="en-US" smtClean="0"/>
-              <a:t>3/19/2015</a:t>
+              <a:t>3/21/2015</a:t>
             </a:fld>
             <a:endParaRPr lang="en-US"/>
           </a:p>
@@ -1585,7 +1590,7 @@
           <a:p>
             <a:fld id="{204240F7-7708-4F95-8DF5-779CE1EBFAFE}" type="datetime1">
               <a:rPr lang="en-US" smtClean="0"/>
-              <a:t>3/19/2015</a:t>
+              <a:t>3/21/2015</a:t>
             </a:fld>
             <a:endParaRPr lang="en-US"/>
           </a:p>
@@ -1869,7 +1874,7 @@
           <a:p>
             <a:fld id="{9AB1B8F5-007F-4624-9D09-74A4BB144A1B}" type="datetime1">
               <a:rPr lang="en-US" smtClean="0"/>
-              <a:t>3/19/2015</a:t>
+              <a:t>3/21/2015</a:t>
             </a:fld>
             <a:endParaRPr lang="en-US"/>
           </a:p>
@@ -2287,7 +2292,7 @@
           <a:p>
             <a:fld id="{33652302-F773-471B-A447-C9E7D11FB526}" type="datetime1">
               <a:rPr lang="en-US" smtClean="0"/>
-              <a:t>3/19/2015</a:t>
+              <a:t>3/21/2015</a:t>
             </a:fld>
             <a:endParaRPr lang="en-US"/>
           </a:p>
@@ -2401,7 +2406,7 @@
           <a:p>
             <a:fld id="{505FC5C8-7D30-45A5-B6D7-01D5FFF04AAA}" type="datetime1">
               <a:rPr lang="en-US" smtClean="0"/>
-              <a:t>3/19/2015</a:t>
+              <a:t>3/21/2015</a:t>
             </a:fld>
             <a:endParaRPr lang="en-US"/>
           </a:p>
@@ -2492,7 +2497,7 @@
           <a:p>
             <a:fld id="{2203C164-A71A-4152-83A1-27E2B515D187}" type="datetime1">
               <a:rPr lang="en-US" smtClean="0"/>
-              <a:t>3/19/2015</a:t>
+              <a:t>3/21/2015</a:t>
             </a:fld>
             <a:endParaRPr lang="en-US"/>
           </a:p>
@@ -2765,7 +2770,7 @@
           <a:p>
             <a:fld id="{0B77CF3C-9740-4894-A406-34BF11EA8119}" type="datetime1">
               <a:rPr lang="en-US" smtClean="0"/>
-              <a:t>3/19/2015</a:t>
+              <a:t>3/21/2015</a:t>
             </a:fld>
             <a:endParaRPr lang="en-US"/>
           </a:p>
@@ -3014,7 +3019,7 @@
           <a:p>
             <a:fld id="{65AEF08F-C222-4314-9819-054B5D3660D4}" type="datetime1">
               <a:rPr lang="en-US" smtClean="0"/>
-              <a:t>3/19/2015</a:t>
+              <a:t>3/21/2015</a:t>
             </a:fld>
             <a:endParaRPr lang="en-US"/>
           </a:p>
@@ -3223,7 +3228,7 @@
           <a:p>
             <a:fld id="{97CA4D54-662E-4D1F-9D66-59ED33158556}" type="datetime1">
               <a:rPr lang="en-US" smtClean="0"/>
-              <a:t>3/19/2015</a:t>
+              <a:t>3/21/2015</a:t>
             </a:fld>
             <a:endParaRPr lang="en-US"/>
           </a:p>
@@ -3712,7 +3717,7 @@
           <a:p>
             <a:r>
               <a:rPr lang="en-US" dirty="0" smtClean="0"/>
-              <a:t>LKUP_STATE</a:t>
+              <a:t>Event Sources</a:t>
             </a:r>
             <a:endParaRPr lang="en-US" dirty="0"/>
           </a:p>
@@ -3728,46 +3733,66 @@
             <p:ph idx="1"/>
           </p:nvPr>
         </p:nvSpPr>
-        <p:spPr/>
-        <p:txBody>
-          <a:bodyPr/>
-          <a:lstStyle/>
-          <a:p>
-            <a:r>
-              <a:rPr lang="en-US" dirty="0" smtClean="0"/>
-              <a:t>Defines the DFA states.</a:t>
-            </a:r>
-          </a:p>
-          <a:p>
-            <a:r>
-              <a:rPr lang="en-US" dirty="0" smtClean="0"/>
-              <a:t>Defines display name (or key).</a:t>
-            </a:r>
-          </a:p>
-          <a:p>
-            <a:r>
-              <a:rPr lang="en-US" dirty="0" smtClean="0"/>
-              <a:t>May define an expected event.</a:t>
-            </a:r>
-          </a:p>
-          <a:p>
-            <a:r>
-              <a:rPr lang="en-US" dirty="0" smtClean="0"/>
-              <a:t>Has constraints that must be satisfied to enter.</a:t>
-            </a:r>
-          </a:p>
-          <a:p>
-            <a:r>
-              <a:rPr lang="en-US" dirty="0" smtClean="0"/>
-              <a:t>May define an alternate state that is tried if constraints are unsatisfied.</a:t>
-            </a:r>
-          </a:p>
-          <a:p>
-            <a:r>
-              <a:rPr lang="en-US" dirty="0" smtClean="0"/>
-              <a:t>Constraints + alternate states are a way to implement conditional branching in the DFA.</a:t>
-            </a:r>
-            <a:endParaRPr lang="en-US" dirty="0"/>
+        <p:spPr>
+          <a:xfrm>
+            <a:off x="457200" y="1219200"/>
+            <a:ext cx="8229600" cy="5137150"/>
+          </a:xfrm>
+        </p:spPr>
+        <p:txBody>
+          <a:bodyPr>
+            <a:normAutofit fontScale="92500"/>
+          </a:bodyPr>
+          <a:lstStyle/>
+          <a:p>
+            <a:r>
+              <a:rPr lang="en-US" dirty="0" smtClean="0"/>
+              <a:t>Direct User Input to apply an event (action) to a specific workflow.  Example: Manager approves pay raise.</a:t>
+            </a:r>
+          </a:p>
+          <a:p>
+            <a:r>
+              <a:rPr lang="en-US" dirty="0" smtClean="0"/>
+              <a:t>Application updates.  Example: Employee salary update results in a </a:t>
+            </a:r>
+            <a:r>
+              <a:rPr lang="en-US" cap="small" dirty="0" smtClean="0"/>
+              <a:t>salary change</a:t>
+            </a:r>
+            <a:r>
+              <a:rPr lang="en-US" dirty="0"/>
+              <a:t> </a:t>
+            </a:r>
+            <a:r>
+              <a:rPr lang="en-US" dirty="0" smtClean="0"/>
+              <a:t>event.</a:t>
+            </a:r>
+          </a:p>
+          <a:p>
+            <a:r>
+              <a:rPr lang="en-US" dirty="0" smtClean="0"/>
+              <a:t>Services (SOA).  Example: A request to a notification system may be sent due to a salary change resulting in a </a:t>
+            </a:r>
+            <a:r>
+              <a:rPr lang="en-US" cap="small" dirty="0" smtClean="0"/>
+              <a:t>employee notify</a:t>
+            </a:r>
+            <a:r>
+              <a:rPr lang="en-US" dirty="0" smtClean="0"/>
+              <a:t> event.</a:t>
+            </a:r>
+          </a:p>
+          <a:p>
+            <a:r>
+              <a:rPr lang="en-US" dirty="0" smtClean="0"/>
+              <a:t>Extract, Transform and Load (ETL) system.</a:t>
+            </a:r>
+          </a:p>
+          <a:p>
+            <a:r>
+              <a:rPr lang="en-US" dirty="0" smtClean="0"/>
+              <a:t>Another workflow, especially a parent workflow.</a:t>
+            </a:r>
           </a:p>
         </p:txBody>
       </p:sp>
@@ -3798,7 +3823,7 @@
     </p:spTree>
     <p:extLst>
       <p:ext uri="{BB962C8B-B14F-4D97-AF65-F5344CB8AC3E}">
-        <p14:creationId xmlns:p14="http://schemas.microsoft.com/office/powerpoint/2010/main" val="769201018"/>
+        <p14:creationId xmlns:p14="http://schemas.microsoft.com/office/powerpoint/2010/main" val="690021978"/>
       </p:ext>
     </p:extLst>
   </p:cSld>
@@ -3842,7 +3867,7 @@
           <a:p>
             <a:r>
               <a:rPr lang="en-US" dirty="0" smtClean="0"/>
-              <a:t>LKUP_STATE_EVENT_TRANS</a:t>
+              <a:t>LKUP_STATE</a:t>
             </a:r>
             <a:endParaRPr lang="en-US" dirty="0"/>
           </a:p>
@@ -3865,26 +3890,38 @@
           <a:p>
             <a:r>
               <a:rPr lang="en-US" dirty="0" smtClean="0"/>
-              <a:t>Defines the transitions (vertices) between two states.</a:t>
-            </a:r>
-          </a:p>
-          <a:p>
-            <a:r>
-              <a:rPr lang="en-US" dirty="0" smtClean="0"/>
-              <a:t>May override the display name from LKUP_EVENT.</a:t>
-            </a:r>
-          </a:p>
-          <a:p>
-            <a:r>
-              <a:rPr lang="en-US" dirty="0" smtClean="0"/>
-              <a:t>Has constraints that must be satisfied to </a:t>
-            </a:r>
-            <a:r>
-              <a:rPr lang="en-US" smtClean="0"/>
-              <a:t>be valid.</a:t>
-            </a:r>
-          </a:p>
-          <a:p>
+              <a:t>Defines the DFA states.</a:t>
+            </a:r>
+          </a:p>
+          <a:p>
+            <a:r>
+              <a:rPr lang="en-US" dirty="0" smtClean="0"/>
+              <a:t>Defines display name (or key).</a:t>
+            </a:r>
+          </a:p>
+          <a:p>
+            <a:r>
+              <a:rPr lang="en-US" dirty="0" smtClean="0"/>
+              <a:t>May define an expected event.</a:t>
+            </a:r>
+          </a:p>
+          <a:p>
+            <a:r>
+              <a:rPr lang="en-US" dirty="0" smtClean="0"/>
+              <a:t>Has constraints that must be satisfied to enter.</a:t>
+            </a:r>
+          </a:p>
+          <a:p>
+            <a:r>
+              <a:rPr lang="en-US" dirty="0" smtClean="0"/>
+              <a:t>May define an alternate state that is tried if constraints are unsatisfied.</a:t>
+            </a:r>
+          </a:p>
+          <a:p>
+            <a:r>
+              <a:rPr lang="en-US" dirty="0" smtClean="0"/>
+              <a:t>Constraints + alternate states are a way to implement conditional branching in the DFA.</a:t>
+            </a:r>
             <a:endParaRPr lang="en-US" dirty="0"/>
           </a:p>
         </p:txBody>
@@ -3908,6 +3945,124 @@
               <a:rPr lang="en-US" smtClean="0"/>
               <a:pPr/>
               <a:t>11</a:t>
+            </a:fld>
+            <a:endParaRPr lang="en-US"/>
+          </a:p>
+        </p:txBody>
+      </p:sp>
+    </p:spTree>
+    <p:extLst>
+      <p:ext uri="{BB962C8B-B14F-4D97-AF65-F5344CB8AC3E}">
+        <p14:creationId xmlns:p14="http://schemas.microsoft.com/office/powerpoint/2010/main" val="769201018"/>
+      </p:ext>
+    </p:extLst>
+  </p:cSld>
+  <p:clrMapOvr>
+    <a:masterClrMapping/>
+  </p:clrMapOvr>
+</p:sld>
+</file>
+
+<file path=ppt/slides/slide12.xml><?xml version="1.0" encoding="utf-8"?>
+<p:sld xmlns:a="http://schemas.openxmlformats.org/drawingml/2006/main" xmlns:r="http://schemas.openxmlformats.org/officeDocument/2006/relationships" xmlns:p="http://schemas.openxmlformats.org/presentationml/2006/main">
+  <p:cSld>
+    <p:spTree>
+      <p:nvGrpSpPr>
+        <p:cNvPr id="1" name=""/>
+        <p:cNvGrpSpPr/>
+        <p:nvPr/>
+      </p:nvGrpSpPr>
+      <p:grpSpPr>
+        <a:xfrm>
+          <a:off x="0" y="0"/>
+          <a:ext cx="0" cy="0"/>
+          <a:chOff x="0" y="0"/>
+          <a:chExt cx="0" cy="0"/>
+        </a:xfrm>
+      </p:grpSpPr>
+      <p:sp>
+        <p:nvSpPr>
+          <p:cNvPr id="2" name="Title 1"/>
+          <p:cNvSpPr>
+            <a:spLocks noGrp="1"/>
+          </p:cNvSpPr>
+          <p:nvPr>
+            <p:ph type="title"/>
+          </p:nvPr>
+        </p:nvSpPr>
+        <p:spPr/>
+        <p:txBody>
+          <a:bodyPr/>
+          <a:lstStyle/>
+          <a:p>
+            <a:r>
+              <a:rPr lang="en-US" dirty="0" smtClean="0"/>
+              <a:t>LKUP_STATE_EVENT_TRANS</a:t>
+            </a:r>
+            <a:endParaRPr lang="en-US" dirty="0"/>
+          </a:p>
+        </p:txBody>
+      </p:sp>
+      <p:sp>
+        <p:nvSpPr>
+          <p:cNvPr id="3" name="Content Placeholder 2"/>
+          <p:cNvSpPr>
+            <a:spLocks noGrp="1"/>
+          </p:cNvSpPr>
+          <p:nvPr>
+            <p:ph idx="1"/>
+          </p:nvPr>
+        </p:nvSpPr>
+        <p:spPr/>
+        <p:txBody>
+          <a:bodyPr/>
+          <a:lstStyle/>
+          <a:p>
+            <a:r>
+              <a:rPr lang="en-US" dirty="0" smtClean="0"/>
+              <a:t>Defines the transitions (vertices) between two states.</a:t>
+            </a:r>
+          </a:p>
+          <a:p>
+            <a:r>
+              <a:rPr lang="en-US" dirty="0" smtClean="0"/>
+              <a:t>May override the display name from LKUP_EVENT.</a:t>
+            </a:r>
+          </a:p>
+          <a:p>
+            <a:r>
+              <a:rPr lang="en-US" dirty="0" smtClean="0"/>
+              <a:t>Has constraints that must be satisfied to </a:t>
+            </a:r>
+            <a:r>
+              <a:rPr lang="en-US" smtClean="0"/>
+              <a:t>be valid.</a:t>
+            </a:r>
+          </a:p>
+          <a:p>
+            <a:endParaRPr lang="en-US" dirty="0"/>
+          </a:p>
+        </p:txBody>
+      </p:sp>
+      <p:sp>
+        <p:nvSpPr>
+          <p:cNvPr id="4" name="Slide Number Placeholder 3"/>
+          <p:cNvSpPr>
+            <a:spLocks noGrp="1"/>
+          </p:cNvSpPr>
+          <p:nvPr>
+            <p:ph type="sldNum" sz="quarter" idx="12"/>
+          </p:nvPr>
+        </p:nvSpPr>
+        <p:spPr/>
+        <p:txBody>
+          <a:bodyPr/>
+          <a:lstStyle/>
+          <a:p>
+            <a:fld id="{B6F15528-21DE-4FAA-801E-634DDDAF4B2B}" type="slidenum">
+              <a:rPr lang="en-US" smtClean="0"/>
+              <a:pPr/>
+              <a:t>12</a:t>
             </a:fld>
             <a:endParaRPr lang="en-US"/>
           </a:p>
@@ -3917,6 +4072,452 @@
     <p:extLst>
       <p:ext uri="{BB962C8B-B14F-4D97-AF65-F5344CB8AC3E}">
         <p14:creationId xmlns:p14="http://schemas.microsoft.com/office/powerpoint/2010/main" val="621509983"/>
+      </p:ext>
+    </p:extLst>
+  </p:cSld>
+  <p:clrMapOvr>
+    <a:masterClrMapping/>
+  </p:clrMapOvr>
+</p:sld>
+</file>
+
+<file path=ppt/slides/slide13.xml><?xml version="1.0" encoding="utf-8"?>
+<p:sld xmlns:a="http://schemas.openxmlformats.org/drawingml/2006/main" xmlns:r="http://schemas.openxmlformats.org/officeDocument/2006/relationships" xmlns:p="http://schemas.openxmlformats.org/presentationml/2006/main">
+  <p:cSld>
+    <p:spTree>
+      <p:nvGrpSpPr>
+        <p:cNvPr id="1" name=""/>
+        <p:cNvGrpSpPr/>
+        <p:nvPr/>
+      </p:nvGrpSpPr>
+      <p:grpSpPr>
+        <a:xfrm>
+          <a:off x="0" y="0"/>
+          <a:ext cx="0" cy="0"/>
+          <a:chOff x="0" y="0"/>
+          <a:chExt cx="0" cy="0"/>
+        </a:xfrm>
+      </p:grpSpPr>
+      <p:sp>
+        <p:nvSpPr>
+          <p:cNvPr id="2" name="Title 1"/>
+          <p:cNvSpPr>
+            <a:spLocks noGrp="1"/>
+          </p:cNvSpPr>
+          <p:nvPr>
+            <p:ph type="title"/>
+          </p:nvPr>
+        </p:nvSpPr>
+        <p:spPr/>
+        <p:txBody>
+          <a:bodyPr/>
+          <a:lstStyle/>
+          <a:p>
+            <a:r>
+              <a:rPr lang="en-US" dirty="0" smtClean="0"/>
+              <a:t>LKUP_WORKFLOW_TYP</a:t>
+            </a:r>
+            <a:endParaRPr lang="en-US" dirty="0"/>
+          </a:p>
+        </p:txBody>
+      </p:sp>
+      <p:sp>
+        <p:nvSpPr>
+          <p:cNvPr id="3" name="Content Placeholder 2"/>
+          <p:cNvSpPr>
+            <a:spLocks noGrp="1"/>
+          </p:cNvSpPr>
+          <p:nvPr>
+            <p:ph idx="1"/>
+          </p:nvPr>
+        </p:nvSpPr>
+        <p:spPr/>
+        <p:txBody>
+          <a:bodyPr>
+            <a:normAutofit fontScale="92500" lnSpcReduction="10000"/>
+          </a:bodyPr>
+          <a:lstStyle/>
+          <a:p>
+            <a:r>
+              <a:rPr lang="en-US" dirty="0" smtClean="0"/>
+              <a:t>Defines the various workflows that may be initiated and tracked by the system.</a:t>
+            </a:r>
+          </a:p>
+          <a:p>
+            <a:r>
+              <a:rPr lang="en-US" dirty="0" smtClean="0"/>
+              <a:t>Defines a start state and start event.  The DFA for the workflow is the closure (set of states and transitions) reachable from the start state.</a:t>
+            </a:r>
+          </a:p>
+          <a:p>
+            <a:r>
+              <a:rPr lang="en-US" dirty="0" smtClean="0"/>
+              <a:t>Multiple workflows may share the same start state or have overlapping (non empty intersection of) closures.  This improves maintainability of workflows that are the same or similar.  A single change updates all identically.</a:t>
+            </a:r>
+            <a:endParaRPr lang="en-US" dirty="0"/>
+          </a:p>
+        </p:txBody>
+      </p:sp>
+      <p:sp>
+        <p:nvSpPr>
+          <p:cNvPr id="4" name="Slide Number Placeholder 3"/>
+          <p:cNvSpPr>
+            <a:spLocks noGrp="1"/>
+          </p:cNvSpPr>
+          <p:nvPr>
+            <p:ph type="sldNum" sz="quarter" idx="12"/>
+          </p:nvPr>
+        </p:nvSpPr>
+        <p:spPr/>
+        <p:txBody>
+          <a:bodyPr/>
+          <a:lstStyle/>
+          <a:p>
+            <a:fld id="{B6F15528-21DE-4FAA-801E-634DDDAF4B2B}" type="slidenum">
+              <a:rPr lang="en-US" smtClean="0"/>
+              <a:pPr/>
+              <a:t>13</a:t>
+            </a:fld>
+            <a:endParaRPr lang="en-US"/>
+          </a:p>
+        </p:txBody>
+      </p:sp>
+    </p:spTree>
+    <p:extLst>
+      <p:ext uri="{BB962C8B-B14F-4D97-AF65-F5344CB8AC3E}">
+        <p14:creationId xmlns:p14="http://schemas.microsoft.com/office/powerpoint/2010/main" val="3971495940"/>
+      </p:ext>
+    </p:extLst>
+  </p:cSld>
+  <p:clrMapOvr>
+    <a:masterClrMapping/>
+  </p:clrMapOvr>
+</p:sld>
+</file>
+
+<file path=ppt/slides/slide14.xml><?xml version="1.0" encoding="utf-8"?>
+<p:sld xmlns:a="http://schemas.openxmlformats.org/drawingml/2006/main" xmlns:r="http://schemas.openxmlformats.org/officeDocument/2006/relationships" xmlns:p="http://schemas.openxmlformats.org/presentationml/2006/main">
+  <p:cSld>
+    <p:spTree>
+      <p:nvGrpSpPr>
+        <p:cNvPr id="1" name=""/>
+        <p:cNvGrpSpPr/>
+        <p:nvPr/>
+      </p:nvGrpSpPr>
+      <p:grpSpPr>
+        <a:xfrm>
+          <a:off x="0" y="0"/>
+          <a:ext cx="0" cy="0"/>
+          <a:chOff x="0" y="0"/>
+          <a:chExt cx="0" cy="0"/>
+        </a:xfrm>
+      </p:grpSpPr>
+      <p:sp>
+        <p:nvSpPr>
+          <p:cNvPr id="2" name="Title 1"/>
+          <p:cNvSpPr>
+            <a:spLocks noGrp="1"/>
+          </p:cNvSpPr>
+          <p:nvPr>
+            <p:ph type="title"/>
+          </p:nvPr>
+        </p:nvSpPr>
+        <p:spPr/>
+        <p:txBody>
+          <a:bodyPr>
+            <a:normAutofit fontScale="90000"/>
+          </a:bodyPr>
+          <a:lstStyle/>
+          <a:p>
+            <a:r>
+              <a:rPr lang="en-US" dirty="0" smtClean="0"/>
+              <a:t>Examples of Workflows That Share States</a:t>
+            </a:r>
+            <a:endParaRPr lang="en-US" dirty="0"/>
+          </a:p>
+        </p:txBody>
+      </p:sp>
+      <p:sp>
+        <p:nvSpPr>
+          <p:cNvPr id="3" name="Content Placeholder 2"/>
+          <p:cNvSpPr>
+            <a:spLocks noGrp="1"/>
+          </p:cNvSpPr>
+          <p:nvPr>
+            <p:ph idx="1"/>
+          </p:nvPr>
+        </p:nvSpPr>
+        <p:spPr/>
+        <p:txBody>
+          <a:bodyPr/>
+          <a:lstStyle/>
+          <a:p>
+            <a:endParaRPr lang="en-US" dirty="0"/>
+          </a:p>
+        </p:txBody>
+      </p:sp>
+      <p:sp>
+        <p:nvSpPr>
+          <p:cNvPr id="4" name="Slide Number Placeholder 3"/>
+          <p:cNvSpPr>
+            <a:spLocks noGrp="1"/>
+          </p:cNvSpPr>
+          <p:nvPr>
+            <p:ph type="sldNum" sz="quarter" idx="12"/>
+          </p:nvPr>
+        </p:nvSpPr>
+        <p:spPr/>
+        <p:txBody>
+          <a:bodyPr/>
+          <a:lstStyle/>
+          <a:p>
+            <a:fld id="{B6F15528-21DE-4FAA-801E-634DDDAF4B2B}" type="slidenum">
+              <a:rPr lang="en-US" smtClean="0"/>
+              <a:pPr/>
+              <a:t>14</a:t>
+            </a:fld>
+            <a:endParaRPr lang="en-US"/>
+          </a:p>
+        </p:txBody>
+      </p:sp>
+    </p:spTree>
+    <p:extLst>
+      <p:ext uri="{BB962C8B-B14F-4D97-AF65-F5344CB8AC3E}">
+        <p14:creationId xmlns:p14="http://schemas.microsoft.com/office/powerpoint/2010/main" val="1047993362"/>
+      </p:ext>
+    </p:extLst>
+  </p:cSld>
+  <p:clrMapOvr>
+    <a:masterClrMapping/>
+  </p:clrMapOvr>
+</p:sld>
+</file>
+
+<file path=ppt/slides/slide15.xml><?xml version="1.0" encoding="utf-8"?>
+<p:sld xmlns:a="http://schemas.openxmlformats.org/drawingml/2006/main" xmlns:r="http://schemas.openxmlformats.org/officeDocument/2006/relationships" xmlns:p="http://schemas.openxmlformats.org/presentationml/2006/main">
+  <p:cSld>
+    <p:spTree>
+      <p:nvGrpSpPr>
+        <p:cNvPr id="1" name=""/>
+        <p:cNvGrpSpPr/>
+        <p:nvPr/>
+      </p:nvGrpSpPr>
+      <p:grpSpPr>
+        <a:xfrm>
+          <a:off x="0" y="0"/>
+          <a:ext cx="0" cy="0"/>
+          <a:chOff x="0" y="0"/>
+          <a:chExt cx="0" cy="0"/>
+        </a:xfrm>
+      </p:grpSpPr>
+      <p:sp>
+        <p:nvSpPr>
+          <p:cNvPr id="2" name="Title 1"/>
+          <p:cNvSpPr>
+            <a:spLocks noGrp="1"/>
+          </p:cNvSpPr>
+          <p:nvPr>
+            <p:ph type="title"/>
+          </p:nvPr>
+        </p:nvSpPr>
+        <p:spPr/>
+        <p:txBody>
+          <a:bodyPr/>
+          <a:lstStyle/>
+          <a:p>
+            <a:r>
+              <a:rPr lang="en-US" dirty="0" smtClean="0"/>
+              <a:t>DFA_WORKFLOW</a:t>
+            </a:r>
+            <a:endParaRPr lang="en-US" dirty="0"/>
+          </a:p>
+        </p:txBody>
+      </p:sp>
+      <p:sp>
+        <p:nvSpPr>
+          <p:cNvPr id="3" name="Content Placeholder 2"/>
+          <p:cNvSpPr>
+            <a:spLocks noGrp="1"/>
+          </p:cNvSpPr>
+          <p:nvPr>
+            <p:ph idx="1"/>
+          </p:nvPr>
+        </p:nvSpPr>
+        <p:spPr>
+          <a:xfrm>
+            <a:off x="457200" y="1295400"/>
+            <a:ext cx="8229600" cy="5060950"/>
+          </a:xfrm>
+        </p:spPr>
+        <p:txBody>
+          <a:bodyPr>
+            <a:normAutofit lnSpcReduction="10000"/>
+          </a:bodyPr>
+          <a:lstStyle/>
+          <a:p>
+            <a:r>
+              <a:rPr lang="en-US" dirty="0" smtClean="0"/>
+              <a:t>Defines an instance of a given workflow from LKUP_WORKFLOW_TYP.</a:t>
+            </a:r>
+          </a:p>
+          <a:p>
+            <a:r>
+              <a:rPr lang="en-US" dirty="0" smtClean="0"/>
+              <a:t>Has comments that apply to the origination and entire workflow.</a:t>
+            </a:r>
+          </a:p>
+          <a:p>
+            <a:r>
+              <a:rPr lang="en-US" dirty="0" smtClean="0"/>
+              <a:t>May be spawned from another DFA state.</a:t>
+            </a:r>
+          </a:p>
+          <a:p>
+            <a:r>
+              <a:rPr lang="en-US" dirty="0" smtClean="0"/>
+              <a:t>If spawned, may be specified as a sub workflow.</a:t>
+            </a:r>
+          </a:p>
+          <a:p>
+            <a:r>
+              <a:rPr lang="en-US" dirty="0" smtClean="0"/>
+              <a:t>When all sub-workflows in a given state are completed, the parent workflow is sent the event </a:t>
+            </a:r>
+            <a:r>
+              <a:rPr lang="en-US" cap="small" dirty="0" smtClean="0"/>
+              <a:t>sub workflows complete.</a:t>
+            </a:r>
+            <a:endParaRPr lang="en-US" dirty="0" smtClean="0"/>
+          </a:p>
+          <a:p>
+            <a:endParaRPr lang="en-US" dirty="0"/>
+          </a:p>
+        </p:txBody>
+      </p:sp>
+      <p:sp>
+        <p:nvSpPr>
+          <p:cNvPr id="4" name="Slide Number Placeholder 3"/>
+          <p:cNvSpPr>
+            <a:spLocks noGrp="1"/>
+          </p:cNvSpPr>
+          <p:nvPr>
+            <p:ph type="sldNum" sz="quarter" idx="12"/>
+          </p:nvPr>
+        </p:nvSpPr>
+        <p:spPr/>
+        <p:txBody>
+          <a:bodyPr/>
+          <a:lstStyle/>
+          <a:p>
+            <a:fld id="{B6F15528-21DE-4FAA-801E-634DDDAF4B2B}" type="slidenum">
+              <a:rPr lang="en-US" smtClean="0"/>
+              <a:pPr/>
+              <a:t>15</a:t>
+            </a:fld>
+            <a:endParaRPr lang="en-US"/>
+          </a:p>
+        </p:txBody>
+      </p:sp>
+    </p:spTree>
+    <p:extLst>
+      <p:ext uri="{BB962C8B-B14F-4D97-AF65-F5344CB8AC3E}">
+        <p14:creationId xmlns:p14="http://schemas.microsoft.com/office/powerpoint/2010/main" val="1749666348"/>
+      </p:ext>
+    </p:extLst>
+  </p:cSld>
+  <p:clrMapOvr>
+    <a:masterClrMapping/>
+  </p:clrMapOvr>
+</p:sld>
+</file>
+
+<file path=ppt/slides/slide16.xml><?xml version="1.0" encoding="utf-8"?>
+<p:sld xmlns:a="http://schemas.openxmlformats.org/drawingml/2006/main" xmlns:r="http://schemas.openxmlformats.org/officeDocument/2006/relationships" xmlns:p="http://schemas.openxmlformats.org/presentationml/2006/main">
+  <p:cSld>
+    <p:spTree>
+      <p:nvGrpSpPr>
+        <p:cNvPr id="1" name=""/>
+        <p:cNvGrpSpPr/>
+        <p:nvPr/>
+      </p:nvGrpSpPr>
+      <p:grpSpPr>
+        <a:xfrm>
+          <a:off x="0" y="0"/>
+          <a:ext cx="0" cy="0"/>
+          <a:chOff x="0" y="0"/>
+          <a:chExt cx="0" cy="0"/>
+        </a:xfrm>
+      </p:grpSpPr>
+      <p:sp>
+        <p:nvSpPr>
+          <p:cNvPr id="2" name="Title 1"/>
+          <p:cNvSpPr>
+            <a:spLocks noGrp="1"/>
+          </p:cNvSpPr>
+          <p:nvPr>
+            <p:ph type="title"/>
+          </p:nvPr>
+        </p:nvSpPr>
+        <p:spPr/>
+        <p:txBody>
+          <a:bodyPr/>
+          <a:lstStyle/>
+          <a:p>
+            <a:r>
+              <a:rPr lang="en-US" dirty="0" smtClean="0"/>
+              <a:t>DFA_WORKFLOW_STATE</a:t>
+            </a:r>
+            <a:endParaRPr lang="en-US" dirty="0"/>
+          </a:p>
+        </p:txBody>
+      </p:sp>
+      <p:sp>
+        <p:nvSpPr>
+          <p:cNvPr id="3" name="Content Placeholder 2"/>
+          <p:cNvSpPr>
+            <a:spLocks noGrp="1"/>
+          </p:cNvSpPr>
+          <p:nvPr>
+            <p:ph idx="1"/>
+          </p:nvPr>
+        </p:nvSpPr>
+        <p:spPr/>
+        <p:txBody>
+          <a:bodyPr/>
+          <a:lstStyle/>
+          <a:p>
+            <a:endParaRPr lang="en-US" dirty="0"/>
+          </a:p>
+        </p:txBody>
+      </p:sp>
+      <p:sp>
+        <p:nvSpPr>
+          <p:cNvPr id="4" name="Slide Number Placeholder 3"/>
+          <p:cNvSpPr>
+            <a:spLocks noGrp="1"/>
+          </p:cNvSpPr>
+          <p:nvPr>
+            <p:ph type="sldNum" sz="quarter" idx="12"/>
+          </p:nvPr>
+        </p:nvSpPr>
+        <p:spPr/>
+        <p:txBody>
+          <a:bodyPr/>
+          <a:lstStyle/>
+          <a:p>
+            <a:fld id="{B6F15528-21DE-4FAA-801E-634DDDAF4B2B}" type="slidenum">
+              <a:rPr lang="en-US" smtClean="0"/>
+              <a:pPr/>
+              <a:t>16</a:t>
+            </a:fld>
+            <a:endParaRPr lang="en-US"/>
+          </a:p>
+        </p:txBody>
+      </p:sp>
+    </p:spTree>
+    <p:extLst>
+      <p:ext uri="{BB962C8B-B14F-4D97-AF65-F5344CB8AC3E}">
+        <p14:creationId xmlns:p14="http://schemas.microsoft.com/office/powerpoint/2010/main" val="3039388721"/>
       </p:ext>
     </p:extLst>
   </p:cSld>
@@ -4457,11 +5058,7 @@
           <a:p>
             <a:r>
               <a:rPr lang="en-US" dirty="0" smtClean="0"/>
-              <a:t>Event Driven Deterministic Finite </a:t>
-            </a:r>
-            <a:r>
-              <a:rPr lang="en-US" dirty="0" smtClean="0"/>
-              <a:t>Automata (DFA)</a:t>
+              <a:t>Event Driven Deterministic Finite Automata (DFA)</a:t>
             </a:r>
             <a:endParaRPr lang="en-US" dirty="0"/>
           </a:p>
@@ -4574,10 +5171,9 @@
           <a:lstStyle/>
           <a:p>
             <a:r>
-              <a:rPr lang="en-US" dirty="0" smtClean="0"/>
-              <a:t>Graph Theoretical Model</a:t>
-            </a:r>
-            <a:endParaRPr lang="en-US" dirty="0"/>
+              <a:rPr lang="en-US" dirty="0"/>
+              <a:t>Theoretical Graph Model</a:t>
+            </a:r>
           </a:p>
         </p:txBody>
       </p:sp>
@@ -4599,19 +5195,27 @@
         </p:spPr>
         <p:txBody>
           <a:bodyPr>
-            <a:normAutofit fontScale="92500" lnSpcReduction="20000"/>
+            <a:normAutofit lnSpcReduction="10000"/>
           </a:bodyPr>
           <a:lstStyle/>
           <a:p>
             <a:r>
               <a:rPr lang="en-US" dirty="0" smtClean="0"/>
-              <a:t>All of the DFA states exist in a graph.</a:t>
-            </a:r>
-          </a:p>
-          <a:p>
-            <a:r>
-              <a:rPr lang="en-US" dirty="0" smtClean="0"/>
-              <a:t>Each DFA state may connect to zero or more states (including itself) with vertices associated with events.</a:t>
+              <a:t>All of the DFA states exist in a graph</a:t>
+            </a:r>
+            <a:r>
+              <a:rPr lang="en-US" dirty="0"/>
+              <a:t> </a:t>
+            </a:r>
+            <a:r>
+              <a:rPr lang="en-US" dirty="0" smtClean="0"/>
+              <a:t>of states with vertices labelled with events.</a:t>
+            </a:r>
+          </a:p>
+          <a:p>
+            <a:r>
+              <a:rPr lang="en-US" dirty="0" smtClean="0"/>
+              <a:t>Each DFA state may connect to zero or more states (including itself).</a:t>
             </a:r>
           </a:p>
           <a:p>
@@ -4623,7 +5227,7 @@
           <a:p>
             <a:r>
               <a:rPr lang="en-US" dirty="0" smtClean="0"/>
-              <a:t>A workflow is an entry point at a specific state.  </a:t>
+              <a:t>A workflow defines a start state.  </a:t>
             </a:r>
           </a:p>
           <a:p>
@@ -4635,7 +5239,7 @@
           <a:p>
             <a:r>
               <a:rPr lang="en-US" dirty="0" smtClean="0"/>
-              <a:t>When working with a workflow, it is useful to view it as a graph defined by the closure of its entry point.</a:t>
+              <a:t>The closure of a workflow </a:t>
             </a:r>
           </a:p>
         </p:txBody>
@@ -4707,13 +5311,13 @@
         <p:spPr/>
         <p:txBody>
           <a:bodyPr>
-            <a:normAutofit fontScale="90000"/>
+            <a:normAutofit/>
           </a:bodyPr>
           <a:lstStyle/>
           <a:p>
             <a:r>
               <a:rPr lang="en-US" dirty="0" smtClean="0"/>
-              <a:t>Database Representation of an Event Driven DFA</a:t>
+              <a:t>Database DFA Schema</a:t>
             </a:r>
             <a:endParaRPr lang="en-US" dirty="0"/>
           </a:p>

</xml_diff>

<commit_message>
Slides added / changed at home.
</commit_message>
<xml_diff>
--- a/Modeling Workflows with Event Driven DFA.pptx
+++ b/Modeling Workflows with Event Driven DFA.pptx
@@ -223,7 +223,7 @@
           <a:p>
             <a:fld id="{D0F15B3C-1181-4445-BB6A-6BED1DF2958C}" type="datetimeFigureOut">
               <a:rPr lang="en-US" smtClean="0"/>
-              <a:t>3/21/2015</a:t>
+              <a:t>3/23/2015</a:t>
             </a:fld>
             <a:endParaRPr lang="en-US"/>
           </a:p>
@@ -840,7 +840,7 @@
           <a:p>
             <a:fld id="{2927DE08-9B48-44D6-83D4-230A82F93FAE}" type="datetime1">
               <a:rPr lang="en-US" smtClean="0"/>
-              <a:t>3/21/2015</a:t>
+              <a:t>3/23/2015</a:t>
             </a:fld>
             <a:endParaRPr lang="en-US"/>
           </a:p>
@@ -1006,7 +1006,7 @@
           <a:p>
             <a:fld id="{5D95C52C-C3C1-4927-8E70-C103DE1C3321}" type="datetime1">
               <a:rPr lang="en-US" smtClean="0"/>
-              <a:t>3/21/2015</a:t>
+              <a:t>3/23/2015</a:t>
             </a:fld>
             <a:endParaRPr lang="en-US"/>
           </a:p>
@@ -1182,7 +1182,7 @@
           <a:p>
             <a:fld id="{90E3D6A5-38A1-4FEC-A43A-47F48DEDEFD3}" type="datetime1">
               <a:rPr lang="en-US" smtClean="0"/>
-              <a:t>3/21/2015</a:t>
+              <a:t>3/23/2015</a:t>
             </a:fld>
             <a:endParaRPr lang="en-US"/>
           </a:p>
@@ -1348,7 +1348,7 @@
           <a:p>
             <a:fld id="{D8E26438-717D-40FF-AE1C-BA0484F53167}" type="datetime1">
               <a:rPr lang="en-US" smtClean="0"/>
-              <a:t>3/21/2015</a:t>
+              <a:t>3/23/2015</a:t>
             </a:fld>
             <a:endParaRPr lang="en-US"/>
           </a:p>
@@ -1590,7 +1590,7 @@
           <a:p>
             <a:fld id="{204240F7-7708-4F95-8DF5-779CE1EBFAFE}" type="datetime1">
               <a:rPr lang="en-US" smtClean="0"/>
-              <a:t>3/21/2015</a:t>
+              <a:t>3/23/2015</a:t>
             </a:fld>
             <a:endParaRPr lang="en-US"/>
           </a:p>
@@ -1874,7 +1874,7 @@
           <a:p>
             <a:fld id="{9AB1B8F5-007F-4624-9D09-74A4BB144A1B}" type="datetime1">
               <a:rPr lang="en-US" smtClean="0"/>
-              <a:t>3/21/2015</a:t>
+              <a:t>3/23/2015</a:t>
             </a:fld>
             <a:endParaRPr lang="en-US"/>
           </a:p>
@@ -2292,7 +2292,7 @@
           <a:p>
             <a:fld id="{33652302-F773-471B-A447-C9E7D11FB526}" type="datetime1">
               <a:rPr lang="en-US" smtClean="0"/>
-              <a:t>3/21/2015</a:t>
+              <a:t>3/23/2015</a:t>
             </a:fld>
             <a:endParaRPr lang="en-US"/>
           </a:p>
@@ -2406,7 +2406,7 @@
           <a:p>
             <a:fld id="{505FC5C8-7D30-45A5-B6D7-01D5FFF04AAA}" type="datetime1">
               <a:rPr lang="en-US" smtClean="0"/>
-              <a:t>3/21/2015</a:t>
+              <a:t>3/23/2015</a:t>
             </a:fld>
             <a:endParaRPr lang="en-US"/>
           </a:p>
@@ -2497,7 +2497,7 @@
           <a:p>
             <a:fld id="{2203C164-A71A-4152-83A1-27E2B515D187}" type="datetime1">
               <a:rPr lang="en-US" smtClean="0"/>
-              <a:t>3/21/2015</a:t>
+              <a:t>3/23/2015</a:t>
             </a:fld>
             <a:endParaRPr lang="en-US"/>
           </a:p>
@@ -2770,7 +2770,7 @@
           <a:p>
             <a:fld id="{0B77CF3C-9740-4894-A406-34BF11EA8119}" type="datetime1">
               <a:rPr lang="en-US" smtClean="0"/>
-              <a:t>3/21/2015</a:t>
+              <a:t>3/23/2015</a:t>
             </a:fld>
             <a:endParaRPr lang="en-US"/>
           </a:p>
@@ -3019,7 +3019,7 @@
           <a:p>
             <a:fld id="{65AEF08F-C222-4314-9819-054B5D3660D4}" type="datetime1">
               <a:rPr lang="en-US" smtClean="0"/>
-              <a:t>3/21/2015</a:t>
+              <a:t>3/23/2015</a:t>
             </a:fld>
             <a:endParaRPr lang="en-US"/>
           </a:p>
@@ -3228,7 +3228,7 @@
           <a:p>
             <a:fld id="{97CA4D54-662E-4D1F-9D66-59ED33158556}" type="datetime1">
               <a:rPr lang="en-US" smtClean="0"/>
-              <a:t>3/21/2015</a:t>
+              <a:t>3/23/2015</a:t>
             </a:fld>
             <a:endParaRPr lang="en-US"/>
           </a:p>
@@ -4486,6 +4486,32 @@
           <a:bodyPr/>
           <a:lstStyle/>
           <a:p>
+            <a:r>
+              <a:rPr lang="en-US" dirty="0" smtClean="0"/>
+              <a:t>Defines workflow states, including the current workflow state.</a:t>
+            </a:r>
+          </a:p>
+          <a:p>
+            <a:r>
+              <a:rPr lang="en-US" dirty="0" smtClean="0"/>
+              <a:t>Has exactly 1 current workflow state.</a:t>
+            </a:r>
+          </a:p>
+          <a:p>
+            <a:r>
+              <a:rPr lang="en-US" dirty="0" smtClean="0"/>
+              <a:t>May spawn DFA sub-workflows.  This is used to model parallel paths in workflows.</a:t>
+            </a:r>
+          </a:p>
+          <a:p>
+            <a:r>
+              <a:rPr lang="en-US" dirty="0" smtClean="0"/>
+              <a:t>Has comments that apply to the </a:t>
+            </a:r>
+            <a:r>
+              <a:rPr lang="en-US" smtClean="0"/>
+              <a:t>particular state.</a:t>
+            </a:r>
             <a:endParaRPr lang="en-US" dirty="0"/>
           </a:p>
         </p:txBody>

</xml_diff>

<commit_message>
Add discussion about design advantages and scalability of system.  Add A*BC FSM diagram.
</commit_message>
<xml_diff>
--- a/Modeling Workflows with Event Driven DFA.pptx
+++ b/Modeling Workflows with Event Driven DFA.pptx
@@ -5,7 +5,7 @@
     <p:sldMasterId id="2147483648" r:id="rId1"/>
   </p:sldMasterIdLst>
   <p:notesMasterIdLst>
-    <p:notesMasterId r:id="rId18"/>
+    <p:notesMasterId r:id="rId25"/>
   </p:notesMasterIdLst>
   <p:sldIdLst>
     <p:sldId id="256" r:id="rId2"/>
@@ -14,16 +14,23 @@
     <p:sldId id="259" r:id="rId5"/>
     <p:sldId id="260" r:id="rId6"/>
     <p:sldId id="261" r:id="rId7"/>
-    <p:sldId id="265" r:id="rId8"/>
-    <p:sldId id="262" r:id="rId9"/>
-    <p:sldId id="263" r:id="rId10"/>
-    <p:sldId id="268" r:id="rId11"/>
-    <p:sldId id="264" r:id="rId12"/>
-    <p:sldId id="266" r:id="rId13"/>
-    <p:sldId id="267" r:id="rId14"/>
-    <p:sldId id="269" r:id="rId15"/>
-    <p:sldId id="270" r:id="rId16"/>
-    <p:sldId id="271" r:id="rId17"/>
+    <p:sldId id="274" r:id="rId8"/>
+    <p:sldId id="273" r:id="rId9"/>
+    <p:sldId id="275" r:id="rId10"/>
+    <p:sldId id="272" r:id="rId11"/>
+    <p:sldId id="265" r:id="rId12"/>
+    <p:sldId id="262" r:id="rId13"/>
+    <p:sldId id="263" r:id="rId14"/>
+    <p:sldId id="268" r:id="rId15"/>
+    <p:sldId id="264" r:id="rId16"/>
+    <p:sldId id="266" r:id="rId17"/>
+    <p:sldId id="267" r:id="rId18"/>
+    <p:sldId id="269" r:id="rId19"/>
+    <p:sldId id="270" r:id="rId20"/>
+    <p:sldId id="271" r:id="rId21"/>
+    <p:sldId id="276" r:id="rId22"/>
+    <p:sldId id="278" r:id="rId23"/>
+    <p:sldId id="277" r:id="rId24"/>
   </p:sldIdLst>
   <p:sldSz cx="9144000" cy="6858000" type="screen4x3"/>
   <p:notesSz cx="6858000" cy="9144000"/>
@@ -223,7 +230,7 @@
           <a:p>
             <a:fld id="{D0F15B3C-1181-4445-BB6A-6BED1DF2958C}" type="datetimeFigureOut">
               <a:rPr lang="en-US" smtClean="0"/>
-              <a:t>3/23/2015</a:t>
+              <a:t>3/24/2015</a:t>
             </a:fld>
             <a:endParaRPr lang="en-US"/>
           </a:p>
@@ -840,7 +847,7 @@
           <a:p>
             <a:fld id="{2927DE08-9B48-44D6-83D4-230A82F93FAE}" type="datetime1">
               <a:rPr lang="en-US" smtClean="0"/>
-              <a:t>3/23/2015</a:t>
+              <a:t>3/24/2015</a:t>
             </a:fld>
             <a:endParaRPr lang="en-US"/>
           </a:p>
@@ -1006,7 +1013,7 @@
           <a:p>
             <a:fld id="{5D95C52C-C3C1-4927-8E70-C103DE1C3321}" type="datetime1">
               <a:rPr lang="en-US" smtClean="0"/>
-              <a:t>3/23/2015</a:t>
+              <a:t>3/24/2015</a:t>
             </a:fld>
             <a:endParaRPr lang="en-US"/>
           </a:p>
@@ -1182,7 +1189,7 @@
           <a:p>
             <a:fld id="{90E3D6A5-38A1-4FEC-A43A-47F48DEDEFD3}" type="datetime1">
               <a:rPr lang="en-US" smtClean="0"/>
-              <a:t>3/23/2015</a:t>
+              <a:t>3/24/2015</a:t>
             </a:fld>
             <a:endParaRPr lang="en-US"/>
           </a:p>
@@ -1348,7 +1355,7 @@
           <a:p>
             <a:fld id="{D8E26438-717D-40FF-AE1C-BA0484F53167}" type="datetime1">
               <a:rPr lang="en-US" smtClean="0"/>
-              <a:t>3/23/2015</a:t>
+              <a:t>3/24/2015</a:t>
             </a:fld>
             <a:endParaRPr lang="en-US"/>
           </a:p>
@@ -1590,7 +1597,7 @@
           <a:p>
             <a:fld id="{204240F7-7708-4F95-8DF5-779CE1EBFAFE}" type="datetime1">
               <a:rPr lang="en-US" smtClean="0"/>
-              <a:t>3/23/2015</a:t>
+              <a:t>3/24/2015</a:t>
             </a:fld>
             <a:endParaRPr lang="en-US"/>
           </a:p>
@@ -1874,7 +1881,7 @@
           <a:p>
             <a:fld id="{9AB1B8F5-007F-4624-9D09-74A4BB144A1B}" type="datetime1">
               <a:rPr lang="en-US" smtClean="0"/>
-              <a:t>3/23/2015</a:t>
+              <a:t>3/24/2015</a:t>
             </a:fld>
             <a:endParaRPr lang="en-US"/>
           </a:p>
@@ -2292,7 +2299,7 @@
           <a:p>
             <a:fld id="{33652302-F773-471B-A447-C9E7D11FB526}" type="datetime1">
               <a:rPr lang="en-US" smtClean="0"/>
-              <a:t>3/23/2015</a:t>
+              <a:t>3/24/2015</a:t>
             </a:fld>
             <a:endParaRPr lang="en-US"/>
           </a:p>
@@ -2406,7 +2413,7 @@
           <a:p>
             <a:fld id="{505FC5C8-7D30-45A5-B6D7-01D5FFF04AAA}" type="datetime1">
               <a:rPr lang="en-US" smtClean="0"/>
-              <a:t>3/23/2015</a:t>
+              <a:t>3/24/2015</a:t>
             </a:fld>
             <a:endParaRPr lang="en-US"/>
           </a:p>
@@ -2497,7 +2504,7 @@
           <a:p>
             <a:fld id="{2203C164-A71A-4152-83A1-27E2B515D187}" type="datetime1">
               <a:rPr lang="en-US" smtClean="0"/>
-              <a:t>3/23/2015</a:t>
+              <a:t>3/24/2015</a:t>
             </a:fld>
             <a:endParaRPr lang="en-US"/>
           </a:p>
@@ -2770,7 +2777,7 @@
           <a:p>
             <a:fld id="{0B77CF3C-9740-4894-A406-34BF11EA8119}" type="datetime1">
               <a:rPr lang="en-US" smtClean="0"/>
-              <a:t>3/23/2015</a:t>
+              <a:t>3/24/2015</a:t>
             </a:fld>
             <a:endParaRPr lang="en-US"/>
           </a:p>
@@ -3019,7 +3026,7 @@
           <a:p>
             <a:fld id="{65AEF08F-C222-4314-9819-054B5D3660D4}" type="datetime1">
               <a:rPr lang="en-US" smtClean="0"/>
-              <a:t>3/23/2015</a:t>
+              <a:t>3/24/2015</a:t>
             </a:fld>
             <a:endParaRPr lang="en-US"/>
           </a:p>
@@ -3228,7 +3235,7 @@
           <a:p>
             <a:fld id="{97CA4D54-662E-4D1F-9D66-59ED33158556}" type="datetime1">
               <a:rPr lang="en-US" smtClean="0"/>
-              <a:t>3/23/2015</a:t>
+              <a:t>3/24/2015</a:t>
             </a:fld>
             <a:endParaRPr lang="en-US"/>
           </a:p>
@@ -3712,12 +3719,14 @@
         </p:nvSpPr>
         <p:spPr/>
         <p:txBody>
-          <a:bodyPr/>
-          <a:lstStyle/>
-          <a:p>
-            <a:r>
-              <a:rPr lang="en-US" dirty="0" smtClean="0"/>
-              <a:t>Event Sources</a:t>
+          <a:bodyPr>
+            <a:normAutofit fontScale="90000"/>
+          </a:bodyPr>
+          <a:lstStyle/>
+          <a:p>
+            <a:r>
+              <a:rPr lang="en-US" dirty="0" smtClean="0"/>
+              <a:t>Scalability of a Database DFA implementation</a:t>
             </a:r>
             <a:endParaRPr lang="en-US" dirty="0"/>
           </a:p>
@@ -3733,66 +3742,36 @@
             <p:ph idx="1"/>
           </p:nvPr>
         </p:nvSpPr>
-        <p:spPr>
-          <a:xfrm>
-            <a:off x="457200" y="1219200"/>
-            <a:ext cx="8229600" cy="5137150"/>
-          </a:xfrm>
-        </p:spPr>
+        <p:spPr/>
         <p:txBody>
           <a:bodyPr>
-            <a:normAutofit fontScale="92500"/>
+            <a:normAutofit fontScale="85000" lnSpcReduction="20000"/>
           </a:bodyPr>
           <a:lstStyle/>
           <a:p>
             <a:r>
               <a:rPr lang="en-US" dirty="0" smtClean="0"/>
-              <a:t>Direct User Input to apply an event (action) to a specific workflow.  Example: Manager approves pay raise.</a:t>
-            </a:r>
-          </a:p>
-          <a:p>
-            <a:r>
-              <a:rPr lang="en-US" dirty="0" smtClean="0"/>
-              <a:t>Application updates.  Example: Employee salary update results in a </a:t>
-            </a:r>
-            <a:r>
-              <a:rPr lang="en-US" cap="small" dirty="0" smtClean="0"/>
-              <a:t>salary change</a:t>
-            </a:r>
-            <a:r>
-              <a:rPr lang="en-US" dirty="0"/>
-              <a:t> </a:t>
-            </a:r>
-            <a:r>
-              <a:rPr lang="en-US" dirty="0" smtClean="0"/>
-              <a:t>event.</a:t>
-            </a:r>
-          </a:p>
-          <a:p>
-            <a:r>
-              <a:rPr lang="en-US" dirty="0" smtClean="0"/>
-              <a:t>Services (SOA).  Example: A request to a notification system may be sent due to a salary change resulting in a </a:t>
-            </a:r>
-            <a:r>
-              <a:rPr lang="en-US" cap="small" dirty="0" smtClean="0"/>
-              <a:t>employee notify</a:t>
-            </a:r>
-            <a:r>
-              <a:rPr lang="en-US" dirty="0" smtClean="0"/>
-              <a:t> event.</a:t>
-            </a:r>
-          </a:p>
-          <a:p>
-            <a:r>
-              <a:rPr lang="en-US" dirty="0" smtClean="0"/>
-              <a:t>Extract, Transform and Load (ETL) system.</a:t>
-            </a:r>
-          </a:p>
-          <a:p>
-            <a:r>
-              <a:rPr lang="en-US" dirty="0" smtClean="0"/>
-              <a:t>Another workflow, especially a parent workflow.</a:t>
-            </a:r>
+              <a:t>A large number of states and transitions may be manipulated by a relatively small program.  Adding states and transitions does not increase the size of the program.</a:t>
+            </a:r>
+          </a:p>
+          <a:p>
+            <a:r>
+              <a:rPr lang="en-US" dirty="0" smtClean="0"/>
+              <a:t>An interactive program only has to load information about the current state that is being manipulated.  An event source only needs to send its event.</a:t>
+            </a:r>
+          </a:p>
+          <a:p>
+            <a:r>
+              <a:rPr lang="en-US" dirty="0" smtClean="0"/>
+              <a:t>A stored procedure processes events sent to it directly on the database.  This avoids the network overhead that a client program would entail.</a:t>
+            </a:r>
+          </a:p>
+          <a:p>
+            <a:r>
+              <a:rPr lang="en-US" dirty="0" smtClean="0"/>
+              <a:t>For a given set of states and transitions, the next state for a given event is computed in constant O(1) time.</a:t>
+            </a:r>
+            <a:endParaRPr lang="en-US" dirty="0"/>
           </a:p>
         </p:txBody>
       </p:sp>
@@ -3823,7 +3802,7 @@
     </p:spTree>
     <p:extLst>
       <p:ext uri="{BB962C8B-B14F-4D97-AF65-F5344CB8AC3E}">
-        <p14:creationId xmlns:p14="http://schemas.microsoft.com/office/powerpoint/2010/main" val="690021978"/>
+        <p14:creationId xmlns:p14="http://schemas.microsoft.com/office/powerpoint/2010/main" val="502454993"/>
       </p:ext>
     </p:extLst>
   </p:cSld>
@@ -3862,14 +3841,15 @@
         </p:nvSpPr>
         <p:spPr/>
         <p:txBody>
-          <a:bodyPr/>
-          <a:lstStyle/>
-          <a:p>
-            <a:r>
-              <a:rPr lang="en-US" dirty="0" smtClean="0"/>
-              <a:t>LKUP_STATE</a:t>
-            </a:r>
-            <a:endParaRPr lang="en-US" dirty="0"/>
+          <a:bodyPr>
+            <a:normAutofit/>
+          </a:bodyPr>
+          <a:lstStyle/>
+          <a:p>
+            <a:r>
+              <a:rPr lang="en-US" dirty="0"/>
+              <a:t>Theoretical Graph Model</a:t>
+            </a:r>
           </a:p>
         </p:txBody>
       </p:sp>
@@ -3883,46 +3863,60 @@
             <p:ph idx="1"/>
           </p:nvPr>
         </p:nvSpPr>
-        <p:spPr/>
-        <p:txBody>
-          <a:bodyPr/>
-          <a:lstStyle/>
-          <a:p>
-            <a:r>
-              <a:rPr lang="en-US" dirty="0" smtClean="0"/>
-              <a:t>Defines the DFA states.</a:t>
-            </a:r>
-          </a:p>
-          <a:p>
-            <a:r>
-              <a:rPr lang="en-US" dirty="0" smtClean="0"/>
-              <a:t>Defines display name (or key).</a:t>
-            </a:r>
-          </a:p>
-          <a:p>
-            <a:r>
-              <a:rPr lang="en-US" dirty="0" smtClean="0"/>
-              <a:t>May define an expected event.</a:t>
-            </a:r>
-          </a:p>
-          <a:p>
-            <a:r>
-              <a:rPr lang="en-US" dirty="0" smtClean="0"/>
-              <a:t>Has constraints that must be satisfied to enter.</a:t>
-            </a:r>
-          </a:p>
-          <a:p>
-            <a:r>
-              <a:rPr lang="en-US" dirty="0" smtClean="0"/>
-              <a:t>May define an alternate state that is tried if constraints are unsatisfied.</a:t>
-            </a:r>
-          </a:p>
-          <a:p>
-            <a:r>
-              <a:rPr lang="en-US" dirty="0" smtClean="0"/>
-              <a:t>Constraints + alternate states are a way to implement conditional branching in the DFA.</a:t>
-            </a:r>
-            <a:endParaRPr lang="en-US" dirty="0"/>
+        <p:spPr>
+          <a:xfrm>
+            <a:off x="457200" y="1417638"/>
+            <a:ext cx="8229600" cy="4938712"/>
+          </a:xfrm>
+        </p:spPr>
+        <p:txBody>
+          <a:bodyPr>
+            <a:normAutofit lnSpcReduction="10000"/>
+          </a:bodyPr>
+          <a:lstStyle/>
+          <a:p>
+            <a:r>
+              <a:rPr lang="en-US" dirty="0" smtClean="0"/>
+              <a:t>All of the DFA states exist in a graph</a:t>
+            </a:r>
+            <a:r>
+              <a:rPr lang="en-US" dirty="0"/>
+              <a:t> </a:t>
+            </a:r>
+            <a:r>
+              <a:rPr lang="en-US" dirty="0" smtClean="0"/>
+              <a:t>of states with vertices labelled with events.</a:t>
+            </a:r>
+          </a:p>
+          <a:p>
+            <a:r>
+              <a:rPr lang="en-US" dirty="0" smtClean="0"/>
+              <a:t>Each DFA state may connect to zero or more states (including itself).</a:t>
+            </a:r>
+          </a:p>
+          <a:p>
+            <a:r>
+              <a:rPr lang="en-US" dirty="0" smtClean="0"/>
+              <a:t>A state uses an event no more than once.</a:t>
+            </a:r>
+          </a:p>
+          <a:p>
+            <a:r>
+              <a:rPr lang="en-US" dirty="0" smtClean="0"/>
+              <a:t>A workflow defines a start state.  </a:t>
+            </a:r>
+          </a:p>
+          <a:p>
+            <a:r>
+              <a:rPr lang="en-US" dirty="0" smtClean="0"/>
+              <a:t>Closure: the state, its events, vertices and neighbors, and the neighbors closure.</a:t>
+            </a:r>
+          </a:p>
+          <a:p>
+            <a:r>
+              <a:rPr lang="en-US" dirty="0" smtClean="0"/>
+              <a:t>The closure of a workflow </a:t>
+            </a:r>
           </a:p>
         </p:txBody>
       </p:sp>
@@ -3953,7 +3947,7 @@
     </p:spTree>
     <p:extLst>
       <p:ext uri="{BB962C8B-B14F-4D97-AF65-F5344CB8AC3E}">
-        <p14:creationId xmlns:p14="http://schemas.microsoft.com/office/powerpoint/2010/main" val="769201018"/>
+        <p14:creationId xmlns:p14="http://schemas.microsoft.com/office/powerpoint/2010/main" val="2674337966"/>
       </p:ext>
     </p:extLst>
   </p:cSld>
@@ -3992,12 +3986,14 @@
         </p:nvSpPr>
         <p:spPr/>
         <p:txBody>
-          <a:bodyPr/>
-          <a:lstStyle/>
-          <a:p>
-            <a:r>
-              <a:rPr lang="en-US" dirty="0" smtClean="0"/>
-              <a:t>LKUP_STATE_EVENT_TRANS</a:t>
+          <a:bodyPr>
+            <a:normAutofit/>
+          </a:bodyPr>
+          <a:lstStyle/>
+          <a:p>
+            <a:r>
+              <a:rPr lang="en-US" dirty="0" smtClean="0"/>
+              <a:t>Database DFA Schema</a:t>
             </a:r>
             <a:endParaRPr lang="en-US" dirty="0"/>
           </a:p>
@@ -4020,26 +4016,8 @@
           <a:p>
             <a:r>
               <a:rPr lang="en-US" dirty="0" smtClean="0"/>
-              <a:t>Defines the transitions (vertices) between two states.</a:t>
-            </a:r>
-          </a:p>
-          <a:p>
-            <a:r>
-              <a:rPr lang="en-US" dirty="0" smtClean="0"/>
-              <a:t>May override the display name from LKUP_EVENT.</a:t>
-            </a:r>
-          </a:p>
-          <a:p>
-            <a:r>
-              <a:rPr lang="en-US" dirty="0" smtClean="0"/>
-              <a:t>Has constraints that must be satisfied to </a:t>
-            </a:r>
-            <a:r>
-              <a:rPr lang="en-US" smtClean="0"/>
-              <a:t>be valid.</a:t>
-            </a:r>
-          </a:p>
-          <a:p>
+              <a:t>[Insert Picture of Schema Here]</a:t>
+            </a:r>
             <a:endParaRPr lang="en-US" dirty="0"/>
           </a:p>
         </p:txBody>
@@ -4071,7 +4049,7 @@
     </p:spTree>
     <p:extLst>
       <p:ext uri="{BB962C8B-B14F-4D97-AF65-F5344CB8AC3E}">
-        <p14:creationId xmlns:p14="http://schemas.microsoft.com/office/powerpoint/2010/main" val="621509983"/>
+        <p14:creationId xmlns:p14="http://schemas.microsoft.com/office/powerpoint/2010/main" val="1119797094"/>
       </p:ext>
     </p:extLst>
   </p:cSld>
@@ -4115,7 +4093,7 @@
           <a:p>
             <a:r>
               <a:rPr lang="en-US" dirty="0" smtClean="0"/>
-              <a:t>LKUP_WORKFLOW_TYP</a:t>
+              <a:t>LKUP_EVENT</a:t>
             </a:r>
             <a:endParaRPr lang="en-US" dirty="0"/>
           </a:p>
@@ -4133,28 +4111,25 @@
         </p:nvSpPr>
         <p:spPr/>
         <p:txBody>
-          <a:bodyPr>
-            <a:normAutofit fontScale="92500" lnSpcReduction="10000"/>
-          </a:bodyPr>
-          <a:lstStyle/>
-          <a:p>
-            <a:r>
-              <a:rPr lang="en-US" dirty="0" smtClean="0"/>
-              <a:t>Defines the various workflows that may be initiated and tracked by the system.</a:t>
-            </a:r>
-          </a:p>
-          <a:p>
-            <a:r>
-              <a:rPr lang="en-US" dirty="0" smtClean="0"/>
-              <a:t>Defines a start state and start event.  The DFA for the workflow is the closure (set of states and transitions) reachable from the start state.</a:t>
-            </a:r>
-          </a:p>
-          <a:p>
-            <a:r>
-              <a:rPr lang="en-US" dirty="0" smtClean="0"/>
-              <a:t>Multiple workflows may share the same start state or have overlapping (non empty intersection of) closures.  This improves maintainability of workflows that are the same or similar.  A single change updates all identically.</a:t>
-            </a:r>
-            <a:endParaRPr lang="en-US" dirty="0"/>
+          <a:bodyPr/>
+          <a:lstStyle/>
+          <a:p>
+            <a:r>
+              <a:rPr lang="en-US" dirty="0" smtClean="0"/>
+              <a:t>The elements in this table define the events, which correspond to the set of symbols available to a classical FSM.</a:t>
+            </a:r>
+          </a:p>
+          <a:p>
+            <a:r>
+              <a:rPr lang="en-US" dirty="0" smtClean="0"/>
+              <a:t>Defines the default display name (or resource key) and if the event is passive (the resulting state does not become the current state).</a:t>
+            </a:r>
+          </a:p>
+          <a:p>
+            <a:r>
+              <a:rPr lang="en-US" dirty="0" smtClean="0"/>
+              <a:t>Passive events are useful for features such as leaving comments.</a:t>
+            </a:r>
           </a:p>
         </p:txBody>
       </p:sp>
@@ -4185,7 +4160,7 @@
     </p:spTree>
     <p:extLst>
       <p:ext uri="{BB962C8B-B14F-4D97-AF65-F5344CB8AC3E}">
-        <p14:creationId xmlns:p14="http://schemas.microsoft.com/office/powerpoint/2010/main" val="3971495940"/>
+        <p14:creationId xmlns:p14="http://schemas.microsoft.com/office/powerpoint/2010/main" val="2005962276"/>
       </p:ext>
     </p:extLst>
   </p:cSld>
@@ -4224,35 +4199,87 @@
         </p:nvSpPr>
         <p:spPr/>
         <p:txBody>
+          <a:bodyPr/>
+          <a:lstStyle/>
+          <a:p>
+            <a:r>
+              <a:rPr lang="en-US" dirty="0" smtClean="0"/>
+              <a:t>Event Sources</a:t>
+            </a:r>
+            <a:endParaRPr lang="en-US" dirty="0"/>
+          </a:p>
+        </p:txBody>
+      </p:sp>
+      <p:sp>
+        <p:nvSpPr>
+          <p:cNvPr id="3" name="Content Placeholder 2"/>
+          <p:cNvSpPr>
+            <a:spLocks noGrp="1"/>
+          </p:cNvSpPr>
+          <p:nvPr>
+            <p:ph idx="1"/>
+          </p:nvPr>
+        </p:nvSpPr>
+        <p:spPr>
+          <a:xfrm>
+            <a:off x="457200" y="1219200"/>
+            <a:ext cx="8229600" cy="5137150"/>
+          </a:xfrm>
+        </p:spPr>
+        <p:txBody>
           <a:bodyPr>
-            <a:normAutofit fontScale="90000"/>
+            <a:normAutofit fontScale="92500"/>
           </a:bodyPr>
           <a:lstStyle/>
           <a:p>
             <a:r>
               <a:rPr lang="en-US" dirty="0" smtClean="0"/>
-              <a:t>Examples of Workflows That Share States</a:t>
-            </a:r>
-            <a:endParaRPr lang="en-US" dirty="0"/>
-          </a:p>
-        </p:txBody>
-      </p:sp>
-      <p:sp>
-        <p:nvSpPr>
-          <p:cNvPr id="3" name="Content Placeholder 2"/>
-          <p:cNvSpPr>
-            <a:spLocks noGrp="1"/>
-          </p:cNvSpPr>
-          <p:nvPr>
-            <p:ph idx="1"/>
-          </p:nvPr>
-        </p:nvSpPr>
-        <p:spPr/>
-        <p:txBody>
-          <a:bodyPr/>
-          <a:lstStyle/>
-          <a:p>
-            <a:endParaRPr lang="en-US" dirty="0"/>
+              <a:t>Direct User Input to apply an event (action) to a specific workflow.  Example: Manager approves pay raise.</a:t>
+            </a:r>
+          </a:p>
+          <a:p>
+            <a:r>
+              <a:rPr lang="en-US" dirty="0" smtClean="0"/>
+              <a:t>Application updates.  Example: Employee salary update results in a </a:t>
+            </a:r>
+            <a:r>
+              <a:rPr lang="en-US" cap="small" dirty="0" smtClean="0"/>
+              <a:t>salary change</a:t>
+            </a:r>
+            <a:r>
+              <a:rPr lang="en-US" dirty="0"/>
+              <a:t> </a:t>
+            </a:r>
+            <a:r>
+              <a:rPr lang="en-US" dirty="0" smtClean="0"/>
+              <a:t>event.</a:t>
+            </a:r>
+          </a:p>
+          <a:p>
+            <a:r>
+              <a:rPr lang="en-US" dirty="0" smtClean="0"/>
+              <a:t>Services (SOA).  Example: A request to a notification system may be sent due to a salary change resulting in a </a:t>
+            </a:r>
+            <a:r>
+              <a:rPr lang="en-US" cap="small" dirty="0" smtClean="0"/>
+              <a:t>employee notify</a:t>
+            </a:r>
+            <a:r>
+              <a:rPr lang="en-US" dirty="0" smtClean="0"/>
+              <a:t> event.</a:t>
+            </a:r>
+          </a:p>
+          <a:p>
+            <a:r>
+              <a:rPr lang="en-US" dirty="0" smtClean="0"/>
+              <a:t>Extract, Transform and Load (ETL) system.</a:t>
+            </a:r>
+          </a:p>
+          <a:p>
+            <a:r>
+              <a:rPr lang="en-US" dirty="0" smtClean="0"/>
+              <a:t>Another workflow, especially a parent workflow.</a:t>
+            </a:r>
           </a:p>
         </p:txBody>
       </p:sp>
@@ -4283,7 +4310,7 @@
     </p:spTree>
     <p:extLst>
       <p:ext uri="{BB962C8B-B14F-4D97-AF65-F5344CB8AC3E}">
-        <p14:creationId xmlns:p14="http://schemas.microsoft.com/office/powerpoint/2010/main" val="1047993362"/>
+        <p14:creationId xmlns:p14="http://schemas.microsoft.com/office/powerpoint/2010/main" val="690021978"/>
       </p:ext>
     </p:extLst>
   </p:cSld>
@@ -4327,7 +4354,7 @@
           <a:p>
             <a:r>
               <a:rPr lang="en-US" dirty="0" smtClean="0"/>
-              <a:t>DFA_WORKFLOW</a:t>
+              <a:t>LKUP_STATE</a:t>
             </a:r>
             <a:endParaRPr lang="en-US" dirty="0"/>
           </a:p>
@@ -4343,53 +4370,45 @@
             <p:ph idx="1"/>
           </p:nvPr>
         </p:nvSpPr>
-        <p:spPr>
-          <a:xfrm>
-            <a:off x="457200" y="1295400"/>
-            <a:ext cx="8229600" cy="5060950"/>
-          </a:xfrm>
-        </p:spPr>
-        <p:txBody>
-          <a:bodyPr>
-            <a:normAutofit lnSpcReduction="10000"/>
-          </a:bodyPr>
-          <a:lstStyle/>
-          <a:p>
-            <a:r>
-              <a:rPr lang="en-US" dirty="0" smtClean="0"/>
-              <a:t>Defines an instance of a given workflow from LKUP_WORKFLOW_TYP.</a:t>
-            </a:r>
-          </a:p>
-          <a:p>
-            <a:r>
-              <a:rPr lang="en-US" dirty="0" smtClean="0"/>
-              <a:t>Has comments that apply to the origination and entire workflow.</a:t>
-            </a:r>
-          </a:p>
-          <a:p>
-            <a:r>
-              <a:rPr lang="en-US" dirty="0" smtClean="0"/>
-              <a:t>May be spawned from another DFA state.</a:t>
-            </a:r>
-          </a:p>
-          <a:p>
-            <a:r>
-              <a:rPr lang="en-US" dirty="0" smtClean="0"/>
-              <a:t>If spawned, may be specified as a sub workflow.</a:t>
-            </a:r>
-          </a:p>
-          <a:p>
-            <a:r>
-              <a:rPr lang="en-US" dirty="0" smtClean="0"/>
-              <a:t>When all sub-workflows in a given state are completed, the parent workflow is sent the event </a:t>
-            </a:r>
-            <a:r>
-              <a:rPr lang="en-US" cap="small" dirty="0" smtClean="0"/>
-              <a:t>sub workflows complete.</a:t>
-            </a:r>
-            <a:endParaRPr lang="en-US" dirty="0" smtClean="0"/>
-          </a:p>
-          <a:p>
+        <p:spPr/>
+        <p:txBody>
+          <a:bodyPr/>
+          <a:lstStyle/>
+          <a:p>
+            <a:r>
+              <a:rPr lang="en-US" dirty="0" smtClean="0"/>
+              <a:t>Defines the DFA states.</a:t>
+            </a:r>
+          </a:p>
+          <a:p>
+            <a:r>
+              <a:rPr lang="en-US" dirty="0" smtClean="0"/>
+              <a:t>Defines display name (or key).</a:t>
+            </a:r>
+          </a:p>
+          <a:p>
+            <a:r>
+              <a:rPr lang="en-US" dirty="0" smtClean="0"/>
+              <a:t>May define an expected event.</a:t>
+            </a:r>
+          </a:p>
+          <a:p>
+            <a:r>
+              <a:rPr lang="en-US" dirty="0" smtClean="0"/>
+              <a:t>Has constraints that must be satisfied to enter.</a:t>
+            </a:r>
+          </a:p>
+          <a:p>
+            <a:r>
+              <a:rPr lang="en-US" dirty="0" smtClean="0"/>
+              <a:t>May define an alternate state that is tried if constraints are unsatisfied.</a:t>
+            </a:r>
+          </a:p>
+          <a:p>
+            <a:r>
+              <a:rPr lang="en-US" dirty="0" smtClean="0"/>
+              <a:t>Constraints + alternate states are a way to implement conditional branching in the DFA.</a:t>
+            </a:r>
             <a:endParaRPr lang="en-US" dirty="0"/>
           </a:p>
         </p:txBody>
@@ -4421,7 +4440,7 @@
     </p:spTree>
     <p:extLst>
       <p:ext uri="{BB962C8B-B14F-4D97-AF65-F5344CB8AC3E}">
-        <p14:creationId xmlns:p14="http://schemas.microsoft.com/office/powerpoint/2010/main" val="1749666348"/>
+        <p14:creationId xmlns:p14="http://schemas.microsoft.com/office/powerpoint/2010/main" val="769201018"/>
       </p:ext>
     </p:extLst>
   </p:cSld>
@@ -4465,7 +4484,7 @@
           <a:p>
             <a:r>
               <a:rPr lang="en-US" dirty="0" smtClean="0"/>
-              <a:t>DFA_WORKFLOW_STATE</a:t>
+              <a:t>LKUP_STATE_EVENT_TRANS</a:t>
             </a:r>
             <a:endParaRPr lang="en-US" dirty="0"/>
           </a:p>
@@ -4488,30 +4507,26 @@
           <a:p>
             <a:r>
               <a:rPr lang="en-US" dirty="0" smtClean="0"/>
-              <a:t>Defines workflow states, including the current workflow state.</a:t>
-            </a:r>
-          </a:p>
-          <a:p>
-            <a:r>
-              <a:rPr lang="en-US" dirty="0" smtClean="0"/>
-              <a:t>Has exactly 1 current workflow state.</a:t>
-            </a:r>
-          </a:p>
-          <a:p>
-            <a:r>
-              <a:rPr lang="en-US" dirty="0" smtClean="0"/>
-              <a:t>May spawn DFA sub-workflows.  This is used to model parallel paths in workflows.</a:t>
-            </a:r>
-          </a:p>
-          <a:p>
-            <a:r>
-              <a:rPr lang="en-US" dirty="0" smtClean="0"/>
-              <a:t>Has comments that apply to the </a:t>
-            </a:r>
-            <a:r>
-              <a:rPr lang="en-US" smtClean="0"/>
-              <a:t>particular state.</a:t>
-            </a:r>
+              <a:t>Defines the transitions (vertices) between two states.</a:t>
+            </a:r>
+          </a:p>
+          <a:p>
+            <a:r>
+              <a:rPr lang="en-US" dirty="0" smtClean="0"/>
+              <a:t>May override the display name from LKUP_EVENT.</a:t>
+            </a:r>
+          </a:p>
+          <a:p>
+            <a:r>
+              <a:rPr lang="en-US" dirty="0" smtClean="0"/>
+              <a:t>Has constraints that must be satisfied to </a:t>
+            </a:r>
+            <a:r>
+              <a:rPr lang="en-US" smtClean="0"/>
+              <a:t>be valid.</a:t>
+            </a:r>
+          </a:p>
+          <a:p>
             <a:endParaRPr lang="en-US" dirty="0"/>
           </a:p>
         </p:txBody>
@@ -4543,7 +4558,367 @@
     </p:spTree>
     <p:extLst>
       <p:ext uri="{BB962C8B-B14F-4D97-AF65-F5344CB8AC3E}">
-        <p14:creationId xmlns:p14="http://schemas.microsoft.com/office/powerpoint/2010/main" val="3039388721"/>
+        <p14:creationId xmlns:p14="http://schemas.microsoft.com/office/powerpoint/2010/main" val="621509983"/>
+      </p:ext>
+    </p:extLst>
+  </p:cSld>
+  <p:clrMapOvr>
+    <a:masterClrMapping/>
+  </p:clrMapOvr>
+</p:sld>
+</file>
+
+<file path=ppt/slides/slide17.xml><?xml version="1.0" encoding="utf-8"?>
+<p:sld xmlns:a="http://schemas.openxmlformats.org/drawingml/2006/main" xmlns:r="http://schemas.openxmlformats.org/officeDocument/2006/relationships" xmlns:p="http://schemas.openxmlformats.org/presentationml/2006/main">
+  <p:cSld>
+    <p:spTree>
+      <p:nvGrpSpPr>
+        <p:cNvPr id="1" name=""/>
+        <p:cNvGrpSpPr/>
+        <p:nvPr/>
+      </p:nvGrpSpPr>
+      <p:grpSpPr>
+        <a:xfrm>
+          <a:off x="0" y="0"/>
+          <a:ext cx="0" cy="0"/>
+          <a:chOff x="0" y="0"/>
+          <a:chExt cx="0" cy="0"/>
+        </a:xfrm>
+      </p:grpSpPr>
+      <p:sp>
+        <p:nvSpPr>
+          <p:cNvPr id="2" name="Title 1"/>
+          <p:cNvSpPr>
+            <a:spLocks noGrp="1"/>
+          </p:cNvSpPr>
+          <p:nvPr>
+            <p:ph type="title"/>
+          </p:nvPr>
+        </p:nvSpPr>
+        <p:spPr/>
+        <p:txBody>
+          <a:bodyPr/>
+          <a:lstStyle/>
+          <a:p>
+            <a:r>
+              <a:rPr lang="en-US" dirty="0" smtClean="0"/>
+              <a:t>LKUP_WORKFLOW_TYP</a:t>
+            </a:r>
+            <a:endParaRPr lang="en-US" dirty="0"/>
+          </a:p>
+        </p:txBody>
+      </p:sp>
+      <p:sp>
+        <p:nvSpPr>
+          <p:cNvPr id="3" name="Content Placeholder 2"/>
+          <p:cNvSpPr>
+            <a:spLocks noGrp="1"/>
+          </p:cNvSpPr>
+          <p:nvPr>
+            <p:ph idx="1"/>
+          </p:nvPr>
+        </p:nvSpPr>
+        <p:spPr/>
+        <p:txBody>
+          <a:bodyPr>
+            <a:normAutofit fontScale="92500" lnSpcReduction="10000"/>
+          </a:bodyPr>
+          <a:lstStyle/>
+          <a:p>
+            <a:r>
+              <a:rPr lang="en-US" dirty="0" smtClean="0"/>
+              <a:t>Defines the various workflows that may be initiated and tracked by the system.</a:t>
+            </a:r>
+          </a:p>
+          <a:p>
+            <a:r>
+              <a:rPr lang="en-US" dirty="0" smtClean="0"/>
+              <a:t>Defines a start state and start event.  The DFA for the workflow is the closure (set of states and transitions) reachable from the start state.</a:t>
+            </a:r>
+          </a:p>
+          <a:p>
+            <a:r>
+              <a:rPr lang="en-US" dirty="0" smtClean="0"/>
+              <a:t>Multiple workflows may share the same start state or have overlapping (non empty intersection of) closures.  This improves maintainability of workflows that are the same or similar.  A single change updates all identically.</a:t>
+            </a:r>
+            <a:endParaRPr lang="en-US" dirty="0"/>
+          </a:p>
+        </p:txBody>
+      </p:sp>
+      <p:sp>
+        <p:nvSpPr>
+          <p:cNvPr id="4" name="Slide Number Placeholder 3"/>
+          <p:cNvSpPr>
+            <a:spLocks noGrp="1"/>
+          </p:cNvSpPr>
+          <p:nvPr>
+            <p:ph type="sldNum" sz="quarter" idx="12"/>
+          </p:nvPr>
+        </p:nvSpPr>
+        <p:spPr/>
+        <p:txBody>
+          <a:bodyPr/>
+          <a:lstStyle/>
+          <a:p>
+            <a:fld id="{B6F15528-21DE-4FAA-801E-634DDDAF4B2B}" type="slidenum">
+              <a:rPr lang="en-US" smtClean="0"/>
+              <a:pPr/>
+              <a:t>17</a:t>
+            </a:fld>
+            <a:endParaRPr lang="en-US"/>
+          </a:p>
+        </p:txBody>
+      </p:sp>
+    </p:spTree>
+    <p:extLst>
+      <p:ext uri="{BB962C8B-B14F-4D97-AF65-F5344CB8AC3E}">
+        <p14:creationId xmlns:p14="http://schemas.microsoft.com/office/powerpoint/2010/main" val="3971495940"/>
+      </p:ext>
+    </p:extLst>
+  </p:cSld>
+  <p:clrMapOvr>
+    <a:masterClrMapping/>
+  </p:clrMapOvr>
+</p:sld>
+</file>
+
+<file path=ppt/slides/slide18.xml><?xml version="1.0" encoding="utf-8"?>
+<p:sld xmlns:a="http://schemas.openxmlformats.org/drawingml/2006/main" xmlns:r="http://schemas.openxmlformats.org/officeDocument/2006/relationships" xmlns:p="http://schemas.openxmlformats.org/presentationml/2006/main">
+  <p:cSld>
+    <p:spTree>
+      <p:nvGrpSpPr>
+        <p:cNvPr id="1" name=""/>
+        <p:cNvGrpSpPr/>
+        <p:nvPr/>
+      </p:nvGrpSpPr>
+      <p:grpSpPr>
+        <a:xfrm>
+          <a:off x="0" y="0"/>
+          <a:ext cx="0" cy="0"/>
+          <a:chOff x="0" y="0"/>
+          <a:chExt cx="0" cy="0"/>
+        </a:xfrm>
+      </p:grpSpPr>
+      <p:sp>
+        <p:nvSpPr>
+          <p:cNvPr id="2" name="Title 1"/>
+          <p:cNvSpPr>
+            <a:spLocks noGrp="1"/>
+          </p:cNvSpPr>
+          <p:nvPr>
+            <p:ph type="title"/>
+          </p:nvPr>
+        </p:nvSpPr>
+        <p:spPr/>
+        <p:txBody>
+          <a:bodyPr>
+            <a:normAutofit fontScale="90000"/>
+          </a:bodyPr>
+          <a:lstStyle/>
+          <a:p>
+            <a:r>
+              <a:rPr lang="en-US" dirty="0" smtClean="0"/>
+              <a:t>Examples of Workflows That Share States</a:t>
+            </a:r>
+            <a:endParaRPr lang="en-US" dirty="0"/>
+          </a:p>
+        </p:txBody>
+      </p:sp>
+      <p:sp>
+        <p:nvSpPr>
+          <p:cNvPr id="3" name="Content Placeholder 2"/>
+          <p:cNvSpPr>
+            <a:spLocks noGrp="1"/>
+          </p:cNvSpPr>
+          <p:nvPr>
+            <p:ph idx="1"/>
+          </p:nvPr>
+        </p:nvSpPr>
+        <p:spPr/>
+        <p:txBody>
+          <a:bodyPr/>
+          <a:lstStyle/>
+          <a:p>
+            <a:r>
+              <a:rPr lang="en-US" dirty="0" smtClean="0"/>
+              <a:t>Out-processing steps for resigning and retiring.  These are two workflows, but the out-processing for the employee would (hypothetically) be the same.</a:t>
+            </a:r>
+          </a:p>
+          <a:p>
+            <a:r>
+              <a:rPr lang="en-US" dirty="0" smtClean="0"/>
+              <a:t>There could be many workflows that share the same basic steps, such as create, review, approve and execute.  These workflows could be modeled to share the same DFA.</a:t>
+            </a:r>
+            <a:endParaRPr lang="en-US" dirty="0"/>
+          </a:p>
+        </p:txBody>
+      </p:sp>
+      <p:sp>
+        <p:nvSpPr>
+          <p:cNvPr id="4" name="Slide Number Placeholder 3"/>
+          <p:cNvSpPr>
+            <a:spLocks noGrp="1"/>
+          </p:cNvSpPr>
+          <p:nvPr>
+            <p:ph type="sldNum" sz="quarter" idx="12"/>
+          </p:nvPr>
+        </p:nvSpPr>
+        <p:spPr/>
+        <p:txBody>
+          <a:bodyPr/>
+          <a:lstStyle/>
+          <a:p>
+            <a:fld id="{B6F15528-21DE-4FAA-801E-634DDDAF4B2B}" type="slidenum">
+              <a:rPr lang="en-US" smtClean="0"/>
+              <a:pPr/>
+              <a:t>18</a:t>
+            </a:fld>
+            <a:endParaRPr lang="en-US"/>
+          </a:p>
+        </p:txBody>
+      </p:sp>
+    </p:spTree>
+    <p:extLst>
+      <p:ext uri="{BB962C8B-B14F-4D97-AF65-F5344CB8AC3E}">
+        <p14:creationId xmlns:p14="http://schemas.microsoft.com/office/powerpoint/2010/main" val="1047993362"/>
+      </p:ext>
+    </p:extLst>
+  </p:cSld>
+  <p:clrMapOvr>
+    <a:masterClrMapping/>
+  </p:clrMapOvr>
+</p:sld>
+</file>
+
+<file path=ppt/slides/slide19.xml><?xml version="1.0" encoding="utf-8"?>
+<p:sld xmlns:a="http://schemas.openxmlformats.org/drawingml/2006/main" xmlns:r="http://schemas.openxmlformats.org/officeDocument/2006/relationships" xmlns:p="http://schemas.openxmlformats.org/presentationml/2006/main">
+  <p:cSld>
+    <p:spTree>
+      <p:nvGrpSpPr>
+        <p:cNvPr id="1" name=""/>
+        <p:cNvGrpSpPr/>
+        <p:nvPr/>
+      </p:nvGrpSpPr>
+      <p:grpSpPr>
+        <a:xfrm>
+          <a:off x="0" y="0"/>
+          <a:ext cx="0" cy="0"/>
+          <a:chOff x="0" y="0"/>
+          <a:chExt cx="0" cy="0"/>
+        </a:xfrm>
+      </p:grpSpPr>
+      <p:sp>
+        <p:nvSpPr>
+          <p:cNvPr id="2" name="Title 1"/>
+          <p:cNvSpPr>
+            <a:spLocks noGrp="1"/>
+          </p:cNvSpPr>
+          <p:nvPr>
+            <p:ph type="title"/>
+          </p:nvPr>
+        </p:nvSpPr>
+        <p:spPr/>
+        <p:txBody>
+          <a:bodyPr/>
+          <a:lstStyle/>
+          <a:p>
+            <a:r>
+              <a:rPr lang="en-US" dirty="0" smtClean="0"/>
+              <a:t>DFA_WORKFLOW</a:t>
+            </a:r>
+            <a:endParaRPr lang="en-US" dirty="0"/>
+          </a:p>
+        </p:txBody>
+      </p:sp>
+      <p:sp>
+        <p:nvSpPr>
+          <p:cNvPr id="3" name="Content Placeholder 2"/>
+          <p:cNvSpPr>
+            <a:spLocks noGrp="1"/>
+          </p:cNvSpPr>
+          <p:nvPr>
+            <p:ph idx="1"/>
+          </p:nvPr>
+        </p:nvSpPr>
+        <p:spPr>
+          <a:xfrm>
+            <a:off x="457200" y="1295400"/>
+            <a:ext cx="8229600" cy="5060950"/>
+          </a:xfrm>
+        </p:spPr>
+        <p:txBody>
+          <a:bodyPr>
+            <a:normAutofit lnSpcReduction="10000"/>
+          </a:bodyPr>
+          <a:lstStyle/>
+          <a:p>
+            <a:r>
+              <a:rPr lang="en-US" dirty="0" smtClean="0"/>
+              <a:t>Defines an instance of a given workflow from LKUP_WORKFLOW_TYP.</a:t>
+            </a:r>
+          </a:p>
+          <a:p>
+            <a:r>
+              <a:rPr lang="en-US" dirty="0" smtClean="0"/>
+              <a:t>Has comments that apply to the origination and entire workflow.</a:t>
+            </a:r>
+          </a:p>
+          <a:p>
+            <a:r>
+              <a:rPr lang="en-US" dirty="0" smtClean="0"/>
+              <a:t>May be spawned from another DFA state.</a:t>
+            </a:r>
+          </a:p>
+          <a:p>
+            <a:r>
+              <a:rPr lang="en-US" dirty="0" smtClean="0"/>
+              <a:t>If spawned, may be specified as a sub workflow.</a:t>
+            </a:r>
+          </a:p>
+          <a:p>
+            <a:r>
+              <a:rPr lang="en-US" dirty="0" smtClean="0"/>
+              <a:t>When all sub-workflows in a given state are completed, the parent workflow is sent the event </a:t>
+            </a:r>
+            <a:r>
+              <a:rPr lang="en-US" cap="small" dirty="0" smtClean="0"/>
+              <a:t>sub workflows complete.</a:t>
+            </a:r>
+            <a:endParaRPr lang="en-US" dirty="0" smtClean="0"/>
+          </a:p>
+          <a:p>
+            <a:endParaRPr lang="en-US" dirty="0"/>
+          </a:p>
+        </p:txBody>
+      </p:sp>
+      <p:sp>
+        <p:nvSpPr>
+          <p:cNvPr id="4" name="Slide Number Placeholder 3"/>
+          <p:cNvSpPr>
+            <a:spLocks noGrp="1"/>
+          </p:cNvSpPr>
+          <p:nvPr>
+            <p:ph type="sldNum" sz="quarter" idx="12"/>
+          </p:nvPr>
+        </p:nvSpPr>
+        <p:spPr/>
+        <p:txBody>
+          <a:bodyPr/>
+          <a:lstStyle/>
+          <a:p>
+            <a:fld id="{B6F15528-21DE-4FAA-801E-634DDDAF4B2B}" type="slidenum">
+              <a:rPr lang="en-US" smtClean="0"/>
+              <a:pPr/>
+              <a:t>19</a:t>
+            </a:fld>
+            <a:endParaRPr lang="en-US"/>
+          </a:p>
+        </p:txBody>
+      </p:sp>
+    </p:spTree>
+    <p:extLst>
+      <p:ext uri="{BB962C8B-B14F-4D97-AF65-F5344CB8AC3E}">
+        <p14:creationId xmlns:p14="http://schemas.microsoft.com/office/powerpoint/2010/main" val="1749666348"/>
       </p:ext>
     </p:extLst>
   </p:cSld>
@@ -4720,6 +5095,548 @@
     <p:extLst>
       <p:ext uri="{BB962C8B-B14F-4D97-AF65-F5344CB8AC3E}">
         <p14:creationId xmlns:p14="http://schemas.microsoft.com/office/powerpoint/2010/main" val="1557331413"/>
+      </p:ext>
+    </p:extLst>
+  </p:cSld>
+  <p:clrMapOvr>
+    <a:masterClrMapping/>
+  </p:clrMapOvr>
+</p:sld>
+</file>
+
+<file path=ppt/slides/slide20.xml><?xml version="1.0" encoding="utf-8"?>
+<p:sld xmlns:a="http://schemas.openxmlformats.org/drawingml/2006/main" xmlns:r="http://schemas.openxmlformats.org/officeDocument/2006/relationships" xmlns:p="http://schemas.openxmlformats.org/presentationml/2006/main">
+  <p:cSld>
+    <p:spTree>
+      <p:nvGrpSpPr>
+        <p:cNvPr id="1" name=""/>
+        <p:cNvGrpSpPr/>
+        <p:nvPr/>
+      </p:nvGrpSpPr>
+      <p:grpSpPr>
+        <a:xfrm>
+          <a:off x="0" y="0"/>
+          <a:ext cx="0" cy="0"/>
+          <a:chOff x="0" y="0"/>
+          <a:chExt cx="0" cy="0"/>
+        </a:xfrm>
+      </p:grpSpPr>
+      <p:sp>
+        <p:nvSpPr>
+          <p:cNvPr id="2" name="Title 1"/>
+          <p:cNvSpPr>
+            <a:spLocks noGrp="1"/>
+          </p:cNvSpPr>
+          <p:nvPr>
+            <p:ph type="title"/>
+          </p:nvPr>
+        </p:nvSpPr>
+        <p:spPr/>
+        <p:txBody>
+          <a:bodyPr/>
+          <a:lstStyle/>
+          <a:p>
+            <a:r>
+              <a:rPr lang="en-US" dirty="0" smtClean="0"/>
+              <a:t>DFA_WORKFLOW_STATE</a:t>
+            </a:r>
+            <a:endParaRPr lang="en-US" dirty="0"/>
+          </a:p>
+        </p:txBody>
+      </p:sp>
+      <p:sp>
+        <p:nvSpPr>
+          <p:cNvPr id="3" name="Content Placeholder 2"/>
+          <p:cNvSpPr>
+            <a:spLocks noGrp="1"/>
+          </p:cNvSpPr>
+          <p:nvPr>
+            <p:ph idx="1"/>
+          </p:nvPr>
+        </p:nvSpPr>
+        <p:spPr/>
+        <p:txBody>
+          <a:bodyPr/>
+          <a:lstStyle/>
+          <a:p>
+            <a:r>
+              <a:rPr lang="en-US" dirty="0" smtClean="0"/>
+              <a:t>Defines workflow states, including the current workflow state.</a:t>
+            </a:r>
+          </a:p>
+          <a:p>
+            <a:r>
+              <a:rPr lang="en-US" dirty="0" smtClean="0"/>
+              <a:t>Has exactly 1 current workflow state.</a:t>
+            </a:r>
+          </a:p>
+          <a:p>
+            <a:r>
+              <a:rPr lang="en-US" dirty="0" smtClean="0"/>
+              <a:t>May spawn DFA sub-workflows.  This is used to model parallel paths in workflows.</a:t>
+            </a:r>
+          </a:p>
+          <a:p>
+            <a:r>
+              <a:rPr lang="en-US" dirty="0" smtClean="0"/>
+              <a:t>Has comments that apply to the </a:t>
+            </a:r>
+            <a:r>
+              <a:rPr lang="en-US" smtClean="0"/>
+              <a:t>particular state.</a:t>
+            </a:r>
+            <a:endParaRPr lang="en-US" dirty="0"/>
+          </a:p>
+        </p:txBody>
+      </p:sp>
+      <p:sp>
+        <p:nvSpPr>
+          <p:cNvPr id="4" name="Slide Number Placeholder 3"/>
+          <p:cNvSpPr>
+            <a:spLocks noGrp="1"/>
+          </p:cNvSpPr>
+          <p:nvPr>
+            <p:ph type="sldNum" sz="quarter" idx="12"/>
+          </p:nvPr>
+        </p:nvSpPr>
+        <p:spPr/>
+        <p:txBody>
+          <a:bodyPr/>
+          <a:lstStyle/>
+          <a:p>
+            <a:fld id="{B6F15528-21DE-4FAA-801E-634DDDAF4B2B}" type="slidenum">
+              <a:rPr lang="en-US" smtClean="0"/>
+              <a:pPr/>
+              <a:t>20</a:t>
+            </a:fld>
+            <a:endParaRPr lang="en-US"/>
+          </a:p>
+        </p:txBody>
+      </p:sp>
+    </p:spTree>
+    <p:extLst>
+      <p:ext uri="{BB962C8B-B14F-4D97-AF65-F5344CB8AC3E}">
+        <p14:creationId xmlns:p14="http://schemas.microsoft.com/office/powerpoint/2010/main" val="3039388721"/>
+      </p:ext>
+    </p:extLst>
+  </p:cSld>
+  <p:clrMapOvr>
+    <a:masterClrMapping/>
+  </p:clrMapOvr>
+</p:sld>
+</file>
+
+<file path=ppt/slides/slide21.xml><?xml version="1.0" encoding="utf-8"?>
+<p:sld xmlns:a="http://schemas.openxmlformats.org/drawingml/2006/main" xmlns:r="http://schemas.openxmlformats.org/officeDocument/2006/relationships" xmlns:p="http://schemas.openxmlformats.org/presentationml/2006/main">
+  <p:cSld>
+    <p:spTree>
+      <p:nvGrpSpPr>
+        <p:cNvPr id="1" name=""/>
+        <p:cNvGrpSpPr/>
+        <p:nvPr/>
+      </p:nvGrpSpPr>
+      <p:grpSpPr>
+        <a:xfrm>
+          <a:off x="0" y="0"/>
+          <a:ext cx="0" cy="0"/>
+          <a:chOff x="0" y="0"/>
+          <a:chExt cx="0" cy="0"/>
+        </a:xfrm>
+      </p:grpSpPr>
+      <p:sp>
+        <p:nvSpPr>
+          <p:cNvPr id="2" name="Title 1"/>
+          <p:cNvSpPr>
+            <a:spLocks noGrp="1"/>
+          </p:cNvSpPr>
+          <p:nvPr>
+            <p:ph type="title"/>
+          </p:nvPr>
+        </p:nvSpPr>
+        <p:spPr/>
+        <p:txBody>
+          <a:bodyPr/>
+          <a:lstStyle/>
+          <a:p>
+            <a:r>
+              <a:rPr lang="en-US" dirty="0" smtClean="0"/>
+              <a:t>Entity Binding Table</a:t>
+            </a:r>
+            <a:endParaRPr lang="en-US" dirty="0"/>
+          </a:p>
+        </p:txBody>
+      </p:sp>
+      <p:sp>
+        <p:nvSpPr>
+          <p:cNvPr id="3" name="Content Placeholder 2"/>
+          <p:cNvSpPr>
+            <a:spLocks noGrp="1"/>
+          </p:cNvSpPr>
+          <p:nvPr>
+            <p:ph idx="1"/>
+          </p:nvPr>
+        </p:nvSpPr>
+        <p:spPr/>
+        <p:txBody>
+          <a:bodyPr>
+            <a:normAutofit lnSpcReduction="10000"/>
+          </a:bodyPr>
+          <a:lstStyle/>
+          <a:p>
+            <a:r>
+              <a:rPr lang="en-US" dirty="0" smtClean="0"/>
+              <a:t>Exists outside of the </a:t>
+            </a:r>
+            <a:r>
+              <a:rPr lang="en-US" dirty="0" err="1" smtClean="0"/>
+              <a:t>dfa</a:t>
+            </a:r>
+            <a:r>
+              <a:rPr lang="en-US" dirty="0" smtClean="0"/>
+              <a:t> database (schema).</a:t>
+            </a:r>
+          </a:p>
+          <a:p>
+            <a:r>
+              <a:rPr lang="en-US" dirty="0" smtClean="0"/>
+              <a:t>Associates 1 or more entities to </a:t>
+            </a:r>
+            <a:r>
+              <a:rPr lang="en-US" cap="small" dirty="0" err="1" smtClean="0"/>
+              <a:t>dfa_workflow</a:t>
+            </a:r>
+            <a:r>
+              <a:rPr lang="en-US" dirty="0" smtClean="0"/>
+              <a:t>.</a:t>
+            </a:r>
+          </a:p>
+          <a:p>
+            <a:r>
+              <a:rPr lang="en-US" dirty="0" smtClean="0"/>
+              <a:t>Makes it possible to share the same </a:t>
+            </a:r>
+            <a:r>
+              <a:rPr lang="en-US" dirty="0" err="1" smtClean="0"/>
+              <a:t>dfa</a:t>
+            </a:r>
+            <a:r>
+              <a:rPr lang="en-US" dirty="0" smtClean="0"/>
+              <a:t> database with multiple projects and entities.</a:t>
+            </a:r>
+          </a:p>
+          <a:p>
+            <a:r>
+              <a:rPr lang="en-US" dirty="0" smtClean="0"/>
+              <a:t>For the </a:t>
+            </a:r>
+            <a:r>
+              <a:rPr lang="en-US" cap="small" dirty="0" smtClean="0"/>
+              <a:t>employee</a:t>
+            </a:r>
+            <a:r>
+              <a:rPr lang="en-US" dirty="0" smtClean="0"/>
+              <a:t> table, the entity binding table is </a:t>
+            </a:r>
+            <a:r>
+              <a:rPr lang="en-US" cap="small" dirty="0" err="1" smtClean="0"/>
+              <a:t>employee_workflow</a:t>
+            </a:r>
+            <a:r>
+              <a:rPr lang="en-US" cap="small" dirty="0" smtClean="0"/>
+              <a:t>.</a:t>
+            </a:r>
+          </a:p>
+          <a:p>
+            <a:r>
+              <a:rPr lang="en-US" dirty="0" smtClean="0"/>
+              <a:t>Should control cardinality via unique constraints if applicable. </a:t>
+            </a:r>
+            <a:endParaRPr lang="en-US" dirty="0"/>
+          </a:p>
+        </p:txBody>
+      </p:sp>
+      <p:sp>
+        <p:nvSpPr>
+          <p:cNvPr id="4" name="Slide Number Placeholder 3"/>
+          <p:cNvSpPr>
+            <a:spLocks noGrp="1"/>
+          </p:cNvSpPr>
+          <p:nvPr>
+            <p:ph type="sldNum" sz="quarter" idx="12"/>
+          </p:nvPr>
+        </p:nvSpPr>
+        <p:spPr/>
+        <p:txBody>
+          <a:bodyPr/>
+          <a:lstStyle/>
+          <a:p>
+            <a:fld id="{B6F15528-21DE-4FAA-801E-634DDDAF4B2B}" type="slidenum">
+              <a:rPr lang="en-US" smtClean="0"/>
+              <a:pPr/>
+              <a:t>21</a:t>
+            </a:fld>
+            <a:endParaRPr lang="en-US"/>
+          </a:p>
+        </p:txBody>
+      </p:sp>
+    </p:spTree>
+    <p:extLst>
+      <p:ext uri="{BB962C8B-B14F-4D97-AF65-F5344CB8AC3E}">
+        <p14:creationId xmlns:p14="http://schemas.microsoft.com/office/powerpoint/2010/main" val="3448054516"/>
+      </p:ext>
+    </p:extLst>
+  </p:cSld>
+  <p:clrMapOvr>
+    <a:masterClrMapping/>
+  </p:clrMapOvr>
+</p:sld>
+</file>
+
+<file path=ppt/slides/slide22.xml><?xml version="1.0" encoding="utf-8"?>
+<p:sld xmlns:a="http://schemas.openxmlformats.org/drawingml/2006/main" xmlns:r="http://schemas.openxmlformats.org/officeDocument/2006/relationships" xmlns:p="http://schemas.openxmlformats.org/presentationml/2006/main">
+  <p:cSld>
+    <p:spTree>
+      <p:nvGrpSpPr>
+        <p:cNvPr id="1" name=""/>
+        <p:cNvGrpSpPr/>
+        <p:nvPr/>
+      </p:nvGrpSpPr>
+      <p:grpSpPr>
+        <a:xfrm>
+          <a:off x="0" y="0"/>
+          <a:ext cx="0" cy="0"/>
+          <a:chOff x="0" y="0"/>
+          <a:chExt cx="0" cy="0"/>
+        </a:xfrm>
+      </p:grpSpPr>
+      <p:sp>
+        <p:nvSpPr>
+          <p:cNvPr id="2" name="Title 1"/>
+          <p:cNvSpPr>
+            <a:spLocks noGrp="1"/>
+          </p:cNvSpPr>
+          <p:nvPr>
+            <p:ph type="title"/>
+          </p:nvPr>
+        </p:nvSpPr>
+        <p:spPr/>
+        <p:txBody>
+          <a:bodyPr>
+            <a:normAutofit fontScale="90000"/>
+          </a:bodyPr>
+          <a:lstStyle/>
+          <a:p>
+            <a:r>
+              <a:rPr lang="en-US" dirty="0" smtClean="0"/>
+              <a:t>Temporary Table DFA_WORKFLOW_ENTITY</a:t>
+            </a:r>
+            <a:endParaRPr lang="en-US" dirty="0"/>
+          </a:p>
+        </p:txBody>
+      </p:sp>
+      <p:sp>
+        <p:nvSpPr>
+          <p:cNvPr id="3" name="Content Placeholder 2"/>
+          <p:cNvSpPr>
+            <a:spLocks noGrp="1"/>
+          </p:cNvSpPr>
+          <p:nvPr>
+            <p:ph idx="1"/>
+          </p:nvPr>
+        </p:nvSpPr>
+        <p:spPr/>
+        <p:txBody>
+          <a:bodyPr/>
+          <a:lstStyle/>
+          <a:p>
+            <a:r>
+              <a:rPr lang="en-US" dirty="0" smtClean="0"/>
+              <a:t>Before invocation of DFA stored procedure, this table is populated with all DFA_WORKFLOW ids associated with the entity.</a:t>
+            </a:r>
+          </a:p>
+          <a:p>
+            <a:r>
+              <a:rPr lang="en-US" dirty="0" smtClean="0"/>
+              <a:t>After invocation, this table includes any new states and workflows that were created as a result of the DFA operation.</a:t>
+            </a:r>
+            <a:endParaRPr lang="en-US" dirty="0"/>
+          </a:p>
+        </p:txBody>
+      </p:sp>
+      <p:sp>
+        <p:nvSpPr>
+          <p:cNvPr id="4" name="Slide Number Placeholder 3"/>
+          <p:cNvSpPr>
+            <a:spLocks noGrp="1"/>
+          </p:cNvSpPr>
+          <p:nvPr>
+            <p:ph type="sldNum" sz="quarter" idx="12"/>
+          </p:nvPr>
+        </p:nvSpPr>
+        <p:spPr/>
+        <p:txBody>
+          <a:bodyPr/>
+          <a:lstStyle/>
+          <a:p>
+            <a:fld id="{B6F15528-21DE-4FAA-801E-634DDDAF4B2B}" type="slidenum">
+              <a:rPr lang="en-US" smtClean="0"/>
+              <a:pPr/>
+              <a:t>22</a:t>
+            </a:fld>
+            <a:endParaRPr lang="en-US"/>
+          </a:p>
+        </p:txBody>
+      </p:sp>
+    </p:spTree>
+    <p:extLst>
+      <p:ext uri="{BB962C8B-B14F-4D97-AF65-F5344CB8AC3E}">
+        <p14:creationId xmlns:p14="http://schemas.microsoft.com/office/powerpoint/2010/main" val="1955225754"/>
+      </p:ext>
+    </p:extLst>
+  </p:cSld>
+  <p:clrMapOvr>
+    <a:masterClrMapping/>
+  </p:clrMapOvr>
+</p:sld>
+</file>
+
+<file path=ppt/slides/slide23.xml><?xml version="1.0" encoding="utf-8"?>
+<p:sld xmlns:a="http://schemas.openxmlformats.org/drawingml/2006/main" xmlns:r="http://schemas.openxmlformats.org/officeDocument/2006/relationships" xmlns:p="http://schemas.openxmlformats.org/presentationml/2006/main">
+  <p:cSld>
+    <p:spTree>
+      <p:nvGrpSpPr>
+        <p:cNvPr id="1" name=""/>
+        <p:cNvGrpSpPr/>
+        <p:nvPr/>
+      </p:nvGrpSpPr>
+      <p:grpSpPr>
+        <a:xfrm>
+          <a:off x="0" y="0"/>
+          <a:ext cx="0" cy="0"/>
+          <a:chOff x="0" y="0"/>
+          <a:chExt cx="0" cy="0"/>
+        </a:xfrm>
+      </p:grpSpPr>
+      <p:sp>
+        <p:nvSpPr>
+          <p:cNvPr id="2" name="Title 1"/>
+          <p:cNvSpPr>
+            <a:spLocks noGrp="1"/>
+          </p:cNvSpPr>
+          <p:nvPr>
+            <p:ph type="title"/>
+          </p:nvPr>
+        </p:nvSpPr>
+        <p:spPr/>
+        <p:txBody>
+          <a:bodyPr/>
+          <a:lstStyle/>
+          <a:p>
+            <a:r>
+              <a:rPr lang="en-US" dirty="0" smtClean="0"/>
+              <a:t>Entity Procedures</a:t>
+            </a:r>
+            <a:endParaRPr lang="en-US" dirty="0"/>
+          </a:p>
+        </p:txBody>
+      </p:sp>
+      <p:sp>
+        <p:nvSpPr>
+          <p:cNvPr id="3" name="Content Placeholder 2"/>
+          <p:cNvSpPr>
+            <a:spLocks noGrp="1"/>
+          </p:cNvSpPr>
+          <p:nvPr>
+            <p:ph idx="1"/>
+          </p:nvPr>
+        </p:nvSpPr>
+        <p:spPr/>
+        <p:txBody>
+          <a:bodyPr>
+            <a:normAutofit fontScale="92500" lnSpcReduction="20000"/>
+          </a:bodyPr>
+          <a:lstStyle/>
+          <a:p>
+            <a:pPr marL="514350" indent="-514350">
+              <a:buFont typeface="+mj-lt"/>
+              <a:buAutoNum type="arabicPeriod"/>
+            </a:pPr>
+            <a:r>
+              <a:rPr lang="en-US" dirty="0" smtClean="0"/>
+              <a:t>Check any additional constraints that apply to the entity for the DFA call.</a:t>
+            </a:r>
+          </a:p>
+          <a:p>
+            <a:pPr marL="514350" indent="-514350">
+              <a:buFont typeface="+mj-lt"/>
+              <a:buAutoNum type="arabicPeriod"/>
+            </a:pPr>
+            <a:r>
+              <a:rPr lang="en-US" dirty="0" smtClean="0"/>
+              <a:t>Populate DFA_WORKFLOW_ENTITY with all of the WORKFLOW IDs that are bound (associated) to the entity.</a:t>
+            </a:r>
+          </a:p>
+          <a:p>
+            <a:pPr marL="514350" indent="-514350">
+              <a:buFont typeface="+mj-lt"/>
+              <a:buAutoNum type="arabicPeriod"/>
+            </a:pPr>
+            <a:r>
+              <a:rPr lang="en-US" dirty="0" smtClean="0"/>
+              <a:t>Execute the DFA stored proc.</a:t>
+            </a:r>
+          </a:p>
+          <a:p>
+            <a:pPr marL="514350" indent="-514350">
+              <a:buFont typeface="+mj-lt"/>
+              <a:buAutoNum type="arabicPeriod"/>
+            </a:pPr>
+            <a:r>
+              <a:rPr lang="en-US" dirty="0" smtClean="0"/>
+              <a:t>Check any additional constraints against the result (held in DFA_WORKFLOW_ENTITY).</a:t>
+            </a:r>
+          </a:p>
+          <a:p>
+            <a:pPr marL="514350" indent="-514350">
+              <a:buFont typeface="+mj-lt"/>
+              <a:buAutoNum type="arabicPeriod"/>
+            </a:pPr>
+            <a:r>
+              <a:rPr lang="en-US" dirty="0" smtClean="0"/>
+              <a:t>Bind any new DFA_WORKFLOW_IDs found in DFA_WORKFLOW_ENTITY to the entity binding table.</a:t>
+            </a:r>
+            <a:endParaRPr lang="en-US" dirty="0"/>
+          </a:p>
+        </p:txBody>
+      </p:sp>
+      <p:sp>
+        <p:nvSpPr>
+          <p:cNvPr id="4" name="Slide Number Placeholder 3"/>
+          <p:cNvSpPr>
+            <a:spLocks noGrp="1"/>
+          </p:cNvSpPr>
+          <p:nvPr>
+            <p:ph type="sldNum" sz="quarter" idx="12"/>
+          </p:nvPr>
+        </p:nvSpPr>
+        <p:spPr/>
+        <p:txBody>
+          <a:bodyPr/>
+          <a:lstStyle/>
+          <a:p>
+            <a:fld id="{B6F15528-21DE-4FAA-801E-634DDDAF4B2B}" type="slidenum">
+              <a:rPr lang="en-US" smtClean="0"/>
+              <a:pPr/>
+              <a:t>23</a:t>
+            </a:fld>
+            <a:endParaRPr lang="en-US"/>
+          </a:p>
+        </p:txBody>
+      </p:sp>
+    </p:spTree>
+    <p:extLst>
+      <p:ext uri="{BB962C8B-B14F-4D97-AF65-F5344CB8AC3E}">
+        <p14:creationId xmlns:p14="http://schemas.microsoft.com/office/powerpoint/2010/main" val="478946028"/>
       </p:ext>
     </p:extLst>
   </p:cSld>
@@ -5000,14 +5917,36 @@
           <a:p>
             <a:r>
               <a:rPr lang="en-US" dirty="0" smtClean="0"/>
-              <a:t>A finite state machine is a mathematical abstraction that accepts or rejects a string based on states and transitions.</a:t>
-            </a:r>
-          </a:p>
-          <a:p>
-            <a:r>
-              <a:rPr lang="en-US" dirty="0" smtClean="0"/>
-              <a:t>[Insert FSM diagram that accepts a*b.]</a:t>
-            </a:r>
+              <a:t>A </a:t>
+            </a:r>
+            <a:r>
+              <a:rPr lang="en-US" dirty="0" smtClean="0"/>
+              <a:t>classical finite </a:t>
+            </a:r>
+            <a:r>
+              <a:rPr lang="en-US" dirty="0" smtClean="0"/>
+              <a:t>state machine is a mathematical abstraction that accepts or rejects a string </a:t>
+            </a:r>
+            <a:r>
+              <a:rPr lang="en-US" dirty="0" smtClean="0"/>
+              <a:t>using states and transitions.</a:t>
+            </a:r>
+            <a:endParaRPr lang="en-US" dirty="0" smtClean="0"/>
+          </a:p>
+          <a:p>
+            <a:r>
+              <a:rPr lang="en-US" dirty="0" smtClean="0"/>
+              <a:t>Example: Classical FSM that accepts AB*C (A followed by 0 or more </a:t>
+            </a:r>
+            <a:r>
+              <a:rPr lang="en-US" dirty="0" err="1" smtClean="0"/>
+              <a:t>Bs</a:t>
+            </a:r>
+            <a:r>
+              <a:rPr lang="en-US" dirty="0" smtClean="0"/>
+              <a:t> followed by C).</a:t>
+            </a:r>
+            <a:endParaRPr lang="en-US" dirty="0" smtClean="0"/>
           </a:p>
         </p:txBody>
       </p:sp>
@@ -5035,6 +5974,36 @@
           </a:p>
         </p:txBody>
       </p:sp>
+      <p:pic>
+        <p:nvPicPr>
+          <p:cNvPr id="7" name="Picture 6"/>
+          <p:cNvPicPr>
+            <a:picLocks noChangeAspect="1"/>
+          </p:cNvPicPr>
+          <p:nvPr/>
+        </p:nvPicPr>
+        <p:blipFill>
+          <a:blip r:embed="rId2">
+            <a:extLst>
+              <a:ext uri="{28A0092B-C50C-407E-A947-70E740481C1C}">
+                <a14:useLocalDpi xmlns:a14="http://schemas.microsoft.com/office/drawing/2010/main" val="0"/>
+              </a:ext>
+            </a:extLst>
+          </a:blip>
+          <a:stretch>
+            <a:fillRect/>
+          </a:stretch>
+        </p:blipFill>
+        <p:spPr>
+          <a:xfrm>
+            <a:off x="1193800" y="4191000"/>
+            <a:ext cx="6426200" cy="1676400"/>
+          </a:xfrm>
+          <a:prstGeom prst="rect">
+            <a:avLst/>
+          </a:prstGeom>
+        </p:spPr>
+      </p:pic>
     </p:spTree>
     <p:extLst>
       <p:ext uri="{BB962C8B-B14F-4D97-AF65-F5344CB8AC3E}">
@@ -5119,7 +6088,17 @@
           <a:p>
             <a:r>
               <a:rPr lang="en-US" dirty="0" smtClean="0"/>
-              <a:t>Commonly used in embedded systems to track or implement complex hardware state.</a:t>
+              <a:t>Commonly used in embedded systems to track or implement complex hardware state</a:t>
+            </a:r>
+            <a:r>
+              <a:rPr lang="en-US" dirty="0" smtClean="0"/>
+              <a:t>.</a:t>
+            </a:r>
+          </a:p>
+          <a:p>
+            <a:r>
+              <a:rPr lang="en-US" dirty="0" smtClean="0"/>
+              <a:t>Can also be used to track or mimic a workflow.</a:t>
             </a:r>
             <a:endParaRPr lang="en-US" dirty="0"/>
           </a:p>
@@ -5192,14 +6171,15 @@
         <p:spPr/>
         <p:txBody>
           <a:bodyPr>
-            <a:normAutofit/>
+            <a:normAutofit fontScale="90000"/>
           </a:bodyPr>
           <a:lstStyle/>
           <a:p>
             <a:r>
-              <a:rPr lang="en-US" dirty="0"/>
-              <a:t>Theoretical Graph Model</a:t>
-            </a:r>
+              <a:rPr lang="en-US" dirty="0" smtClean="0"/>
+              <a:t>Why Store and Manipulate the DFA in a Database?</a:t>
+            </a:r>
+            <a:endParaRPr lang="en-US" dirty="0"/>
           </a:p>
         </p:txBody>
       </p:sp>
@@ -5213,12 +6193,7 @@
             <p:ph idx="1"/>
           </p:nvPr>
         </p:nvSpPr>
-        <p:spPr>
-          <a:xfrm>
-            <a:off x="457200" y="1417638"/>
-            <a:ext cx="8229600" cy="4938712"/>
-          </a:xfrm>
-        </p:spPr>
+        <p:spPr/>
         <p:txBody>
           <a:bodyPr>
             <a:normAutofit lnSpcReduction="10000"/>
@@ -5227,46 +6202,52 @@
           <a:p>
             <a:r>
               <a:rPr lang="en-US" dirty="0" smtClean="0"/>
-              <a:t>All of the DFA states exist in a graph</a:t>
-            </a:r>
-            <a:r>
-              <a:rPr lang="en-US" dirty="0"/>
-              <a:t> </a:t>
-            </a:r>
-            <a:r>
-              <a:rPr lang="en-US" dirty="0" smtClean="0"/>
-              <a:t>of states with vertices labelled with events.</a:t>
-            </a:r>
-          </a:p>
-          <a:p>
-            <a:r>
-              <a:rPr lang="en-US" dirty="0" smtClean="0"/>
-              <a:t>Each DFA state may connect to zero or more states (including itself).</a:t>
-            </a:r>
-          </a:p>
-          <a:p>
-            <a:r>
-              <a:rPr lang="en-US" dirty="0" smtClean="0"/>
-              <a:t>A state uses an event no more than once.</a:t>
-            </a:r>
-          </a:p>
-          <a:p>
-            <a:r>
-              <a:rPr lang="en-US" dirty="0" smtClean="0"/>
-              <a:t>A workflow defines a start state.  </a:t>
-            </a:r>
-          </a:p>
-          <a:p>
-            <a:r>
-              <a:rPr lang="en-US" dirty="0" smtClean="0"/>
-              <a:t>Closure: the state, its events, vertices and neighbors, and the neighbors closure.</a:t>
-            </a:r>
-          </a:p>
-          <a:p>
-            <a:r>
-              <a:rPr lang="en-US" dirty="0" smtClean="0"/>
-              <a:t>The closure of a workflow </a:t>
-            </a:r>
+              <a:t>Design advantages.</a:t>
+            </a:r>
+          </a:p>
+          <a:p>
+            <a:pPr lvl="1"/>
+            <a:r>
+              <a:rPr lang="en-US" dirty="0" smtClean="0"/>
+              <a:t>Platform and language agnostic.</a:t>
+            </a:r>
+          </a:p>
+          <a:p>
+            <a:pPr lvl="1"/>
+            <a:r>
+              <a:rPr lang="en-US" dirty="0" smtClean="0"/>
+              <a:t>Implicitly keeps historical data</a:t>
+            </a:r>
+          </a:p>
+          <a:p>
+            <a:pPr lvl="1"/>
+            <a:r>
+              <a:rPr lang="en-US" dirty="0" smtClean="0"/>
+              <a:t>Handles long running workflows with many event sources.</a:t>
+            </a:r>
+          </a:p>
+          <a:p>
+            <a:r>
+              <a:rPr lang="en-US" dirty="0" smtClean="0"/>
+              <a:t>Runtime Advantages (Scalability)</a:t>
+            </a:r>
+          </a:p>
+          <a:p>
+            <a:pPr lvl="1"/>
+            <a:r>
+              <a:rPr lang="en-US" dirty="0" smtClean="0"/>
+              <a:t>Number of states does not make program larger.</a:t>
+            </a:r>
+          </a:p>
+          <a:p>
+            <a:pPr lvl="1"/>
+            <a:r>
+              <a:rPr lang="en-US" dirty="0" smtClean="0"/>
+              <a:t>Direct database operation avoids network overhead.</a:t>
+            </a:r>
+          </a:p>
+          <a:p>
+            <a:endParaRPr lang="en-US" dirty="0" smtClean="0"/>
           </a:p>
         </p:txBody>
       </p:sp>
@@ -5297,7 +6278,7 @@
     </p:spTree>
     <p:extLst>
       <p:ext uri="{BB962C8B-B14F-4D97-AF65-F5344CB8AC3E}">
-        <p14:creationId xmlns:p14="http://schemas.microsoft.com/office/powerpoint/2010/main" val="2674337966"/>
+        <p14:creationId xmlns:p14="http://schemas.microsoft.com/office/powerpoint/2010/main" val="513878988"/>
       </p:ext>
     </p:extLst>
   </p:cSld>
@@ -5337,36 +6318,58 @@
         <p:spPr/>
         <p:txBody>
           <a:bodyPr>
+            <a:normAutofit fontScale="90000"/>
+          </a:bodyPr>
+          <a:lstStyle/>
+          <a:p>
+            <a:r>
+              <a:rPr lang="en-US" dirty="0" smtClean="0"/>
+              <a:t>Design Advantage: Platform and Language Agnostic</a:t>
+            </a:r>
+            <a:endParaRPr lang="en-US" dirty="0"/>
+          </a:p>
+        </p:txBody>
+      </p:sp>
+      <p:sp>
+        <p:nvSpPr>
+          <p:cNvPr id="3" name="Content Placeholder 2"/>
+          <p:cNvSpPr>
+            <a:spLocks noGrp="1"/>
+          </p:cNvSpPr>
+          <p:nvPr>
+            <p:ph idx="1"/>
+          </p:nvPr>
+        </p:nvSpPr>
+        <p:spPr/>
+        <p:txBody>
+          <a:bodyPr>
             <a:normAutofit/>
           </a:bodyPr>
           <a:lstStyle/>
           <a:p>
             <a:r>
               <a:rPr lang="en-US" dirty="0" smtClean="0"/>
-              <a:t>Database DFA Schema</a:t>
-            </a:r>
-            <a:endParaRPr lang="en-US" dirty="0"/>
-          </a:p>
-        </p:txBody>
-      </p:sp>
-      <p:sp>
-        <p:nvSpPr>
-          <p:cNvPr id="3" name="Content Placeholder 2"/>
-          <p:cNvSpPr>
-            <a:spLocks noGrp="1"/>
-          </p:cNvSpPr>
-          <p:nvPr>
-            <p:ph idx="1"/>
-          </p:nvPr>
-        </p:nvSpPr>
-        <p:spPr/>
-        <p:txBody>
-          <a:bodyPr/>
-          <a:lstStyle/>
-          <a:p>
-            <a:r>
-              <a:rPr lang="en-US" dirty="0" smtClean="0"/>
-              <a:t>[Insert Picture of Schema Here]</a:t>
+              <a:t>As long as the client can connect and use the database, it will work.</a:t>
+            </a:r>
+          </a:p>
+          <a:p>
+            <a:r>
+              <a:rPr lang="en-US" dirty="0" smtClean="0"/>
+              <a:t>In my current project, we have both our Java web project and </a:t>
+            </a:r>
+            <a:r>
+              <a:rPr lang="en-US" dirty="0" err="1" smtClean="0"/>
+              <a:t>DataStage</a:t>
+            </a:r>
+            <a:r>
+              <a:rPr lang="en-US" dirty="0" smtClean="0"/>
+              <a:t> ETL (Extract, Transform and Load) tool manipulating the DFA through its stored procedure interface.</a:t>
+            </a:r>
+          </a:p>
+          <a:p>
+            <a:r>
+              <a:rPr lang="en-US" dirty="0" smtClean="0"/>
+              <a:t>Other sources could be added, such as web services or ESB (Enterprise Service Bus) calls.</a:t>
             </a:r>
             <a:endParaRPr lang="en-US" dirty="0"/>
           </a:p>
@@ -5399,7 +6402,7 @@
     </p:spTree>
     <p:extLst>
       <p:ext uri="{BB962C8B-B14F-4D97-AF65-F5344CB8AC3E}">
-        <p14:creationId xmlns:p14="http://schemas.microsoft.com/office/powerpoint/2010/main" val="1119797094"/>
+        <p14:creationId xmlns:p14="http://schemas.microsoft.com/office/powerpoint/2010/main" val="3239445586"/>
       </p:ext>
     </p:extLst>
   </p:cSld>
@@ -5438,12 +6441,14 @@
         </p:nvSpPr>
         <p:spPr/>
         <p:txBody>
-          <a:bodyPr/>
-          <a:lstStyle/>
-          <a:p>
-            <a:r>
-              <a:rPr lang="en-US" dirty="0" smtClean="0"/>
-              <a:t>LKUP_EVENT</a:t>
+          <a:bodyPr>
+            <a:normAutofit fontScale="90000"/>
+          </a:bodyPr>
+          <a:lstStyle/>
+          <a:p>
+            <a:r>
+              <a:rPr lang="en-US" dirty="0" smtClean="0"/>
+              <a:t>Design Advantage: Historical Persistence</a:t>
             </a:r>
             <a:endParaRPr lang="en-US" dirty="0"/>
           </a:p>
@@ -5466,20 +6471,27 @@
           <a:p>
             <a:r>
               <a:rPr lang="en-US" dirty="0" smtClean="0"/>
-              <a:t>The elements in this table define the events, which correspond to the set of symbols available to a classical FSM.</a:t>
-            </a:r>
-          </a:p>
-          <a:p>
-            <a:r>
-              <a:rPr lang="en-US" dirty="0" smtClean="0"/>
-              <a:t>Defines the default display name (or resource key) and if the event is passive (the resulting state does not become the current state).</a:t>
-            </a:r>
-          </a:p>
-          <a:p>
-            <a:r>
-              <a:rPr lang="en-US" dirty="0" smtClean="0"/>
-              <a:t>Passive events are useful for features such as leaving comments.</a:t>
-            </a:r>
+              <a:t>DFA collects and make available historical data</a:t>
+            </a:r>
+          </a:p>
+          <a:p>
+            <a:r>
+              <a:rPr lang="en-US" dirty="0" smtClean="0"/>
+              <a:t>Enables analytics reports to identify slow points and pain points in workflows.</a:t>
+            </a:r>
+          </a:p>
+          <a:p>
+            <a:r>
+              <a:rPr lang="en-US" dirty="0" smtClean="0"/>
+              <a:t>Workflow may be long running between events (not session bound).  Days, weeks, months or years may pass between events.</a:t>
+            </a:r>
+          </a:p>
+          <a:p>
+            <a:r>
+              <a:rPr lang="en-US" dirty="0" smtClean="0"/>
+              <a:t>Events may be sent to the workflow from many sources.</a:t>
+            </a:r>
+            <a:endParaRPr lang="en-US" dirty="0"/>
           </a:p>
         </p:txBody>
       </p:sp>
@@ -5510,7 +6522,7 @@
     </p:spTree>
     <p:extLst>
       <p:ext uri="{BB962C8B-B14F-4D97-AF65-F5344CB8AC3E}">
-        <p14:creationId xmlns:p14="http://schemas.microsoft.com/office/powerpoint/2010/main" val="2005962276"/>
+        <p14:creationId xmlns:p14="http://schemas.microsoft.com/office/powerpoint/2010/main" val="3281238429"/>
       </p:ext>
     </p:extLst>
   </p:cSld>

</xml_diff>

<commit_message>
Add event driven DFA diagram to slide deck.
</commit_message>
<xml_diff>
--- a/Modeling Workflows with Event Driven DFA.pptx
+++ b/Modeling Workflows with Event Driven DFA.pptx
@@ -230,7 +230,7 @@
           <a:p>
             <a:fld id="{D0F15B3C-1181-4445-BB6A-6BED1DF2958C}" type="datetimeFigureOut">
               <a:rPr lang="en-US" smtClean="0"/>
-              <a:t>3/28/2015</a:t>
+              <a:t>3/30/2015</a:t>
             </a:fld>
             <a:endParaRPr lang="en-US"/>
           </a:p>
@@ -847,7 +847,7 @@
           <a:p>
             <a:fld id="{2927DE08-9B48-44D6-83D4-230A82F93FAE}" type="datetime1">
               <a:rPr lang="en-US" smtClean="0"/>
-              <a:t>3/28/2015</a:t>
+              <a:t>3/30/2015</a:t>
             </a:fld>
             <a:endParaRPr lang="en-US"/>
           </a:p>
@@ -1013,7 +1013,7 @@
           <a:p>
             <a:fld id="{5D95C52C-C3C1-4927-8E70-C103DE1C3321}" type="datetime1">
               <a:rPr lang="en-US" smtClean="0"/>
-              <a:t>3/28/2015</a:t>
+              <a:t>3/30/2015</a:t>
             </a:fld>
             <a:endParaRPr lang="en-US"/>
           </a:p>
@@ -1189,7 +1189,7 @@
           <a:p>
             <a:fld id="{90E3D6A5-38A1-4FEC-A43A-47F48DEDEFD3}" type="datetime1">
               <a:rPr lang="en-US" smtClean="0"/>
-              <a:t>3/28/2015</a:t>
+              <a:t>3/30/2015</a:t>
             </a:fld>
             <a:endParaRPr lang="en-US"/>
           </a:p>
@@ -1355,7 +1355,7 @@
           <a:p>
             <a:fld id="{D8E26438-717D-40FF-AE1C-BA0484F53167}" type="datetime1">
               <a:rPr lang="en-US" smtClean="0"/>
-              <a:t>3/28/2015</a:t>
+              <a:t>3/30/2015</a:t>
             </a:fld>
             <a:endParaRPr lang="en-US"/>
           </a:p>
@@ -1597,7 +1597,7 @@
           <a:p>
             <a:fld id="{204240F7-7708-4F95-8DF5-779CE1EBFAFE}" type="datetime1">
               <a:rPr lang="en-US" smtClean="0"/>
-              <a:t>3/28/2015</a:t>
+              <a:t>3/30/2015</a:t>
             </a:fld>
             <a:endParaRPr lang="en-US"/>
           </a:p>
@@ -1881,7 +1881,7 @@
           <a:p>
             <a:fld id="{9AB1B8F5-007F-4624-9D09-74A4BB144A1B}" type="datetime1">
               <a:rPr lang="en-US" smtClean="0"/>
-              <a:t>3/28/2015</a:t>
+              <a:t>3/30/2015</a:t>
             </a:fld>
             <a:endParaRPr lang="en-US"/>
           </a:p>
@@ -2299,7 +2299,7 @@
           <a:p>
             <a:fld id="{33652302-F773-471B-A447-C9E7D11FB526}" type="datetime1">
               <a:rPr lang="en-US" smtClean="0"/>
-              <a:t>3/28/2015</a:t>
+              <a:t>3/30/2015</a:t>
             </a:fld>
             <a:endParaRPr lang="en-US"/>
           </a:p>
@@ -2413,7 +2413,7 @@
           <a:p>
             <a:fld id="{505FC5C8-7D30-45A5-B6D7-01D5FFF04AAA}" type="datetime1">
               <a:rPr lang="en-US" smtClean="0"/>
-              <a:t>3/28/2015</a:t>
+              <a:t>3/30/2015</a:t>
             </a:fld>
             <a:endParaRPr lang="en-US"/>
           </a:p>
@@ -2504,7 +2504,7 @@
           <a:p>
             <a:fld id="{2203C164-A71A-4152-83A1-27E2B515D187}" type="datetime1">
               <a:rPr lang="en-US" smtClean="0"/>
-              <a:t>3/28/2015</a:t>
+              <a:t>3/30/2015</a:t>
             </a:fld>
             <a:endParaRPr lang="en-US"/>
           </a:p>
@@ -2777,7 +2777,7 @@
           <a:p>
             <a:fld id="{0B77CF3C-9740-4894-A406-34BF11EA8119}" type="datetime1">
               <a:rPr lang="en-US" smtClean="0"/>
-              <a:t>3/28/2015</a:t>
+              <a:t>3/30/2015</a:t>
             </a:fld>
             <a:endParaRPr lang="en-US"/>
           </a:p>
@@ -3026,7 +3026,7 @@
           <a:p>
             <a:fld id="{65AEF08F-C222-4314-9819-054B5D3660D4}" type="datetime1">
               <a:rPr lang="en-US" smtClean="0"/>
-              <a:t>3/28/2015</a:t>
+              <a:t>3/30/2015</a:t>
             </a:fld>
             <a:endParaRPr lang="en-US"/>
           </a:p>
@@ -3235,7 +3235,7 @@
           <a:p>
             <a:fld id="{97CA4D54-662E-4D1F-9D66-59ED33158556}" type="datetime1">
               <a:rPr lang="en-US" smtClean="0"/>
-              <a:t>3/28/2015</a:t>
+              <a:t>3/30/2015</a:t>
             </a:fld>
             <a:endParaRPr lang="en-US"/>
           </a:p>
@@ -5418,11 +5418,7 @@
           <a:p>
             <a:r>
               <a:rPr lang="en-US" dirty="0" smtClean="0"/>
-              <a:t>For </a:t>
-            </a:r>
-            <a:r>
-              <a:rPr lang="en-US" dirty="0" smtClean="0"/>
-              <a:t>the </a:t>
+              <a:t>For the </a:t>
             </a:r>
             <a:r>
               <a:rPr lang="en-US" cap="small" dirty="0" smtClean="0"/>
@@ -5446,7 +5442,6 @@
               <a:rPr lang="en-US" dirty="0" smtClean="0"/>
               <a:t>Allows only 1 employee per DFA action.</a:t>
             </a:r>
-            <a:endParaRPr lang="en-US" dirty="0" smtClean="0"/>
           </a:p>
         </p:txBody>
       </p:sp>
@@ -6106,8 +6101,8 @@
         </p:blipFill>
         <p:spPr>
           <a:xfrm>
-            <a:off x="1193800" y="4191000"/>
-            <a:ext cx="6426200" cy="1676400"/>
+            <a:off x="609599" y="4190999"/>
+            <a:ext cx="7418125" cy="1935163"/>
           </a:xfrm>
           <a:prstGeom prst="rect">
             <a:avLst/>
@@ -6157,13 +6152,17 @@
         <p:spPr/>
         <p:txBody>
           <a:bodyPr>
-            <a:normAutofit fontScale="90000"/>
+            <a:normAutofit/>
           </a:bodyPr>
           <a:lstStyle/>
           <a:p>
             <a:r>
               <a:rPr lang="en-US" dirty="0" smtClean="0"/>
-              <a:t>Event Driven Deterministic Finite Automata (DFA)</a:t>
+              <a:t>Event </a:t>
+            </a:r>
+            <a:r>
+              <a:rPr lang="en-US" dirty="0" smtClean="0"/>
+              <a:t>Driven Finite State Machine</a:t>
             </a:r>
             <a:endParaRPr lang="en-US" dirty="0"/>
           </a:p>
@@ -6179,34 +6178,40 @@
             <p:ph idx="1"/>
           </p:nvPr>
         </p:nvSpPr>
-        <p:spPr/>
-        <p:txBody>
-          <a:bodyPr/>
-          <a:lstStyle/>
-          <a:p>
-            <a:r>
-              <a:rPr lang="en-US" dirty="0" smtClean="0"/>
-              <a:t>A finite state machine that uses events instead of an alphabet.</a:t>
-            </a:r>
-          </a:p>
-          <a:p>
-            <a:r>
-              <a:rPr lang="en-US" dirty="0" smtClean="0"/>
-              <a:t>States can convey meanings besides ‘Accept’ and ‘Reject’</a:t>
-            </a:r>
-          </a:p>
-          <a:p>
-            <a:r>
-              <a:rPr lang="en-US" dirty="0" smtClean="0"/>
-              <a:t>Commonly used in embedded systems to track or implement complex hardware state.</a:t>
-            </a:r>
-          </a:p>
-          <a:p>
-            <a:r>
-              <a:rPr lang="en-US" dirty="0" smtClean="0"/>
-              <a:t>Can also be used to track or mimic a workflow.</a:t>
-            </a:r>
-            <a:endParaRPr lang="en-US" dirty="0"/>
+        <p:spPr>
+          <a:xfrm>
+            <a:off x="457200" y="1414590"/>
+            <a:ext cx="8229600" cy="4525963"/>
+          </a:xfrm>
+        </p:spPr>
+        <p:txBody>
+          <a:bodyPr/>
+          <a:lstStyle/>
+          <a:p>
+            <a:r>
+              <a:rPr lang="en-US" dirty="0" smtClean="0"/>
+              <a:t>Uses events </a:t>
+            </a:r>
+            <a:r>
+              <a:rPr lang="en-US" dirty="0" smtClean="0"/>
+              <a:t>instead of an alphabet.</a:t>
+            </a:r>
+          </a:p>
+          <a:p>
+            <a:r>
+              <a:rPr lang="en-US" dirty="0" smtClean="0"/>
+              <a:t>Commonly </a:t>
+            </a:r>
+            <a:r>
+              <a:rPr lang="en-US" dirty="0" smtClean="0"/>
+              <a:t>used in embedded systems to track or implement complex hardware state.</a:t>
+            </a:r>
+          </a:p>
+          <a:p>
+            <a:r>
+              <a:rPr lang="en-US" dirty="0" smtClean="0"/>
+              <a:t>Example FSM that models a review process that requires one or more reviewers.</a:t>
+            </a:r>
           </a:p>
         </p:txBody>
       </p:sp>
@@ -6234,6 +6239,36 @@
           </a:p>
         </p:txBody>
       </p:sp>
+      <p:pic>
+        <p:nvPicPr>
+          <p:cNvPr id="7" name="Picture 6"/>
+          <p:cNvPicPr>
+            <a:picLocks noChangeAspect="1"/>
+          </p:cNvPicPr>
+          <p:nvPr/>
+        </p:nvPicPr>
+        <p:blipFill>
+          <a:blip r:embed="rId2">
+            <a:extLst>
+              <a:ext uri="{28A0092B-C50C-407E-A947-70E740481C1C}">
+                <a14:useLocalDpi xmlns:a14="http://schemas.microsoft.com/office/drawing/2010/main" val="0"/>
+              </a:ext>
+            </a:extLst>
+          </a:blip>
+          <a:stretch>
+            <a:fillRect/>
+          </a:stretch>
+        </p:blipFill>
+        <p:spPr>
+          <a:xfrm>
+            <a:off x="609600" y="4114799"/>
+            <a:ext cx="7924800" cy="2299003"/>
+          </a:xfrm>
+          <a:prstGeom prst="rect">
+            <a:avLst/>
+          </a:prstGeom>
+        </p:spPr>
+      </p:pic>
     </p:spTree>
     <p:extLst>
       <p:ext uri="{BB962C8B-B14F-4D97-AF65-F5344CB8AC3E}">

</xml_diff>

<commit_message>
Add scary workflow to motivation slide.  Still needs wrapup / conclusion slides.
</commit_message>
<xml_diff>
--- a/Modeling Workflows with Event Driven DFA.pptx
+++ b/Modeling Workflows with Event Driven DFA.pptx
@@ -230,7 +230,7 @@
           <a:p>
             <a:fld id="{D0F15B3C-1181-4445-BB6A-6BED1DF2958C}" type="datetimeFigureOut">
               <a:rPr lang="en-US" smtClean="0"/>
-              <a:t>3/30/2015</a:t>
+              <a:t>3/31/2015</a:t>
             </a:fld>
             <a:endParaRPr lang="en-US"/>
           </a:p>
@@ -847,7 +847,7 @@
           <a:p>
             <a:fld id="{2927DE08-9B48-44D6-83D4-230A82F93FAE}" type="datetime1">
               <a:rPr lang="en-US" smtClean="0"/>
-              <a:t>3/30/2015</a:t>
+              <a:t>3/31/2015</a:t>
             </a:fld>
             <a:endParaRPr lang="en-US"/>
           </a:p>
@@ -1013,7 +1013,7 @@
           <a:p>
             <a:fld id="{5D95C52C-C3C1-4927-8E70-C103DE1C3321}" type="datetime1">
               <a:rPr lang="en-US" smtClean="0"/>
-              <a:t>3/30/2015</a:t>
+              <a:t>3/31/2015</a:t>
             </a:fld>
             <a:endParaRPr lang="en-US"/>
           </a:p>
@@ -1189,7 +1189,7 @@
           <a:p>
             <a:fld id="{90E3D6A5-38A1-4FEC-A43A-47F48DEDEFD3}" type="datetime1">
               <a:rPr lang="en-US" smtClean="0"/>
-              <a:t>3/30/2015</a:t>
+              <a:t>3/31/2015</a:t>
             </a:fld>
             <a:endParaRPr lang="en-US"/>
           </a:p>
@@ -1355,7 +1355,7 @@
           <a:p>
             <a:fld id="{D8E26438-717D-40FF-AE1C-BA0484F53167}" type="datetime1">
               <a:rPr lang="en-US" smtClean="0"/>
-              <a:t>3/30/2015</a:t>
+              <a:t>3/31/2015</a:t>
             </a:fld>
             <a:endParaRPr lang="en-US"/>
           </a:p>
@@ -1597,7 +1597,7 @@
           <a:p>
             <a:fld id="{204240F7-7708-4F95-8DF5-779CE1EBFAFE}" type="datetime1">
               <a:rPr lang="en-US" smtClean="0"/>
-              <a:t>3/30/2015</a:t>
+              <a:t>3/31/2015</a:t>
             </a:fld>
             <a:endParaRPr lang="en-US"/>
           </a:p>
@@ -1881,7 +1881,7 @@
           <a:p>
             <a:fld id="{9AB1B8F5-007F-4624-9D09-74A4BB144A1B}" type="datetime1">
               <a:rPr lang="en-US" smtClean="0"/>
-              <a:t>3/30/2015</a:t>
+              <a:t>3/31/2015</a:t>
             </a:fld>
             <a:endParaRPr lang="en-US"/>
           </a:p>
@@ -2299,7 +2299,7 @@
           <a:p>
             <a:fld id="{33652302-F773-471B-A447-C9E7D11FB526}" type="datetime1">
               <a:rPr lang="en-US" smtClean="0"/>
-              <a:t>3/30/2015</a:t>
+              <a:t>3/31/2015</a:t>
             </a:fld>
             <a:endParaRPr lang="en-US"/>
           </a:p>
@@ -2413,7 +2413,7 @@
           <a:p>
             <a:fld id="{505FC5C8-7D30-45A5-B6D7-01D5FFF04AAA}" type="datetime1">
               <a:rPr lang="en-US" smtClean="0"/>
-              <a:t>3/30/2015</a:t>
+              <a:t>3/31/2015</a:t>
             </a:fld>
             <a:endParaRPr lang="en-US"/>
           </a:p>
@@ -2504,7 +2504,7 @@
           <a:p>
             <a:fld id="{2203C164-A71A-4152-83A1-27E2B515D187}" type="datetime1">
               <a:rPr lang="en-US" smtClean="0"/>
-              <a:t>3/30/2015</a:t>
+              <a:t>3/31/2015</a:t>
             </a:fld>
             <a:endParaRPr lang="en-US"/>
           </a:p>
@@ -2777,7 +2777,7 @@
           <a:p>
             <a:fld id="{0B77CF3C-9740-4894-A406-34BF11EA8119}" type="datetime1">
               <a:rPr lang="en-US" smtClean="0"/>
-              <a:t>3/30/2015</a:t>
+              <a:t>3/31/2015</a:t>
             </a:fld>
             <a:endParaRPr lang="en-US"/>
           </a:p>
@@ -3026,7 +3026,7 @@
           <a:p>
             <a:fld id="{65AEF08F-C222-4314-9819-054B5D3660D4}" type="datetime1">
               <a:rPr lang="en-US" smtClean="0"/>
-              <a:t>3/30/2015</a:t>
+              <a:t>3/31/2015</a:t>
             </a:fld>
             <a:endParaRPr lang="en-US"/>
           </a:p>
@@ -3235,7 +3235,7 @@
           <a:p>
             <a:fld id="{97CA4D54-662E-4D1F-9D66-59ED33158556}" type="datetime1">
               <a:rPr lang="en-US" smtClean="0"/>
-              <a:t>3/30/2015</a:t>
+              <a:t>3/31/2015</a:t>
             </a:fld>
             <a:endParaRPr lang="en-US"/>
           </a:p>
@@ -5822,15 +5822,32 @@
           <a:p>
             <a:r>
               <a:rPr lang="en-US" dirty="0" smtClean="0"/>
-              <a:t>Customer wanted long running complex workflow implemented</a:t>
-            </a:r>
-          </a:p>
-          <a:p>
-            <a:r>
-              <a:rPr lang="en-US" dirty="0" smtClean="0"/>
-              <a:t>[Workflow Image Here]</a:t>
-            </a:r>
-            <a:endParaRPr lang="en-US" dirty="0"/>
+              <a:t>Customer </a:t>
+            </a:r>
+            <a:r>
+              <a:rPr lang="en-US" dirty="0" smtClean="0"/>
+              <a:t>wants </a:t>
+            </a:r>
+            <a:r>
+              <a:rPr lang="en-US" dirty="0" smtClean="0"/>
+              <a:t>over 25 long </a:t>
+            </a:r>
+            <a:r>
+              <a:rPr lang="en-US" dirty="0" smtClean="0"/>
+              <a:t>running complex </a:t>
+            </a:r>
+            <a:r>
+              <a:rPr lang="en-US" dirty="0" smtClean="0"/>
+              <a:t>workflows </a:t>
+            </a:r>
+            <a:r>
+              <a:rPr lang="en-US" smtClean="0"/>
+              <a:t>like this one implemented.</a:t>
+            </a:r>
+            <a:endParaRPr lang="en-US" dirty="0" smtClean="0"/>
+          </a:p>
+          <a:p>
+            <a:endParaRPr lang="en-US" dirty="0" smtClean="0"/>
           </a:p>
         </p:txBody>
       </p:sp>
@@ -5858,6 +5875,30 @@
           </a:p>
         </p:txBody>
       </p:sp>
+      <p:pic>
+        <p:nvPicPr>
+          <p:cNvPr id="5" name="Picture 4"/>
+          <p:cNvPicPr>
+            <a:picLocks noChangeAspect="1"/>
+          </p:cNvPicPr>
+          <p:nvPr/>
+        </p:nvPicPr>
+        <p:blipFill>
+          <a:blip r:embed="rId3"/>
+          <a:stretch>
+            <a:fillRect/>
+          </a:stretch>
+        </p:blipFill>
+        <p:spPr>
+          <a:xfrm>
+            <a:off x="75810" y="2743200"/>
+            <a:ext cx="8992379" cy="3518964"/>
+          </a:xfrm>
+          <a:prstGeom prst="rect">
+            <a:avLst/>
+          </a:prstGeom>
+        </p:spPr>
+      </p:pic>
     </p:spTree>
     <p:extLst>
       <p:ext uri="{BB962C8B-B14F-4D97-AF65-F5344CB8AC3E}">
@@ -6158,11 +6199,7 @@
           <a:p>
             <a:r>
               <a:rPr lang="en-US" dirty="0" smtClean="0"/>
-              <a:t>Event </a:t>
-            </a:r>
-            <a:r>
-              <a:rPr lang="en-US" dirty="0" smtClean="0"/>
-              <a:t>Driven Finite State Machine</a:t>
+              <a:t>Event Driven Finite State Machine</a:t>
             </a:r>
             <a:endParaRPr lang="en-US" dirty="0"/>
           </a:p>
@@ -6190,21 +6227,13 @@
           <a:p>
             <a:r>
               <a:rPr lang="en-US" dirty="0" smtClean="0"/>
-              <a:t>Uses events </a:t>
-            </a:r>
-            <a:r>
-              <a:rPr lang="en-US" dirty="0" smtClean="0"/>
-              <a:t>instead of an alphabet.</a:t>
-            </a:r>
-          </a:p>
-          <a:p>
-            <a:r>
-              <a:rPr lang="en-US" dirty="0" smtClean="0"/>
-              <a:t>Commonly </a:t>
-            </a:r>
-            <a:r>
-              <a:rPr lang="en-US" dirty="0" smtClean="0"/>
-              <a:t>used in embedded systems to track or implement complex hardware state.</a:t>
+              <a:t>Uses events instead of an alphabet.</a:t>
+            </a:r>
+          </a:p>
+          <a:p>
+            <a:r>
+              <a:rPr lang="en-US" dirty="0" smtClean="0"/>
+              <a:t>Commonly used in embedded systems to track or implement complex hardware state.</a:t>
             </a:r>
           </a:p>
           <a:p>

</xml_diff>

<commit_message>
Slide deck 1st draft without QR code and tinylink.
</commit_message>
<xml_diff>
--- a/Modeling Workflows with Event Driven DFA.pptx
+++ b/Modeling Workflows with Event Driven DFA.pptx
@@ -5,7 +5,7 @@
     <p:sldMasterId id="2147483648" r:id="rId1"/>
   </p:sldMasterIdLst>
   <p:notesMasterIdLst>
-    <p:notesMasterId r:id="rId25"/>
+    <p:notesMasterId r:id="rId28"/>
   </p:notesMasterIdLst>
   <p:sldIdLst>
     <p:sldId id="256" r:id="rId2"/>
@@ -31,6 +31,9 @@
     <p:sldId id="276" r:id="rId22"/>
     <p:sldId id="278" r:id="rId23"/>
     <p:sldId id="277" r:id="rId24"/>
+    <p:sldId id="279" r:id="rId25"/>
+    <p:sldId id="280" r:id="rId26"/>
+    <p:sldId id="281" r:id="rId27"/>
   </p:sldIdLst>
   <p:sldSz cx="9144000" cy="6858000" type="screen4x3"/>
   <p:notesSz cx="6858000" cy="9144000"/>
@@ -3915,8 +3918,9 @@
           <a:p>
             <a:r>
               <a:rPr lang="en-US" dirty="0" smtClean="0"/>
-              <a:t>The closure of a workflow </a:t>
-            </a:r>
+              <a:t>Workflow is defined by its start state’s closure.</a:t>
+            </a:r>
+            <a:endParaRPr lang="en-US" dirty="0" smtClean="0"/>
           </a:p>
         </p:txBody>
       </p:sp>
@@ -4250,10 +4254,14 @@
             </a:r>
             <a:r>
               <a:rPr lang="en-US" cap="small" dirty="0" smtClean="0"/>
-              <a:t>salary change</a:t>
-            </a:r>
-            <a:r>
-              <a:rPr lang="en-US" dirty="0"/>
+              <a:t>salary </a:t>
+            </a:r>
+            <a:r>
+              <a:rPr lang="en-US" cap="small" dirty="0" smtClean="0"/>
+              <a:t>increase</a:t>
+            </a:r>
+            <a:r>
+              <a:rPr lang="en-US" dirty="0" smtClean="0"/>
               <a:t> </a:t>
             </a:r>
             <a:r>
@@ -4830,8 +4838,19 @@
           <a:p>
             <a:r>
               <a:rPr lang="en-US" dirty="0" smtClean="0"/>
-              <a:t>Workflows for various employee awards at the same level may share the same workflow for review and approval.</a:t>
-            </a:r>
+              <a:t>Workflows for various employee awards at the same level may share the same workflow for review and approval</a:t>
+            </a:r>
+            <a:r>
+              <a:rPr lang="en-US" dirty="0" smtClean="0"/>
+              <a:t>.</a:t>
+            </a:r>
+          </a:p>
+          <a:p>
+            <a:r>
+              <a:rPr lang="en-US" dirty="0" smtClean="0"/>
+              <a:t>There could be workflows for both approving a new salary and hiring a new employee.  The hiring a new employee could use (transition into) the approving a new salary workflow.</a:t>
+            </a:r>
+            <a:endParaRPr lang="en-US" dirty="0" smtClean="0"/>
           </a:p>
           <a:p>
             <a:endParaRPr lang="en-US" dirty="0" smtClean="0"/>
@@ -5272,8 +5291,21 @@
           <a:p>
             <a:r>
               <a:rPr lang="en-US" dirty="0" smtClean="0"/>
-              <a:t>Has exactly 1 current workflow state.</a:t>
-            </a:r>
+              <a:t>Each workflow h</a:t>
+            </a:r>
+            <a:r>
+              <a:rPr lang="en-US" dirty="0" smtClean="0"/>
+              <a:t>as 1 </a:t>
+            </a:r>
+            <a:r>
+              <a:rPr lang="en-US" dirty="0" smtClean="0"/>
+              <a:t>current workflow </a:t>
+            </a:r>
+            <a:r>
+              <a:rPr lang="en-US" dirty="0" smtClean="0"/>
+              <a:t>state.</a:t>
+            </a:r>
+            <a:endParaRPr lang="en-US" dirty="0" smtClean="0"/>
           </a:p>
           <a:p>
             <a:r>
@@ -5284,11 +5316,7 @@
           <a:p>
             <a:r>
               <a:rPr lang="en-US" dirty="0" smtClean="0"/>
-              <a:t>Has comments that apply to the </a:t>
-            </a:r>
-            <a:r>
-              <a:rPr lang="en-US" smtClean="0"/>
-              <a:t>particular state.</a:t>
+              <a:t>Has comments that apply to the particular state.</a:t>
             </a:r>
             <a:endParaRPr lang="en-US" dirty="0"/>
           </a:p>
@@ -5765,6 +5793,330 @@
 </p:sld>
 </file>
 
+<file path=ppt/slides/slide24.xml><?xml version="1.0" encoding="utf-8"?>
+<p:sld xmlns:a="http://schemas.openxmlformats.org/drawingml/2006/main" xmlns:r="http://schemas.openxmlformats.org/officeDocument/2006/relationships" xmlns:p="http://schemas.openxmlformats.org/presentationml/2006/main">
+  <p:cSld>
+    <p:spTree>
+      <p:nvGrpSpPr>
+        <p:cNvPr id="1" name=""/>
+        <p:cNvGrpSpPr/>
+        <p:nvPr/>
+      </p:nvGrpSpPr>
+      <p:grpSpPr>
+        <a:xfrm>
+          <a:off x="0" y="0"/>
+          <a:ext cx="0" cy="0"/>
+          <a:chOff x="0" y="0"/>
+          <a:chExt cx="0" cy="0"/>
+        </a:xfrm>
+      </p:grpSpPr>
+      <p:sp>
+        <p:nvSpPr>
+          <p:cNvPr id="5" name="Title 4"/>
+          <p:cNvSpPr>
+            <a:spLocks noGrp="1"/>
+          </p:cNvSpPr>
+          <p:nvPr>
+            <p:ph type="ctrTitle"/>
+          </p:nvPr>
+        </p:nvSpPr>
+        <p:spPr/>
+        <p:txBody>
+          <a:bodyPr/>
+          <a:lstStyle/>
+          <a:p>
+            <a:r>
+              <a:rPr lang="en-US" dirty="0" smtClean="0"/>
+              <a:t>Employee Demo</a:t>
+            </a:r>
+            <a:endParaRPr lang="en-US" dirty="0"/>
+          </a:p>
+        </p:txBody>
+      </p:sp>
+      <p:sp>
+        <p:nvSpPr>
+          <p:cNvPr id="6" name="Subtitle 5"/>
+          <p:cNvSpPr>
+            <a:spLocks noGrp="1"/>
+          </p:cNvSpPr>
+          <p:nvPr>
+            <p:ph type="subTitle" idx="1"/>
+          </p:nvPr>
+        </p:nvSpPr>
+        <p:spPr/>
+        <p:txBody>
+          <a:bodyPr/>
+          <a:lstStyle/>
+          <a:p>
+            <a:r>
+              <a:rPr lang="en-US" dirty="0" smtClean="0"/>
+              <a:t>Demonstration of DFA used to track workflow of hiring a new employee.</a:t>
+            </a:r>
+            <a:endParaRPr lang="en-US" dirty="0"/>
+          </a:p>
+        </p:txBody>
+      </p:sp>
+      <p:sp>
+        <p:nvSpPr>
+          <p:cNvPr id="4" name="Slide Number Placeholder 3"/>
+          <p:cNvSpPr>
+            <a:spLocks noGrp="1"/>
+          </p:cNvSpPr>
+          <p:nvPr>
+            <p:ph type="sldNum" sz="quarter" idx="12"/>
+          </p:nvPr>
+        </p:nvSpPr>
+        <p:spPr/>
+        <p:txBody>
+          <a:bodyPr/>
+          <a:lstStyle/>
+          <a:p>
+            <a:fld id="{B6F15528-21DE-4FAA-801E-634DDDAF4B2B}" type="slidenum">
+              <a:rPr lang="en-US" smtClean="0"/>
+              <a:pPr/>
+              <a:t>24</a:t>
+            </a:fld>
+            <a:endParaRPr lang="en-US"/>
+          </a:p>
+        </p:txBody>
+      </p:sp>
+    </p:spTree>
+    <p:extLst>
+      <p:ext uri="{BB962C8B-B14F-4D97-AF65-F5344CB8AC3E}">
+        <p14:creationId xmlns:p14="http://schemas.microsoft.com/office/powerpoint/2010/main" val="95673676"/>
+      </p:ext>
+    </p:extLst>
+  </p:cSld>
+  <p:clrMapOvr>
+    <a:masterClrMapping/>
+  </p:clrMapOvr>
+</p:sld>
+</file>
+
+<file path=ppt/slides/slide25.xml><?xml version="1.0" encoding="utf-8"?>
+<p:sld xmlns:a="http://schemas.openxmlformats.org/drawingml/2006/main" xmlns:r="http://schemas.openxmlformats.org/officeDocument/2006/relationships" xmlns:p="http://schemas.openxmlformats.org/presentationml/2006/main">
+  <p:cSld>
+    <p:spTree>
+      <p:nvGrpSpPr>
+        <p:cNvPr id="1" name=""/>
+        <p:cNvGrpSpPr/>
+        <p:nvPr/>
+      </p:nvGrpSpPr>
+      <p:grpSpPr>
+        <a:xfrm>
+          <a:off x="0" y="0"/>
+          <a:ext cx="0" cy="0"/>
+          <a:chOff x="0" y="0"/>
+          <a:chExt cx="0" cy="0"/>
+        </a:xfrm>
+      </p:grpSpPr>
+      <p:sp>
+        <p:nvSpPr>
+          <p:cNvPr id="2" name="Title 1"/>
+          <p:cNvSpPr>
+            <a:spLocks noGrp="1"/>
+          </p:cNvSpPr>
+          <p:nvPr>
+            <p:ph type="title"/>
+          </p:nvPr>
+        </p:nvSpPr>
+        <p:spPr/>
+        <p:txBody>
+          <a:bodyPr/>
+          <a:lstStyle/>
+          <a:p>
+            <a:r>
+              <a:rPr lang="en-US" dirty="0" smtClean="0"/>
+              <a:t>Is DFA Workflow the Right </a:t>
+            </a:r>
+            <a:r>
+              <a:rPr lang="en-US" dirty="0"/>
+              <a:t>C</a:t>
+            </a:r>
+            <a:r>
+              <a:rPr lang="en-US" dirty="0" smtClean="0"/>
+              <a:t>hoice?</a:t>
+            </a:r>
+            <a:endParaRPr lang="en-US" dirty="0"/>
+          </a:p>
+        </p:txBody>
+      </p:sp>
+      <p:sp>
+        <p:nvSpPr>
+          <p:cNvPr id="3" name="Content Placeholder 2"/>
+          <p:cNvSpPr>
+            <a:spLocks noGrp="1"/>
+          </p:cNvSpPr>
+          <p:nvPr>
+            <p:ph idx="1"/>
+          </p:nvPr>
+        </p:nvSpPr>
+        <p:spPr/>
+        <p:txBody>
+          <a:bodyPr>
+            <a:normAutofit fontScale="92500"/>
+          </a:bodyPr>
+          <a:lstStyle/>
+          <a:p>
+            <a:r>
+              <a:rPr lang="en-US" dirty="0" smtClean="0"/>
+              <a:t>Sometimes when you are given a hammer, everything looks like a nail, but sometimes this is not the best choice when…</a:t>
+            </a:r>
+          </a:p>
+          <a:p>
+            <a:r>
+              <a:rPr lang="en-US" dirty="0" smtClean="0"/>
+              <a:t>An objective does not have a well defined order (which means it isn’t actually a workflow…)</a:t>
+            </a:r>
+          </a:p>
+          <a:p>
+            <a:r>
+              <a:rPr lang="en-US" dirty="0" smtClean="0"/>
+              <a:t>A workflow is data centric as opposed to process centric.  Computed/generated columns coupled with triggers work well for this case.</a:t>
+            </a:r>
+          </a:p>
+          <a:p>
+            <a:endParaRPr lang="en-US" dirty="0"/>
+          </a:p>
+        </p:txBody>
+      </p:sp>
+      <p:sp>
+        <p:nvSpPr>
+          <p:cNvPr id="4" name="Slide Number Placeholder 3"/>
+          <p:cNvSpPr>
+            <a:spLocks noGrp="1"/>
+          </p:cNvSpPr>
+          <p:nvPr>
+            <p:ph type="sldNum" sz="quarter" idx="12"/>
+          </p:nvPr>
+        </p:nvSpPr>
+        <p:spPr/>
+        <p:txBody>
+          <a:bodyPr/>
+          <a:lstStyle/>
+          <a:p>
+            <a:fld id="{B6F15528-21DE-4FAA-801E-634DDDAF4B2B}" type="slidenum">
+              <a:rPr lang="en-US" smtClean="0"/>
+              <a:pPr/>
+              <a:t>25</a:t>
+            </a:fld>
+            <a:endParaRPr lang="en-US"/>
+          </a:p>
+        </p:txBody>
+      </p:sp>
+    </p:spTree>
+    <p:extLst>
+      <p:ext uri="{BB962C8B-B14F-4D97-AF65-F5344CB8AC3E}">
+        <p14:creationId xmlns:p14="http://schemas.microsoft.com/office/powerpoint/2010/main" val="165247136"/>
+      </p:ext>
+    </p:extLst>
+  </p:cSld>
+  <p:clrMapOvr>
+    <a:masterClrMapping/>
+  </p:clrMapOvr>
+</p:sld>
+</file>
+
+<file path=ppt/slides/slide26.xml><?xml version="1.0" encoding="utf-8"?>
+<p:sld xmlns:a="http://schemas.openxmlformats.org/drawingml/2006/main" xmlns:r="http://schemas.openxmlformats.org/officeDocument/2006/relationships" xmlns:p="http://schemas.openxmlformats.org/presentationml/2006/main">
+  <p:cSld>
+    <p:spTree>
+      <p:nvGrpSpPr>
+        <p:cNvPr id="1" name=""/>
+        <p:cNvGrpSpPr/>
+        <p:nvPr/>
+      </p:nvGrpSpPr>
+      <p:grpSpPr>
+        <a:xfrm>
+          <a:off x="0" y="0"/>
+          <a:ext cx="0" cy="0"/>
+          <a:chOff x="0" y="0"/>
+          <a:chExt cx="0" cy="0"/>
+        </a:xfrm>
+      </p:grpSpPr>
+      <p:sp>
+        <p:nvSpPr>
+          <p:cNvPr id="5" name="Title 4"/>
+          <p:cNvSpPr>
+            <a:spLocks noGrp="1"/>
+          </p:cNvSpPr>
+          <p:nvPr>
+            <p:ph type="ctrTitle"/>
+          </p:nvPr>
+        </p:nvSpPr>
+        <p:spPr/>
+        <p:txBody>
+          <a:bodyPr/>
+          <a:lstStyle/>
+          <a:p>
+            <a:r>
+              <a:rPr lang="en-US" dirty="0" smtClean="0"/>
+              <a:t>Questions</a:t>
+            </a:r>
+            <a:endParaRPr lang="en-US" dirty="0"/>
+          </a:p>
+        </p:txBody>
+      </p:sp>
+      <p:sp>
+        <p:nvSpPr>
+          <p:cNvPr id="6" name="Subtitle 5"/>
+          <p:cNvSpPr>
+            <a:spLocks noGrp="1"/>
+          </p:cNvSpPr>
+          <p:nvPr>
+            <p:ph type="subTitle" idx="1"/>
+          </p:nvPr>
+        </p:nvSpPr>
+        <p:spPr/>
+        <p:txBody>
+          <a:bodyPr/>
+          <a:lstStyle/>
+          <a:p>
+            <a:r>
+              <a:rPr lang="en-US" dirty="0" smtClean="0"/>
+              <a:t>(and Hopefully Answers)</a:t>
+            </a:r>
+            <a:endParaRPr lang="en-US" dirty="0"/>
+          </a:p>
+        </p:txBody>
+      </p:sp>
+      <p:sp>
+        <p:nvSpPr>
+          <p:cNvPr id="4" name="Slide Number Placeholder 3"/>
+          <p:cNvSpPr>
+            <a:spLocks noGrp="1"/>
+          </p:cNvSpPr>
+          <p:nvPr>
+            <p:ph type="sldNum" sz="quarter" idx="12"/>
+          </p:nvPr>
+        </p:nvSpPr>
+        <p:spPr/>
+        <p:txBody>
+          <a:bodyPr/>
+          <a:lstStyle/>
+          <a:p>
+            <a:fld id="{B6F15528-21DE-4FAA-801E-634DDDAF4B2B}" type="slidenum">
+              <a:rPr lang="en-US" smtClean="0"/>
+              <a:pPr/>
+              <a:t>26</a:t>
+            </a:fld>
+            <a:endParaRPr lang="en-US"/>
+          </a:p>
+        </p:txBody>
+      </p:sp>
+    </p:spTree>
+    <p:extLst>
+      <p:ext uri="{BB962C8B-B14F-4D97-AF65-F5344CB8AC3E}">
+        <p14:creationId xmlns:p14="http://schemas.microsoft.com/office/powerpoint/2010/main" val="3388124463"/>
+      </p:ext>
+    </p:extLst>
+  </p:cSld>
+  <p:clrMapOvr>
+    <a:masterClrMapping/>
+  </p:clrMapOvr>
+</p:sld>
+</file>
+
 <file path=ppt/slides/slide3.xml><?xml version="1.0" encoding="utf-8"?>
 <p:sld xmlns:a="http://schemas.openxmlformats.org/drawingml/2006/main" xmlns:r="http://schemas.openxmlformats.org/officeDocument/2006/relationships" xmlns:p="http://schemas.openxmlformats.org/presentationml/2006/main">
   <p:cSld>
@@ -5822,23 +6174,7 @@
           <a:p>
             <a:r>
               <a:rPr lang="en-US" dirty="0" smtClean="0"/>
-              <a:t>Customer </a:t>
-            </a:r>
-            <a:r>
-              <a:rPr lang="en-US" dirty="0" smtClean="0"/>
-              <a:t>wants </a:t>
-            </a:r>
-            <a:r>
-              <a:rPr lang="en-US" dirty="0" smtClean="0"/>
-              <a:t>over 25 long </a:t>
-            </a:r>
-            <a:r>
-              <a:rPr lang="en-US" dirty="0" smtClean="0"/>
-              <a:t>running complex </a:t>
-            </a:r>
-            <a:r>
-              <a:rPr lang="en-US" dirty="0" smtClean="0"/>
-              <a:t>workflows </a:t>
+              <a:t>Customer wants over 25 long running complex workflows </a:t>
             </a:r>
             <a:r>
               <a:rPr lang="en-US" smtClean="0"/>

</xml_diff>

<commit_message>
Continue changes, add .pdf file (without QR code / tinylink).
</commit_message>
<xml_diff>
--- a/Modeling Workflows with Event Driven DFA.pptx
+++ b/Modeling Workflows with Event Driven DFA.pptx
@@ -1,6 +1,6 @@
 
 <file path=ppt/presentation.xml><?xml version="1.0" encoding="utf-8"?>
-<p:presentation xmlns:a="http://schemas.openxmlformats.org/drawingml/2006/main" xmlns:r="http://schemas.openxmlformats.org/officeDocument/2006/relationships" xmlns:p="http://schemas.openxmlformats.org/presentationml/2006/main" saveSubsetFonts="1">
+<p:presentation xmlns:a="http://schemas.openxmlformats.org/drawingml/2006/main" xmlns:r="http://schemas.openxmlformats.org/officeDocument/2006/relationships" xmlns:p="http://schemas.openxmlformats.org/presentationml/2006/main" removePersonalInfoOnSave="1" saveSubsetFonts="1">
   <p:sldMasterIdLst>
     <p:sldMasterId id="2147483648" r:id="rId1"/>
   </p:sldMasterIdLst>
@@ -3723,13 +3723,21 @@
         <p:spPr/>
         <p:txBody>
           <a:bodyPr>
-            <a:normAutofit fontScale="90000"/>
+            <a:normAutofit/>
           </a:bodyPr>
           <a:lstStyle/>
           <a:p>
             <a:r>
               <a:rPr lang="en-US" dirty="0" smtClean="0"/>
-              <a:t>Scalability of a Database DFA implementation</a:t>
+              <a:t>Database </a:t>
+            </a:r>
+            <a:r>
+              <a:rPr lang="en-US" dirty="0" smtClean="0"/>
+              <a:t>DFA </a:t>
+            </a:r>
+            <a:r>
+              <a:rPr lang="en-US" dirty="0" smtClean="0"/>
+              <a:t>Scalability</a:t>
             </a:r>
             <a:endParaRPr lang="en-US" dirty="0"/>
           </a:p>
@@ -3745,28 +3753,56 @@
             <p:ph idx="1"/>
           </p:nvPr>
         </p:nvSpPr>
-        <p:spPr/>
+        <p:spPr>
+          <a:xfrm>
+            <a:off x="457200" y="1600200"/>
+            <a:ext cx="8229600" cy="4756150"/>
+          </a:xfrm>
+        </p:spPr>
         <p:txBody>
           <a:bodyPr>
-            <a:normAutofit fontScale="85000" lnSpcReduction="20000"/>
+            <a:normAutofit fontScale="85000" lnSpcReduction="10000"/>
           </a:bodyPr>
           <a:lstStyle/>
           <a:p>
             <a:r>
               <a:rPr lang="en-US" dirty="0" smtClean="0"/>
-              <a:t>A large number of states and transitions may be manipulated by a relatively small program.  Adding states and transitions does not increase the size of the program.</a:t>
-            </a:r>
-          </a:p>
-          <a:p>
-            <a:r>
-              <a:rPr lang="en-US" dirty="0" smtClean="0"/>
-              <a:t>An interactive program only has to load information about the current state that is being manipulated.  An event source only needs to send its event.</a:t>
-            </a:r>
-          </a:p>
-          <a:p>
-            <a:r>
-              <a:rPr lang="en-US" dirty="0" smtClean="0"/>
-              <a:t>A stored procedure processes events sent to it directly on the database.  This avoids the network overhead that a client program would entail.</a:t>
+              <a:t>A large number of states and transitions may be manipulated by a relatively small program.  Adding states and transitions does not increase </a:t>
+            </a:r>
+            <a:r>
+              <a:rPr lang="en-US" dirty="0" smtClean="0"/>
+              <a:t>program size.</a:t>
+            </a:r>
+            <a:endParaRPr lang="en-US" dirty="0" smtClean="0"/>
+          </a:p>
+          <a:p>
+            <a:r>
+              <a:rPr lang="en-US" dirty="0" smtClean="0"/>
+              <a:t>An interactive program only has to load information about the </a:t>
+            </a:r>
+            <a:r>
+              <a:rPr lang="en-US" dirty="0" smtClean="0"/>
+              <a:t>current state.</a:t>
+            </a:r>
+          </a:p>
+          <a:p>
+            <a:r>
+              <a:rPr lang="en-US" dirty="0" smtClean="0"/>
+              <a:t>An </a:t>
+            </a:r>
+            <a:r>
+              <a:rPr lang="en-US" dirty="0" smtClean="0"/>
+              <a:t>event source only needs to send its event.</a:t>
+            </a:r>
+          </a:p>
+          <a:p>
+            <a:r>
+              <a:rPr lang="en-US" dirty="0" smtClean="0"/>
+              <a:t>A stored procedure processes events sent to it directly on the </a:t>
+            </a:r>
+            <a:r>
+              <a:rPr lang="en-US" dirty="0" smtClean="0"/>
+              <a:t>database without network overhead.</a:t>
             </a:r>
           </a:p>
           <a:p>
@@ -3920,7 +3956,6 @@
               <a:rPr lang="en-US" dirty="0" smtClean="0"/>
               <a:t>Workflow is defined by its start state’s closure.</a:t>
             </a:r>
-            <a:endParaRPr lang="en-US" dirty="0" smtClean="0"/>
           </a:p>
         </p:txBody>
       </p:sp>
@@ -4126,14 +4161,42 @@
           <a:p>
             <a:r>
               <a:rPr lang="en-US" dirty="0" smtClean="0"/>
-              <a:t>The elements in this table define the events, which correspond to the set of symbols available to a classical FSM.</a:t>
-            </a:r>
-          </a:p>
-          <a:p>
-            <a:r>
-              <a:rPr lang="en-US" dirty="0" smtClean="0"/>
-              <a:t>Defines the default display name (or resource key) and if the event is passive (the resulting state does not become the current state).</a:t>
-            </a:r>
+              <a:t>The elements in this table define the </a:t>
+            </a:r>
+            <a:r>
+              <a:rPr lang="en-US" dirty="0" smtClean="0"/>
+              <a:t>events.</a:t>
+            </a:r>
+            <a:endParaRPr lang="en-US" dirty="0" smtClean="0"/>
+          </a:p>
+          <a:p>
+            <a:r>
+              <a:rPr lang="en-US" dirty="0" smtClean="0"/>
+              <a:t>Defines the default display name (or resource key) and if the event is </a:t>
+            </a:r>
+            <a:r>
+              <a:rPr lang="en-US" dirty="0" smtClean="0"/>
+              <a:t>passive.</a:t>
+            </a:r>
+          </a:p>
+          <a:p>
+            <a:r>
+              <a:rPr lang="en-US" dirty="0" smtClean="0"/>
+              <a:t>When an event is passive, </a:t>
+            </a:r>
+            <a:r>
+              <a:rPr lang="en-US" dirty="0" smtClean="0"/>
+              <a:t>the </a:t>
+            </a:r>
+            <a:r>
+              <a:rPr lang="en-US" dirty="0" smtClean="0"/>
+              <a:t>resulting state does not become the current </a:t>
+            </a:r>
+            <a:r>
+              <a:rPr lang="en-US" dirty="0" smtClean="0"/>
+              <a:t>state.</a:t>
+            </a:r>
+            <a:endParaRPr lang="en-US" dirty="0" smtClean="0"/>
           </a:p>
           <a:p>
             <a:r>
@@ -4254,19 +4317,11 @@
             </a:r>
             <a:r>
               <a:rPr lang="en-US" cap="small" dirty="0" smtClean="0"/>
-              <a:t>salary </a:t>
-            </a:r>
-            <a:r>
-              <a:rPr lang="en-US" cap="small" dirty="0" smtClean="0"/>
-              <a:t>increase</a:t>
-            </a:r>
-            <a:r>
-              <a:rPr lang="en-US" dirty="0" smtClean="0"/>
-              <a:t> </a:t>
-            </a:r>
-            <a:r>
-              <a:rPr lang="en-US" dirty="0" smtClean="0"/>
-              <a:t>event.</a:t>
+              <a:t>salary increase</a:t>
+            </a:r>
+            <a:r>
+              <a:rPr lang="en-US" dirty="0" smtClean="0"/>
+              <a:t> event.</a:t>
             </a:r>
           </a:p>
           <a:p>
@@ -4838,11 +4893,7 @@
           <a:p>
             <a:r>
               <a:rPr lang="en-US" dirty="0" smtClean="0"/>
-              <a:t>Workflows for various employee awards at the same level may share the same workflow for review and approval</a:t>
-            </a:r>
-            <a:r>
-              <a:rPr lang="en-US" dirty="0" smtClean="0"/>
-              <a:t>.</a:t>
+              <a:t>Workflows for various employee awards at the same level may share the same workflow for review and approval.</a:t>
             </a:r>
           </a:p>
           <a:p>
@@ -4850,7 +4901,6 @@
               <a:rPr lang="en-US" dirty="0" smtClean="0"/>
               <a:t>There could be workflows for both approving a new salary and hiring a new employee.  The hiring a new employee could use (transition into) the approving a new salary workflow.</a:t>
             </a:r>
-            <a:endParaRPr lang="en-US" dirty="0" smtClean="0"/>
           </a:p>
           <a:p>
             <a:endParaRPr lang="en-US" dirty="0" smtClean="0"/>
@@ -5291,21 +5341,8 @@
           <a:p>
             <a:r>
               <a:rPr lang="en-US" dirty="0" smtClean="0"/>
-              <a:t>Each workflow h</a:t>
-            </a:r>
-            <a:r>
-              <a:rPr lang="en-US" dirty="0" smtClean="0"/>
-              <a:t>as 1 </a:t>
-            </a:r>
-            <a:r>
-              <a:rPr lang="en-US" dirty="0" smtClean="0"/>
-              <a:t>current workflow </a:t>
-            </a:r>
-            <a:r>
-              <a:rPr lang="en-US" dirty="0" smtClean="0"/>
-              <a:t>state.</a:t>
-            </a:r>
-            <a:endParaRPr lang="en-US" dirty="0" smtClean="0"/>
+              <a:t>Each workflow has 1 current workflow state.</a:t>
+            </a:r>
           </a:p>
           <a:p>
             <a:r>
@@ -6390,7 +6427,11 @@
           <a:p>
             <a:r>
               <a:rPr lang="en-US" dirty="0" smtClean="0"/>
-              <a:t>Finite State Machine</a:t>
+              <a:t>Finite State </a:t>
+            </a:r>
+            <a:r>
+              <a:rPr lang="en-US" dirty="0" smtClean="0"/>
+              <a:t>Machine (FSM)</a:t>
             </a:r>
             <a:endParaRPr lang="en-US" dirty="0"/>
           </a:p>
@@ -6406,20 +6447,43 @@
             <p:ph idx="1"/>
           </p:nvPr>
         </p:nvSpPr>
-        <p:spPr/>
-        <p:txBody>
-          <a:bodyPr/>
-          <a:lstStyle/>
-          <a:p>
-            <a:r>
-              <a:rPr lang="en-US" dirty="0" smtClean="0"/>
-              <a:t>A classical finite state machine is a mathematical abstraction that accepts or rejects a string using states and transitions.</a:t>
-            </a:r>
-          </a:p>
-          <a:p>
-            <a:r>
-              <a:rPr lang="en-US" dirty="0" smtClean="0"/>
-              <a:t>Example: Classical FSM that accepts AB*C (A followed by 0 or more </a:t>
+        <p:spPr>
+          <a:xfrm>
+            <a:off x="457200" y="1524000"/>
+            <a:ext cx="8229600" cy="4525963"/>
+          </a:xfrm>
+        </p:spPr>
+        <p:txBody>
+          <a:bodyPr>
+            <a:normAutofit/>
+          </a:bodyPr>
+          <a:lstStyle/>
+          <a:p>
+            <a:r>
+              <a:rPr lang="en-US" dirty="0" smtClean="0"/>
+              <a:t>FSM is a mathematical construct that processes symbols using states and vertices</a:t>
+            </a:r>
+            <a:endParaRPr lang="en-US" dirty="0" smtClean="0"/>
+          </a:p>
+          <a:p>
+            <a:r>
+              <a:rPr lang="en-US" dirty="0" smtClean="0"/>
+              <a:t>A Deterministic Finite Automaton (DFA) is a FSM where any symbol has 0 or 1 vertices.</a:t>
+            </a:r>
+            <a:endParaRPr lang="en-US" dirty="0" smtClean="0"/>
+          </a:p>
+          <a:p>
+            <a:r>
+              <a:rPr lang="en-US" dirty="0" smtClean="0"/>
+              <a:t>Example: Classical </a:t>
+            </a:r>
+            <a:r>
+              <a:rPr lang="en-US" dirty="0" smtClean="0"/>
+              <a:t>DFA that </a:t>
+            </a:r>
+            <a:r>
+              <a:rPr lang="en-US" dirty="0" smtClean="0"/>
+              <a:t>accepts AB*C (A followed by 0 or more </a:t>
             </a:r>
             <a:r>
               <a:rPr lang="en-US" dirty="0" err="1" smtClean="0"/>
@@ -6478,8 +6542,8 @@
         </p:blipFill>
         <p:spPr>
           <a:xfrm>
-            <a:off x="609599" y="4190999"/>
-            <a:ext cx="7418125" cy="1935163"/>
+            <a:off x="1066800" y="4600092"/>
+            <a:ext cx="6732324" cy="1756258"/>
           </a:xfrm>
           <a:prstGeom prst="rect">
             <a:avLst/>
@@ -6529,13 +6593,17 @@
         <p:spPr/>
         <p:txBody>
           <a:bodyPr>
-            <a:normAutofit/>
+            <a:normAutofit fontScale="90000"/>
           </a:bodyPr>
           <a:lstStyle/>
           <a:p>
             <a:r>
               <a:rPr lang="en-US" dirty="0" smtClean="0"/>
-              <a:t>Event Driven Finite State Machine</a:t>
+              <a:t>Event Driven </a:t>
+            </a:r>
+            <a:r>
+              <a:rPr lang="en-US" dirty="0" smtClean="0"/>
+              <a:t>Deterministic Finite Automaton (DFA)</a:t>
             </a:r>
             <a:endParaRPr lang="en-US" dirty="0"/>
           </a:p>
@@ -6563,19 +6631,41 @@
           <a:p>
             <a:r>
               <a:rPr lang="en-US" dirty="0" smtClean="0"/>
-              <a:t>Uses events instead of an alphabet.</a:t>
-            </a:r>
-          </a:p>
-          <a:p>
-            <a:r>
-              <a:rPr lang="en-US" dirty="0" smtClean="0"/>
-              <a:t>Commonly used in embedded systems to track or implement complex hardware state.</a:t>
-            </a:r>
-          </a:p>
-          <a:p>
-            <a:r>
-              <a:rPr lang="en-US" dirty="0" smtClean="0"/>
-              <a:t>Example FSM that models a review process that requires one or more reviewers.</a:t>
+              <a:t>Uses events instead of </a:t>
+            </a:r>
+            <a:r>
+              <a:rPr lang="en-US" dirty="0" smtClean="0"/>
+              <a:t>symbols.</a:t>
+            </a:r>
+            <a:endParaRPr lang="en-US" dirty="0" smtClean="0"/>
+          </a:p>
+          <a:p>
+            <a:r>
+              <a:rPr lang="en-US" dirty="0" smtClean="0"/>
+              <a:t>Commonly used in embedded </a:t>
+            </a:r>
+            <a:r>
+              <a:rPr lang="en-US" dirty="0" smtClean="0"/>
+              <a:t>systems and networking to track state</a:t>
+            </a:r>
+            <a:r>
+              <a:rPr lang="en-US" dirty="0" smtClean="0"/>
+              <a:t>.</a:t>
+            </a:r>
+            <a:endParaRPr lang="en-US" dirty="0" smtClean="0"/>
+          </a:p>
+          <a:p>
+            <a:r>
+              <a:rPr lang="en-US" dirty="0" smtClean="0"/>
+              <a:t>Example </a:t>
+            </a:r>
+            <a:r>
+              <a:rPr lang="en-US" dirty="0" smtClean="0"/>
+              <a:t>DFA that </a:t>
+            </a:r>
+            <a:r>
+              <a:rPr lang="en-US" dirty="0" smtClean="0"/>
+              <a:t>models a review process that requires one or more reviewers.</a:t>
             </a:r>
           </a:p>
         </p:txBody>
@@ -6626,8 +6716,8 @@
         </p:blipFill>
         <p:spPr>
           <a:xfrm>
-            <a:off x="609600" y="4114799"/>
-            <a:ext cx="7924800" cy="2299003"/>
+            <a:off x="914399" y="4247433"/>
+            <a:ext cx="7467601" cy="2166368"/>
           </a:xfrm>
           <a:prstGeom prst="rect">
             <a:avLst/>

</xml_diff>

<commit_message>
First draft with QR code to be sent to Chad Green.
</commit_message>
<xml_diff>
--- a/Modeling Workflows with Event Driven DFA.pptx
+++ b/Modeling Workflows with Event Driven DFA.pptx
@@ -3610,6 +3610,36 @@
           <a:chExt cx="0" cy="0"/>
         </a:xfrm>
       </p:grpSpPr>
+      <p:pic>
+        <p:nvPicPr>
+          <p:cNvPr id="9" name="Picture 8"/>
+          <p:cNvPicPr>
+            <a:picLocks noChangeAspect="1"/>
+          </p:cNvPicPr>
+          <p:nvPr/>
+        </p:nvPicPr>
+        <p:blipFill>
+          <a:blip r:embed="rId2">
+            <a:extLst>
+              <a:ext uri="{28A0092B-C50C-407E-A947-70E740481C1C}">
+                <a14:useLocalDpi xmlns:a14="http://schemas.microsoft.com/office/drawing/2010/main" val="0"/>
+              </a:ext>
+            </a:extLst>
+          </a:blip>
+          <a:stretch>
+            <a:fillRect/>
+          </a:stretch>
+        </p:blipFill>
+        <p:spPr>
+          <a:xfrm>
+            <a:off x="2819400" y="3305366"/>
+            <a:ext cx="3505200" cy="3505200"/>
+          </a:xfrm>
+          <a:prstGeom prst="rect">
+            <a:avLst/>
+          </a:prstGeom>
+        </p:spPr>
+      </p:pic>
       <p:sp>
         <p:nvSpPr>
           <p:cNvPr id="2" name="Title 1"/>
@@ -3620,7 +3650,12 @@
             <p:ph type="ctrTitle"/>
           </p:nvPr>
         </p:nvSpPr>
-        <p:spPr/>
+        <p:spPr>
+          <a:xfrm>
+            <a:off x="685800" y="457200"/>
+            <a:ext cx="7772400" cy="1470025"/>
+          </a:xfrm>
+        </p:spPr>
         <p:txBody>
           <a:bodyPr/>
           <a:lstStyle/>
@@ -3643,14 +3678,31 @@
             <p:ph type="subTitle" idx="1"/>
           </p:nvPr>
         </p:nvSpPr>
-        <p:spPr/>
-        <p:txBody>
-          <a:bodyPr/>
-          <a:lstStyle/>
-          <a:p>
-            <a:r>
-              <a:rPr lang="en-US" dirty="0" smtClean="0"/>
-              <a:t>Using Event Driven Deterministic Finite Automata (DFA)</a:t>
+        <p:spPr>
+          <a:xfrm>
+            <a:off x="1371600" y="1835341"/>
+            <a:ext cx="6400800" cy="1752600"/>
+          </a:xfrm>
+        </p:spPr>
+        <p:txBody>
+          <a:bodyPr/>
+          <a:lstStyle/>
+          <a:p>
+            <a:r>
+              <a:rPr lang="en-US" dirty="0" smtClean="0"/>
+              <a:t>Using Event Driven Deterministic Finite Automata (DFA</a:t>
+            </a:r>
+            <a:r>
+              <a:rPr lang="en-US" dirty="0" smtClean="0"/>
+              <a:t>)</a:t>
+            </a:r>
+          </a:p>
+          <a:p>
+            <a:r>
+              <a:rPr lang="en-US" dirty="0">
+                <a:hlinkClick r:id="rId3"/>
+              </a:rPr>
+              <a:t>http://tiny.cc/x67dwx</a:t>
             </a:r>
             <a:endParaRPr lang="en-US" dirty="0"/>
           </a:p>
@@ -3729,15 +3781,7 @@
           <a:p>
             <a:r>
               <a:rPr lang="en-US" dirty="0" smtClean="0"/>
-              <a:t>Database </a:t>
-            </a:r>
-            <a:r>
-              <a:rPr lang="en-US" dirty="0" smtClean="0"/>
-              <a:t>DFA </a:t>
-            </a:r>
-            <a:r>
-              <a:rPr lang="en-US" dirty="0" smtClean="0"/>
-              <a:t>Scalability</a:t>
+              <a:t>Database DFA Scalability</a:t>
             </a:r>
             <a:endParaRPr lang="en-US" dirty="0"/>
           </a:p>
@@ -3767,42 +3811,25 @@
           <a:p>
             <a:r>
               <a:rPr lang="en-US" dirty="0" smtClean="0"/>
-              <a:t>A large number of states and transitions may be manipulated by a relatively small program.  Adding states and transitions does not increase </a:t>
-            </a:r>
-            <a:r>
-              <a:rPr lang="en-US" dirty="0" smtClean="0"/>
-              <a:t>program size.</a:t>
-            </a:r>
-            <a:endParaRPr lang="en-US" dirty="0" smtClean="0"/>
-          </a:p>
-          <a:p>
-            <a:r>
-              <a:rPr lang="en-US" dirty="0" smtClean="0"/>
-              <a:t>An interactive program only has to load information about the </a:t>
-            </a:r>
-            <a:r>
-              <a:rPr lang="en-US" dirty="0" smtClean="0"/>
-              <a:t>current state.</a:t>
-            </a:r>
-          </a:p>
-          <a:p>
-            <a:r>
-              <a:rPr lang="en-US" dirty="0" smtClean="0"/>
-              <a:t>An </a:t>
-            </a:r>
-            <a:r>
-              <a:rPr lang="en-US" dirty="0" smtClean="0"/>
-              <a:t>event source only needs to send its event.</a:t>
-            </a:r>
-          </a:p>
-          <a:p>
-            <a:r>
-              <a:rPr lang="en-US" dirty="0" smtClean="0"/>
-              <a:t>A stored procedure processes events sent to it directly on the </a:t>
-            </a:r>
-            <a:r>
-              <a:rPr lang="en-US" dirty="0" smtClean="0"/>
-              <a:t>database without network overhead.</a:t>
+              <a:t>A large number of states and transitions may be manipulated by a relatively small program.  Adding states and transitions does not increase program size.</a:t>
+            </a:r>
+          </a:p>
+          <a:p>
+            <a:r>
+              <a:rPr lang="en-US" dirty="0" smtClean="0"/>
+              <a:t>An interactive program only has to load information about the current state.</a:t>
+            </a:r>
+          </a:p>
+          <a:p>
+            <a:r>
+              <a:rPr lang="en-US" dirty="0" smtClean="0"/>
+              <a:t>An event source only needs to send its event.</a:t>
+            </a:r>
+          </a:p>
+          <a:p>
+            <a:r>
+              <a:rPr lang="en-US" dirty="0" smtClean="0"/>
+              <a:t>A stored procedure processes events sent to it directly on the database without network overhead.</a:t>
             </a:r>
           </a:p>
           <a:p>
@@ -4161,42 +4188,20 @@
           <a:p>
             <a:r>
               <a:rPr lang="en-US" dirty="0" smtClean="0"/>
-              <a:t>The elements in this table define the </a:t>
-            </a:r>
-            <a:r>
-              <a:rPr lang="en-US" dirty="0" smtClean="0"/>
-              <a:t>events.</a:t>
-            </a:r>
-            <a:endParaRPr lang="en-US" dirty="0" smtClean="0"/>
-          </a:p>
-          <a:p>
-            <a:r>
-              <a:rPr lang="en-US" dirty="0" smtClean="0"/>
-              <a:t>Defines the default display name (or resource key) and if the event is </a:t>
-            </a:r>
-            <a:r>
-              <a:rPr lang="en-US" dirty="0" smtClean="0"/>
-              <a:t>passive.</a:t>
-            </a:r>
-          </a:p>
-          <a:p>
-            <a:r>
-              <a:rPr lang="en-US" dirty="0" smtClean="0"/>
-              <a:t>When an event is passive, </a:t>
-            </a:r>
-            <a:r>
-              <a:rPr lang="en-US" dirty="0" smtClean="0"/>
-              <a:t>the </a:t>
-            </a:r>
-            <a:r>
-              <a:rPr lang="en-US" dirty="0" smtClean="0"/>
-              <a:t>resulting state does not become the current </a:t>
-            </a:r>
-            <a:r>
-              <a:rPr lang="en-US" dirty="0" smtClean="0"/>
-              <a:t>state.</a:t>
-            </a:r>
-            <a:endParaRPr lang="en-US" dirty="0" smtClean="0"/>
+              <a:t>The elements in this table define the events.</a:t>
+            </a:r>
+          </a:p>
+          <a:p>
+            <a:r>
+              <a:rPr lang="en-US" dirty="0" smtClean="0"/>
+              <a:t>Defines the default display name (or resource key) and if the event is passive.</a:t>
+            </a:r>
+          </a:p>
+          <a:p>
+            <a:r>
+              <a:rPr lang="en-US" dirty="0" smtClean="0"/>
+              <a:t>When an event is passive, the resulting state does not become the current state.</a:t>
+            </a:r>
           </a:p>
           <a:p>
             <a:r>
@@ -6427,11 +6432,7 @@
           <a:p>
             <a:r>
               <a:rPr lang="en-US" dirty="0" smtClean="0"/>
-              <a:t>Finite State </a:t>
-            </a:r>
-            <a:r>
-              <a:rPr lang="en-US" dirty="0" smtClean="0"/>
-              <a:t>Machine (FSM)</a:t>
+              <a:t>Finite State Machine (FSM)</a:t>
             </a:r>
             <a:endParaRPr lang="en-US" dirty="0"/>
           </a:p>
@@ -6463,27 +6464,17 @@
               <a:rPr lang="en-US" dirty="0" smtClean="0"/>
               <a:t>FSM is a mathematical construct that processes symbols using states and vertices</a:t>
             </a:r>
-            <a:endParaRPr lang="en-US" dirty="0" smtClean="0"/>
           </a:p>
           <a:p>
             <a:r>
               <a:rPr lang="en-US" dirty="0" smtClean="0"/>
               <a:t>A Deterministic Finite Automaton (DFA) is a FSM where any symbol has 0 or 1 vertices.</a:t>
             </a:r>
-            <a:endParaRPr lang="en-US" dirty="0" smtClean="0"/>
-          </a:p>
-          <a:p>
-            <a:r>
-              <a:rPr lang="en-US" dirty="0" smtClean="0"/>
-              <a:t>Example: Classical </a:t>
-            </a:r>
-            <a:r>
-              <a:rPr lang="en-US" dirty="0" smtClean="0"/>
-              <a:t>DFA that </a:t>
-            </a:r>
-            <a:r>
-              <a:rPr lang="en-US" dirty="0" smtClean="0"/>
-              <a:t>accepts AB*C (A followed by 0 or more </a:t>
+          </a:p>
+          <a:p>
+            <a:r>
+              <a:rPr lang="en-US" dirty="0" smtClean="0"/>
+              <a:t>Example: Classical DFA that accepts AB*C (A followed by 0 or more </a:t>
             </a:r>
             <a:r>
               <a:rPr lang="en-US" dirty="0" err="1" smtClean="0"/>
@@ -6599,11 +6590,7 @@
           <a:p>
             <a:r>
               <a:rPr lang="en-US" dirty="0" smtClean="0"/>
-              <a:t>Event Driven </a:t>
-            </a:r>
-            <a:r>
-              <a:rPr lang="en-US" dirty="0" smtClean="0"/>
-              <a:t>Deterministic Finite Automaton (DFA)</a:t>
+              <a:t>Event Driven Deterministic Finite Automaton (DFA)</a:t>
             </a:r>
             <a:endParaRPr lang="en-US" dirty="0"/>
           </a:p>
@@ -6631,41 +6618,19 @@
           <a:p>
             <a:r>
               <a:rPr lang="en-US" dirty="0" smtClean="0"/>
-              <a:t>Uses events instead of </a:t>
-            </a:r>
-            <a:r>
-              <a:rPr lang="en-US" dirty="0" smtClean="0"/>
-              <a:t>symbols.</a:t>
-            </a:r>
-            <a:endParaRPr lang="en-US" dirty="0" smtClean="0"/>
-          </a:p>
-          <a:p>
-            <a:r>
-              <a:rPr lang="en-US" dirty="0" smtClean="0"/>
-              <a:t>Commonly used in embedded </a:t>
-            </a:r>
-            <a:r>
-              <a:rPr lang="en-US" dirty="0" smtClean="0"/>
-              <a:t>systems and networking to track state</a:t>
-            </a:r>
-            <a:r>
-              <a:rPr lang="en-US" dirty="0" smtClean="0"/>
-              <a:t>.</a:t>
-            </a:r>
-            <a:endParaRPr lang="en-US" dirty="0" smtClean="0"/>
-          </a:p>
-          <a:p>
-            <a:r>
-              <a:rPr lang="en-US" dirty="0" smtClean="0"/>
-              <a:t>Example </a:t>
-            </a:r>
-            <a:r>
-              <a:rPr lang="en-US" dirty="0" smtClean="0"/>
-              <a:t>DFA that </a:t>
-            </a:r>
-            <a:r>
-              <a:rPr lang="en-US" dirty="0" smtClean="0"/>
-              <a:t>models a review process that requires one or more reviewers.</a:t>
+              <a:t>Uses events instead of symbols.</a:t>
+            </a:r>
+          </a:p>
+          <a:p>
+            <a:r>
+              <a:rPr lang="en-US" dirty="0" smtClean="0"/>
+              <a:t>Commonly used in embedded systems and networking to track state.</a:t>
+            </a:r>
+          </a:p>
+          <a:p>
+            <a:r>
+              <a:rPr lang="en-US" dirty="0" smtClean="0"/>
+              <a:t>Example DFA that models a review process that requires one or more reviewers.</a:t>
             </a:r>
           </a:p>
         </p:txBody>

</xml_diff>

<commit_message>
CodePaLOUsa presentation final slides.  Includes announcement of open source project.
</commit_message>
<xml_diff>
--- a/Modeling Workflows with Event Driven DFA.pptx
+++ b/Modeling Workflows with Event Driven DFA.pptx
@@ -5,7 +5,7 @@
     <p:sldMasterId id="2147483648" r:id="rId1"/>
   </p:sldMasterIdLst>
   <p:notesMasterIdLst>
-    <p:notesMasterId r:id="rId28"/>
+    <p:notesMasterId r:id="rId29"/>
   </p:notesMasterIdLst>
   <p:sldIdLst>
     <p:sldId id="256" r:id="rId2"/>
@@ -29,11 +29,12 @@
     <p:sldId id="270" r:id="rId20"/>
     <p:sldId id="271" r:id="rId21"/>
     <p:sldId id="276" r:id="rId22"/>
-    <p:sldId id="278" r:id="rId23"/>
-    <p:sldId id="277" r:id="rId24"/>
-    <p:sldId id="279" r:id="rId25"/>
-    <p:sldId id="280" r:id="rId26"/>
-    <p:sldId id="281" r:id="rId27"/>
+    <p:sldId id="277" r:id="rId23"/>
+    <p:sldId id="279" r:id="rId24"/>
+    <p:sldId id="280" r:id="rId25"/>
+    <p:sldId id="282" r:id="rId26"/>
+    <p:sldId id="283" r:id="rId27"/>
+    <p:sldId id="281" r:id="rId28"/>
   </p:sldIdLst>
   <p:sldSz cx="9144000" cy="6858000" type="screen4x3"/>
   <p:notesSz cx="6858000" cy="9144000"/>
@@ -233,7 +234,7 @@
           <a:p>
             <a:fld id="{D0F15B3C-1181-4445-BB6A-6BED1DF2958C}" type="datetimeFigureOut">
               <a:rPr lang="en-US" smtClean="0"/>
-              <a:t>3/31/2015</a:t>
+              <a:t>4/28/2015</a:t>
             </a:fld>
             <a:endParaRPr lang="en-US"/>
           </a:p>
@@ -850,7 +851,7 @@
           <a:p>
             <a:fld id="{2927DE08-9B48-44D6-83D4-230A82F93FAE}" type="datetime1">
               <a:rPr lang="en-US" smtClean="0"/>
-              <a:t>3/31/2015</a:t>
+              <a:t>4/28/2015</a:t>
             </a:fld>
             <a:endParaRPr lang="en-US"/>
           </a:p>
@@ -1016,7 +1017,7 @@
           <a:p>
             <a:fld id="{5D95C52C-C3C1-4927-8E70-C103DE1C3321}" type="datetime1">
               <a:rPr lang="en-US" smtClean="0"/>
-              <a:t>3/31/2015</a:t>
+              <a:t>4/28/2015</a:t>
             </a:fld>
             <a:endParaRPr lang="en-US"/>
           </a:p>
@@ -1192,7 +1193,7 @@
           <a:p>
             <a:fld id="{90E3D6A5-38A1-4FEC-A43A-47F48DEDEFD3}" type="datetime1">
               <a:rPr lang="en-US" smtClean="0"/>
-              <a:t>3/31/2015</a:t>
+              <a:t>4/28/2015</a:t>
             </a:fld>
             <a:endParaRPr lang="en-US"/>
           </a:p>
@@ -1358,7 +1359,7 @@
           <a:p>
             <a:fld id="{D8E26438-717D-40FF-AE1C-BA0484F53167}" type="datetime1">
               <a:rPr lang="en-US" smtClean="0"/>
-              <a:t>3/31/2015</a:t>
+              <a:t>4/28/2015</a:t>
             </a:fld>
             <a:endParaRPr lang="en-US"/>
           </a:p>
@@ -1600,7 +1601,7 @@
           <a:p>
             <a:fld id="{204240F7-7708-4F95-8DF5-779CE1EBFAFE}" type="datetime1">
               <a:rPr lang="en-US" smtClean="0"/>
-              <a:t>3/31/2015</a:t>
+              <a:t>4/28/2015</a:t>
             </a:fld>
             <a:endParaRPr lang="en-US"/>
           </a:p>
@@ -1884,7 +1885,7 @@
           <a:p>
             <a:fld id="{9AB1B8F5-007F-4624-9D09-74A4BB144A1B}" type="datetime1">
               <a:rPr lang="en-US" smtClean="0"/>
-              <a:t>3/31/2015</a:t>
+              <a:t>4/28/2015</a:t>
             </a:fld>
             <a:endParaRPr lang="en-US"/>
           </a:p>
@@ -2302,7 +2303,7 @@
           <a:p>
             <a:fld id="{33652302-F773-471B-A447-C9E7D11FB526}" type="datetime1">
               <a:rPr lang="en-US" smtClean="0"/>
-              <a:t>3/31/2015</a:t>
+              <a:t>4/28/2015</a:t>
             </a:fld>
             <a:endParaRPr lang="en-US"/>
           </a:p>
@@ -2416,7 +2417,7 @@
           <a:p>
             <a:fld id="{505FC5C8-7D30-45A5-B6D7-01D5FFF04AAA}" type="datetime1">
               <a:rPr lang="en-US" smtClean="0"/>
-              <a:t>3/31/2015</a:t>
+              <a:t>4/28/2015</a:t>
             </a:fld>
             <a:endParaRPr lang="en-US"/>
           </a:p>
@@ -2507,7 +2508,7 @@
           <a:p>
             <a:fld id="{2203C164-A71A-4152-83A1-27E2B515D187}" type="datetime1">
               <a:rPr lang="en-US" smtClean="0"/>
-              <a:t>3/31/2015</a:t>
+              <a:t>4/28/2015</a:t>
             </a:fld>
             <a:endParaRPr lang="en-US"/>
           </a:p>
@@ -2780,7 +2781,7 @@
           <a:p>
             <a:fld id="{0B77CF3C-9740-4894-A406-34BF11EA8119}" type="datetime1">
               <a:rPr lang="en-US" smtClean="0"/>
-              <a:t>3/31/2015</a:t>
+              <a:t>4/28/2015</a:t>
             </a:fld>
             <a:endParaRPr lang="en-US"/>
           </a:p>
@@ -3029,7 +3030,7 @@
           <a:p>
             <a:fld id="{65AEF08F-C222-4314-9819-054B5D3660D4}" type="datetime1">
               <a:rPr lang="en-US" smtClean="0"/>
-              <a:t>3/31/2015</a:t>
+              <a:t>4/28/2015</a:t>
             </a:fld>
             <a:endParaRPr lang="en-US"/>
           </a:p>
@@ -3238,7 +3239,7 @@
           <a:p>
             <a:fld id="{97CA4D54-662E-4D1F-9D66-59ED33158556}" type="datetime1">
               <a:rPr lang="en-US" smtClean="0"/>
-              <a:t>3/31/2015</a:t>
+              <a:t>4/28/2015</a:t>
             </a:fld>
             <a:endParaRPr lang="en-US"/>
           </a:p>
@@ -3690,11 +3691,7 @@
           <a:p>
             <a:r>
               <a:rPr lang="en-US" dirty="0" smtClean="0"/>
-              <a:t>Using Event Driven Deterministic Finite Automata (DFA</a:t>
-            </a:r>
-            <a:r>
-              <a:rPr lang="en-US" dirty="0" smtClean="0"/>
-              <a:t>)</a:t>
+              <a:t>Using Event Driven Deterministic Finite Automata (DFA)</a:t>
             </a:r>
           </a:p>
           <a:p>
@@ -5610,43 +5607,97 @@
         </p:nvSpPr>
         <p:spPr/>
         <p:txBody>
+          <a:bodyPr/>
+          <a:lstStyle/>
+          <a:p>
+            <a:r>
+              <a:rPr lang="en-US" dirty="0" smtClean="0"/>
+              <a:t>Entity Procedures</a:t>
+            </a:r>
+            <a:endParaRPr lang="en-US" dirty="0"/>
+          </a:p>
+        </p:txBody>
+      </p:sp>
+      <p:sp>
+        <p:nvSpPr>
+          <p:cNvPr id="3" name="Content Placeholder 2"/>
+          <p:cNvSpPr>
+            <a:spLocks noGrp="1"/>
+          </p:cNvSpPr>
+          <p:nvPr>
+            <p:ph idx="1"/>
+          </p:nvPr>
+        </p:nvSpPr>
+        <p:spPr/>
+        <p:txBody>
           <a:bodyPr>
-            <a:normAutofit fontScale="90000"/>
+            <a:normAutofit fontScale="92500" lnSpcReduction="20000"/>
           </a:bodyPr>
           <a:lstStyle/>
           <a:p>
-            <a:r>
-              <a:rPr lang="en-US" dirty="0" smtClean="0"/>
-              <a:t>Temporary Table DFA_WORKFLOW_ENTITY</a:t>
-            </a:r>
-            <a:endParaRPr lang="en-US" dirty="0"/>
-          </a:p>
-        </p:txBody>
-      </p:sp>
-      <p:sp>
-        <p:nvSpPr>
-          <p:cNvPr id="3" name="Content Placeholder 2"/>
-          <p:cNvSpPr>
-            <a:spLocks noGrp="1"/>
-          </p:cNvSpPr>
-          <p:nvPr>
-            <p:ph idx="1"/>
-          </p:nvPr>
-        </p:nvSpPr>
-        <p:spPr/>
-        <p:txBody>
-          <a:bodyPr/>
-          <a:lstStyle/>
-          <a:p>
-            <a:r>
-              <a:rPr lang="en-US" dirty="0" smtClean="0"/>
-              <a:t>Before invocation of DFA stored procedure, this table is populated with all DFA_WORKFLOW ids associated with the entity.</a:t>
-            </a:r>
-          </a:p>
-          <a:p>
-            <a:r>
-              <a:rPr lang="en-US" dirty="0" smtClean="0"/>
-              <a:t>After invocation, this table includes any new states and workflows that were created as a result of the DFA operation.</a:t>
+            <a:pPr marL="514350" indent="-514350">
+              <a:buFont typeface="+mj-lt"/>
+              <a:buAutoNum type="arabicPeriod"/>
+            </a:pPr>
+            <a:r>
+              <a:rPr lang="en-US" dirty="0" smtClean="0"/>
+              <a:t>Check any additional constraints that apply to the entity for the DFA call.</a:t>
+            </a:r>
+          </a:p>
+          <a:p>
+            <a:pPr marL="514350" indent="-514350">
+              <a:buFont typeface="+mj-lt"/>
+              <a:buAutoNum type="arabicPeriod"/>
+            </a:pPr>
+            <a:r>
+              <a:rPr lang="en-US" dirty="0" smtClean="0"/>
+              <a:t>Populate </a:t>
+            </a:r>
+            <a:r>
+              <a:rPr lang="en-US" dirty="0" smtClean="0"/>
+              <a:t>session tables</a:t>
+            </a:r>
+            <a:r>
+              <a:rPr lang="en-US" dirty="0" smtClean="0"/>
+              <a:t> </a:t>
+            </a:r>
+            <a:r>
+              <a:rPr lang="en-US" dirty="0" smtClean="0"/>
+              <a:t>with all of the WORKFLOW IDs that are bound (associated) to the entity.</a:t>
+            </a:r>
+          </a:p>
+          <a:p>
+            <a:pPr marL="514350" indent="-514350">
+              <a:buFont typeface="+mj-lt"/>
+              <a:buAutoNum type="arabicPeriod"/>
+            </a:pPr>
+            <a:r>
+              <a:rPr lang="en-US" dirty="0" smtClean="0"/>
+              <a:t>Execute the DFA stored proc.</a:t>
+            </a:r>
+          </a:p>
+          <a:p>
+            <a:pPr marL="514350" indent="-514350">
+              <a:buFont typeface="+mj-lt"/>
+              <a:buAutoNum type="arabicPeriod"/>
+            </a:pPr>
+            <a:r>
+              <a:rPr lang="en-US" dirty="0" smtClean="0"/>
+              <a:t>Check any additional constraints against the result (held in DFA_WORKFLOW_ENTITY).</a:t>
+            </a:r>
+          </a:p>
+          <a:p>
+            <a:pPr marL="514350" indent="-514350">
+              <a:buFont typeface="+mj-lt"/>
+              <a:buAutoNum type="arabicPeriod"/>
+            </a:pPr>
+            <a:r>
+              <a:rPr lang="en-US" dirty="0" smtClean="0"/>
+              <a:t>Bind any new DFA_WORKFLOW_IDs found in the session tables to </a:t>
+            </a:r>
+            <a:r>
+              <a:rPr lang="en-US" dirty="0" smtClean="0"/>
+              <a:t>the entity binding table.</a:t>
             </a:r>
             <a:endParaRPr lang="en-US" dirty="0"/>
           </a:p>
@@ -5679,7 +5730,7 @@
     </p:spTree>
     <p:extLst>
       <p:ext uri="{BB962C8B-B14F-4D97-AF65-F5344CB8AC3E}">
-        <p14:creationId xmlns:p14="http://schemas.microsoft.com/office/powerpoint/2010/main" val="1955225754"/>
+        <p14:creationId xmlns:p14="http://schemas.microsoft.com/office/powerpoint/2010/main" val="478946028"/>
       </p:ext>
     </p:extLst>
   </p:cSld>
@@ -5708,22 +5759,22 @@
       </p:grpSpPr>
       <p:sp>
         <p:nvSpPr>
-          <p:cNvPr id="2" name="Title 1"/>
-          <p:cNvSpPr>
-            <a:spLocks noGrp="1"/>
-          </p:cNvSpPr>
-          <p:nvPr>
-            <p:ph type="title"/>
-          </p:nvPr>
-        </p:nvSpPr>
-        <p:spPr/>
-        <p:txBody>
-          <a:bodyPr/>
-          <a:lstStyle/>
-          <a:p>
-            <a:r>
-              <a:rPr lang="en-US" dirty="0" smtClean="0"/>
-              <a:t>Entity Procedures</a:t>
+          <p:cNvPr id="5" name="Title 4"/>
+          <p:cNvSpPr>
+            <a:spLocks noGrp="1"/>
+          </p:cNvSpPr>
+          <p:nvPr>
+            <p:ph type="ctrTitle"/>
+          </p:nvPr>
+        </p:nvSpPr>
+        <p:spPr/>
+        <p:txBody>
+          <a:bodyPr/>
+          <a:lstStyle/>
+          <a:p>
+            <a:r>
+              <a:rPr lang="en-US" dirty="0" smtClean="0"/>
+              <a:t>Employee Demo</a:t>
             </a:r>
             <a:endParaRPr lang="en-US" dirty="0"/>
           </a:p>
@@ -5731,68 +5782,22 @@
       </p:sp>
       <p:sp>
         <p:nvSpPr>
-          <p:cNvPr id="3" name="Content Placeholder 2"/>
-          <p:cNvSpPr>
-            <a:spLocks noGrp="1"/>
-          </p:cNvSpPr>
-          <p:nvPr>
-            <p:ph idx="1"/>
-          </p:nvPr>
-        </p:nvSpPr>
-        <p:spPr/>
-        <p:txBody>
-          <a:bodyPr>
-            <a:normAutofit fontScale="92500" lnSpcReduction="20000"/>
-          </a:bodyPr>
-          <a:lstStyle/>
-          <a:p>
-            <a:pPr marL="514350" indent="-514350">
-              <a:buFont typeface="+mj-lt"/>
-              <a:buAutoNum type="arabicPeriod"/>
-            </a:pPr>
-            <a:r>
-              <a:rPr lang="en-US" dirty="0" smtClean="0"/>
-              <a:t>Check any additional constraints that apply to the entity for the DFA call.</a:t>
-            </a:r>
-          </a:p>
-          <a:p>
-            <a:pPr marL="514350" indent="-514350">
-              <a:buFont typeface="+mj-lt"/>
-              <a:buAutoNum type="arabicPeriod"/>
-            </a:pPr>
-            <a:r>
-              <a:rPr lang="en-US" dirty="0" smtClean="0"/>
-              <a:t>Populate DFA_WORKFLOW_ENTITY with all of the WORKFLOW IDs that are bound (associated) to the entity.</a:t>
-            </a:r>
-          </a:p>
-          <a:p>
-            <a:pPr marL="514350" indent="-514350">
-              <a:buFont typeface="+mj-lt"/>
-              <a:buAutoNum type="arabicPeriod"/>
-            </a:pPr>
-            <a:r>
-              <a:rPr lang="en-US" dirty="0" smtClean="0"/>
-              <a:t>Execute the DFA stored proc.</a:t>
-            </a:r>
-          </a:p>
-          <a:p>
-            <a:pPr marL="514350" indent="-514350">
-              <a:buFont typeface="+mj-lt"/>
-              <a:buAutoNum type="arabicPeriod"/>
-            </a:pPr>
-            <a:r>
-              <a:rPr lang="en-US" dirty="0" smtClean="0"/>
-              <a:t>Check any additional constraints against the result (held in DFA_WORKFLOW_ENTITY).</a:t>
-            </a:r>
-          </a:p>
-          <a:p>
-            <a:pPr marL="514350" indent="-514350">
-              <a:buFont typeface="+mj-lt"/>
-              <a:buAutoNum type="arabicPeriod"/>
-            </a:pPr>
-            <a:r>
-              <a:rPr lang="en-US" dirty="0" smtClean="0"/>
-              <a:t>Bind any new DFA_WORKFLOW_IDs found in DFA_WORKFLOW_ENTITY to the entity binding table.</a:t>
+          <p:cNvPr id="6" name="Subtitle 5"/>
+          <p:cNvSpPr>
+            <a:spLocks noGrp="1"/>
+          </p:cNvSpPr>
+          <p:nvPr>
+            <p:ph type="subTitle" idx="1"/>
+          </p:nvPr>
+        </p:nvSpPr>
+        <p:spPr/>
+        <p:txBody>
+          <a:bodyPr/>
+          <a:lstStyle/>
+          <a:p>
+            <a:r>
+              <a:rPr lang="en-US" dirty="0" smtClean="0"/>
+              <a:t>Demonstration of DFA used to track workflow of hiring a new employee.</a:t>
             </a:r>
             <a:endParaRPr lang="en-US" dirty="0"/>
           </a:p>
@@ -5825,7 +5830,7 @@
     </p:spTree>
     <p:extLst>
       <p:ext uri="{BB962C8B-B14F-4D97-AF65-F5344CB8AC3E}">
-        <p14:creationId xmlns:p14="http://schemas.microsoft.com/office/powerpoint/2010/main" val="478946028"/>
+        <p14:creationId xmlns:p14="http://schemas.microsoft.com/office/powerpoint/2010/main" val="95673676"/>
       </p:ext>
     </p:extLst>
   </p:cSld>
@@ -5854,22 +5859,30 @@
       </p:grpSpPr>
       <p:sp>
         <p:nvSpPr>
-          <p:cNvPr id="5" name="Title 4"/>
-          <p:cNvSpPr>
-            <a:spLocks noGrp="1"/>
-          </p:cNvSpPr>
-          <p:nvPr>
-            <p:ph type="ctrTitle"/>
-          </p:nvPr>
-        </p:nvSpPr>
-        <p:spPr/>
-        <p:txBody>
-          <a:bodyPr/>
-          <a:lstStyle/>
-          <a:p>
-            <a:r>
-              <a:rPr lang="en-US" dirty="0" smtClean="0"/>
-              <a:t>Employee Demo</a:t>
+          <p:cNvPr id="2" name="Title 1"/>
+          <p:cNvSpPr>
+            <a:spLocks noGrp="1"/>
+          </p:cNvSpPr>
+          <p:nvPr>
+            <p:ph type="title"/>
+          </p:nvPr>
+        </p:nvSpPr>
+        <p:spPr/>
+        <p:txBody>
+          <a:bodyPr/>
+          <a:lstStyle/>
+          <a:p>
+            <a:r>
+              <a:rPr lang="en-US" dirty="0" smtClean="0"/>
+              <a:t>Is DFA Workflow the Right </a:t>
+            </a:r>
+            <a:r>
+              <a:rPr lang="en-US" dirty="0"/>
+              <a:t>C</a:t>
+            </a:r>
+            <a:r>
+              <a:rPr lang="en-US" dirty="0" smtClean="0"/>
+              <a:t>hoice?</a:t>
             </a:r>
             <a:endParaRPr lang="en-US" dirty="0"/>
           </a:p>
@@ -5877,23 +5890,39 @@
       </p:sp>
       <p:sp>
         <p:nvSpPr>
-          <p:cNvPr id="6" name="Subtitle 5"/>
-          <p:cNvSpPr>
-            <a:spLocks noGrp="1"/>
-          </p:cNvSpPr>
-          <p:nvPr>
-            <p:ph type="subTitle" idx="1"/>
-          </p:nvPr>
-        </p:nvSpPr>
-        <p:spPr/>
-        <p:txBody>
-          <a:bodyPr/>
-          <a:lstStyle/>
-          <a:p>
-            <a:r>
-              <a:rPr lang="en-US" dirty="0" smtClean="0"/>
-              <a:t>Demonstration of DFA used to track workflow of hiring a new employee.</a:t>
-            </a:r>
+          <p:cNvPr id="3" name="Content Placeholder 2"/>
+          <p:cNvSpPr>
+            <a:spLocks noGrp="1"/>
+          </p:cNvSpPr>
+          <p:nvPr>
+            <p:ph idx="1"/>
+          </p:nvPr>
+        </p:nvSpPr>
+        <p:spPr/>
+        <p:txBody>
+          <a:bodyPr>
+            <a:normAutofit fontScale="92500"/>
+          </a:bodyPr>
+          <a:lstStyle/>
+          <a:p>
+            <a:r>
+              <a:rPr lang="en-US" dirty="0" smtClean="0"/>
+              <a:t>Sometimes when you are given a hammer, everything looks like a nail, but sometimes this is not the best choice when…</a:t>
+            </a:r>
+          </a:p>
+          <a:p>
+            <a:r>
+              <a:rPr lang="en-US" dirty="0" smtClean="0"/>
+              <a:t>An objective does not have a well defined order (which means it isn’t actually a workflow…)</a:t>
+            </a:r>
+          </a:p>
+          <a:p>
+            <a:r>
+              <a:rPr lang="en-US" dirty="0" smtClean="0"/>
+              <a:t>A workflow is data centric as opposed to process centric.  Computed/generated columns coupled with triggers work well for this case.</a:t>
+            </a:r>
+          </a:p>
+          <a:p>
             <a:endParaRPr lang="en-US" dirty="0"/>
           </a:p>
         </p:txBody>
@@ -5925,7 +5954,7 @@
     </p:spTree>
     <p:extLst>
       <p:ext uri="{BB962C8B-B14F-4D97-AF65-F5344CB8AC3E}">
-        <p14:creationId xmlns:p14="http://schemas.microsoft.com/office/powerpoint/2010/main" val="95673676"/>
+        <p14:creationId xmlns:p14="http://schemas.microsoft.com/office/powerpoint/2010/main" val="165247136"/>
       </p:ext>
     </p:extLst>
   </p:cSld>
@@ -5969,15 +5998,7 @@
           <a:p>
             <a:r>
               <a:rPr lang="en-US" dirty="0" smtClean="0"/>
-              <a:t>Is DFA Workflow the Right </a:t>
-            </a:r>
-            <a:r>
-              <a:rPr lang="en-US" dirty="0"/>
-              <a:t>C</a:t>
-            </a:r>
-            <a:r>
-              <a:rPr lang="en-US" dirty="0" smtClean="0"/>
-              <a:t>hoice?</a:t>
+              <a:t>Open Source Project</a:t>
             </a:r>
             <a:endParaRPr lang="en-US" dirty="0"/>
           </a:p>
@@ -5995,30 +6016,36 @@
         </p:nvSpPr>
         <p:spPr/>
         <p:txBody>
-          <a:bodyPr>
-            <a:normAutofit fontScale="92500"/>
-          </a:bodyPr>
-          <a:lstStyle/>
-          <a:p>
-            <a:r>
-              <a:rPr lang="en-US" dirty="0" smtClean="0"/>
-              <a:t>Sometimes when you are given a hammer, everything looks like a nail, but sometimes this is not the best choice when…</a:t>
-            </a:r>
-          </a:p>
-          <a:p>
-            <a:r>
-              <a:rPr lang="en-US" dirty="0" smtClean="0"/>
-              <a:t>An objective does not have a well defined order (which means it isn’t actually a workflow…)</a:t>
-            </a:r>
-          </a:p>
-          <a:p>
-            <a:r>
-              <a:rPr lang="en-US" dirty="0" smtClean="0"/>
-              <a:t>A workflow is data centric as opposed to process centric.  Computed/generated columns coupled with triggers work well for this case.</a:t>
-            </a:r>
-          </a:p>
-          <a:p>
-            <a:endParaRPr lang="en-US" dirty="0"/>
+          <a:bodyPr/>
+          <a:lstStyle/>
+          <a:p>
+            <a:r>
+              <a:rPr lang="en-US" dirty="0" smtClean="0"/>
+              <a:t>Will release the </a:t>
+            </a:r>
+            <a:r>
+              <a:rPr lang="en-US" dirty="0" err="1" smtClean="0"/>
+              <a:t>MariaDB</a:t>
+            </a:r>
+            <a:r>
+              <a:rPr lang="en-US" dirty="0" smtClean="0"/>
+              <a:t> code and associated unit tests as an open source project.</a:t>
+            </a:r>
+          </a:p>
+          <a:p>
+            <a:r>
+              <a:rPr lang="en-US" dirty="0" smtClean="0"/>
+              <a:t>Am interested in people who would like to collaborate on this, especially with respect to JavaScript bindings or demos.</a:t>
+            </a:r>
+          </a:p>
+          <a:p>
+            <a:r>
+              <a:rPr lang="en-US" dirty="0" smtClean="0"/>
+              <a:t>The open source version will have more features then the demonstration.</a:t>
+            </a:r>
+          </a:p>
+          <a:p>
+            <a:endParaRPr lang="en-US" dirty="0" smtClean="0"/>
           </a:p>
         </p:txBody>
       </p:sp>
@@ -6049,7 +6076,7 @@
     </p:spTree>
     <p:extLst>
       <p:ext uri="{BB962C8B-B14F-4D97-AF65-F5344CB8AC3E}">
-        <p14:creationId xmlns:p14="http://schemas.microsoft.com/office/powerpoint/2010/main" val="165247136"/>
+        <p14:creationId xmlns:p14="http://schemas.microsoft.com/office/powerpoint/2010/main" val="1116706779"/>
       </p:ext>
     </p:extLst>
   </p:cSld>
@@ -6078,22 +6105,22 @@
       </p:grpSpPr>
       <p:sp>
         <p:nvSpPr>
-          <p:cNvPr id="5" name="Title 4"/>
-          <p:cNvSpPr>
-            <a:spLocks noGrp="1"/>
-          </p:cNvSpPr>
-          <p:nvPr>
-            <p:ph type="ctrTitle"/>
-          </p:nvPr>
-        </p:nvSpPr>
-        <p:spPr/>
-        <p:txBody>
-          <a:bodyPr/>
-          <a:lstStyle/>
-          <a:p>
-            <a:r>
-              <a:rPr lang="en-US" dirty="0" smtClean="0"/>
-              <a:t>Questions</a:t>
+          <p:cNvPr id="2" name="Title 1"/>
+          <p:cNvSpPr>
+            <a:spLocks noGrp="1"/>
+          </p:cNvSpPr>
+          <p:nvPr>
+            <p:ph type="title"/>
+          </p:nvPr>
+        </p:nvSpPr>
+        <p:spPr/>
+        <p:txBody>
+          <a:bodyPr/>
+          <a:lstStyle/>
+          <a:p>
+            <a:r>
+              <a:rPr lang="en-US" dirty="0" smtClean="0"/>
+              <a:t>Additional Features Planned</a:t>
             </a:r>
             <a:endParaRPr lang="en-US" dirty="0"/>
           </a:p>
@@ -6101,22 +6128,71 @@
       </p:sp>
       <p:sp>
         <p:nvSpPr>
-          <p:cNvPr id="6" name="Subtitle 5"/>
-          <p:cNvSpPr>
-            <a:spLocks noGrp="1"/>
-          </p:cNvSpPr>
-          <p:nvPr>
-            <p:ph type="subTitle" idx="1"/>
-          </p:nvPr>
-        </p:nvSpPr>
-        <p:spPr/>
-        <p:txBody>
-          <a:bodyPr/>
-          <a:lstStyle/>
-          <a:p>
-            <a:r>
-              <a:rPr lang="en-US" dirty="0" smtClean="0"/>
-              <a:t>(and Hopefully Answers)</a:t>
+          <p:cNvPr id="3" name="Content Placeholder 2"/>
+          <p:cNvSpPr>
+            <a:spLocks noGrp="1"/>
+          </p:cNvSpPr>
+          <p:nvPr>
+            <p:ph idx="1"/>
+          </p:nvPr>
+        </p:nvSpPr>
+        <p:spPr/>
+        <p:txBody>
+          <a:bodyPr>
+            <a:normAutofit/>
+          </a:bodyPr>
+          <a:lstStyle/>
+          <a:p>
+            <a:r>
+              <a:rPr lang="en-US" dirty="0" smtClean="0"/>
+              <a:t>Parallel workflows (as described earlier)</a:t>
+            </a:r>
+          </a:p>
+          <a:p>
+            <a:pPr lvl="1"/>
+            <a:r>
+              <a:rPr lang="en-US" dirty="0" smtClean="0"/>
+              <a:t>Workflow state initiates 1 or more sub workflows</a:t>
+            </a:r>
+          </a:p>
+          <a:p>
+            <a:pPr lvl="1"/>
+            <a:r>
+              <a:rPr lang="en-US" dirty="0" smtClean="0"/>
+              <a:t>Completion of all sub workflows </a:t>
+            </a:r>
+            <a:r>
+              <a:rPr lang="en-US" smtClean="0"/>
+              <a:t>sends an event </a:t>
+            </a:r>
+            <a:r>
+              <a:rPr lang="en-US" dirty="0" smtClean="0"/>
+              <a:t>to parent.</a:t>
+            </a:r>
+            <a:endParaRPr lang="en-US" dirty="0" smtClean="0"/>
+          </a:p>
+          <a:p>
+            <a:r>
+              <a:rPr lang="en-US" dirty="0" smtClean="0"/>
+              <a:t>Conditional </a:t>
+            </a:r>
+            <a:r>
+              <a:rPr lang="en-US" dirty="0" smtClean="0"/>
+              <a:t>Processing</a:t>
+            </a:r>
+          </a:p>
+          <a:p>
+            <a:pPr lvl="1"/>
+            <a:r>
+              <a:rPr lang="en-US" dirty="0" smtClean="0"/>
+              <a:t>States may define alternate states</a:t>
+            </a:r>
+          </a:p>
+          <a:p>
+            <a:pPr lvl="1"/>
+            <a:r>
+              <a:rPr lang="en-US" dirty="0" smtClean="0"/>
+              <a:t>These are processed if a state’s constraint is unsatisfied until constraint is satisfied or there is no alternate.</a:t>
             </a:r>
             <a:endParaRPr lang="en-US" dirty="0"/>
           </a:p>
@@ -6146,6 +6222,169 @@
           </a:p>
         </p:txBody>
       </p:sp>
+    </p:spTree>
+    <p:extLst>
+      <p:ext uri="{BB962C8B-B14F-4D97-AF65-F5344CB8AC3E}">
+        <p14:creationId xmlns:p14="http://schemas.microsoft.com/office/powerpoint/2010/main" val="4141825498"/>
+      </p:ext>
+    </p:extLst>
+  </p:cSld>
+  <p:clrMapOvr>
+    <a:masterClrMapping/>
+  </p:clrMapOvr>
+</p:sld>
+</file>
+
+<file path=ppt/slides/slide27.xml><?xml version="1.0" encoding="utf-8"?>
+<p:sld xmlns:a="http://schemas.openxmlformats.org/drawingml/2006/main" xmlns:r="http://schemas.openxmlformats.org/officeDocument/2006/relationships" xmlns:p="http://schemas.openxmlformats.org/presentationml/2006/main">
+  <p:cSld>
+    <p:spTree>
+      <p:nvGrpSpPr>
+        <p:cNvPr id="1" name=""/>
+        <p:cNvGrpSpPr/>
+        <p:nvPr/>
+      </p:nvGrpSpPr>
+      <p:grpSpPr>
+        <a:xfrm>
+          <a:off x="0" y="0"/>
+          <a:ext cx="0" cy="0"/>
+          <a:chOff x="0" y="0"/>
+          <a:chExt cx="0" cy="0"/>
+        </a:xfrm>
+      </p:grpSpPr>
+      <p:sp>
+        <p:nvSpPr>
+          <p:cNvPr id="2" name="Title 1"/>
+          <p:cNvSpPr>
+            <a:spLocks noGrp="1"/>
+          </p:cNvSpPr>
+          <p:nvPr>
+            <p:ph type="title"/>
+          </p:nvPr>
+        </p:nvSpPr>
+        <p:spPr/>
+        <p:txBody>
+          <a:bodyPr/>
+          <a:lstStyle/>
+          <a:p>
+            <a:r>
+              <a:rPr lang="en-US" dirty="0" smtClean="0"/>
+              <a:t>My Contact Info</a:t>
+            </a:r>
+            <a:endParaRPr lang="en-US" dirty="0"/>
+          </a:p>
+        </p:txBody>
+      </p:sp>
+      <p:sp>
+        <p:nvSpPr>
+          <p:cNvPr id="3" name="Content Placeholder 2"/>
+          <p:cNvSpPr>
+            <a:spLocks noGrp="1"/>
+          </p:cNvSpPr>
+          <p:nvPr>
+            <p:ph idx="1"/>
+          </p:nvPr>
+        </p:nvSpPr>
+        <p:spPr/>
+        <p:txBody>
+          <a:bodyPr/>
+          <a:lstStyle/>
+          <a:p>
+            <a:r>
+              <a:rPr lang="en-US" dirty="0" smtClean="0">
+                <a:hlinkClick r:id="rId2"/>
+              </a:rPr>
+              <a:t>richard.roda@hp.com</a:t>
+            </a:r>
+            <a:endParaRPr lang="en-US" dirty="0" smtClean="0"/>
+          </a:p>
+          <a:p>
+            <a:r>
+              <a:rPr lang="en-US" dirty="0"/>
+              <a:t>Project GitHub URL: </a:t>
+            </a:r>
+            <a:r>
+              <a:rPr lang="en-US" dirty="0">
+                <a:hlinkClick r:id="rId3"/>
+              </a:rPr>
+              <a:t>https://</a:t>
+            </a:r>
+            <a:r>
+              <a:rPr lang="en-US" dirty="0" smtClean="0">
+                <a:hlinkClick r:id="rId3"/>
+              </a:rPr>
+              <a:t>github.com/RichardRoda/DFA-Workflow-Model</a:t>
+            </a:r>
+            <a:r>
+              <a:rPr lang="en-US" dirty="0" smtClean="0"/>
+              <a:t> </a:t>
+            </a:r>
+          </a:p>
+          <a:p>
+            <a:r>
+              <a:rPr lang="en-US" dirty="0" smtClean="0"/>
+              <a:t>As QR Code</a:t>
+            </a:r>
+          </a:p>
+          <a:p>
+            <a:endParaRPr lang="en-US" dirty="0" smtClean="0"/>
+          </a:p>
+        </p:txBody>
+      </p:sp>
+      <p:sp>
+        <p:nvSpPr>
+          <p:cNvPr id="4" name="Slide Number Placeholder 3"/>
+          <p:cNvSpPr>
+            <a:spLocks noGrp="1"/>
+          </p:cNvSpPr>
+          <p:nvPr>
+            <p:ph type="sldNum" sz="quarter" idx="12"/>
+          </p:nvPr>
+        </p:nvSpPr>
+        <p:spPr/>
+        <p:txBody>
+          <a:bodyPr/>
+          <a:lstStyle/>
+          <a:p>
+            <a:fld id="{B6F15528-21DE-4FAA-801E-634DDDAF4B2B}" type="slidenum">
+              <a:rPr lang="en-US" smtClean="0"/>
+              <a:pPr/>
+              <a:t>27</a:t>
+            </a:fld>
+            <a:endParaRPr lang="en-US"/>
+          </a:p>
+        </p:txBody>
+      </p:sp>
+      <p:pic>
+        <p:nvPicPr>
+          <p:cNvPr id="7" name="Picture 6"/>
+          <p:cNvPicPr>
+            <a:picLocks noChangeAspect="1"/>
+          </p:cNvPicPr>
+          <p:nvPr/>
+        </p:nvPicPr>
+        <p:blipFill>
+          <a:blip r:embed="rId4">
+            <a:extLst>
+              <a:ext uri="{28A0092B-C50C-407E-A947-70E740481C1C}">
+                <a14:useLocalDpi xmlns:a14="http://schemas.microsoft.com/office/drawing/2010/main" val="0"/>
+              </a:ext>
+            </a:extLst>
+          </a:blip>
+          <a:stretch>
+            <a:fillRect/>
+          </a:stretch>
+        </p:blipFill>
+        <p:spPr>
+          <a:xfrm>
+            <a:off x="4953000" y="3505200"/>
+            <a:ext cx="2918936" cy="2918936"/>
+          </a:xfrm>
+          <a:prstGeom prst="rect">
+            <a:avLst/>
+          </a:prstGeom>
+        </p:spPr>
+      </p:pic>
     </p:spTree>
     <p:extLst>
       <p:ext uri="{BB962C8B-B14F-4D97-AF65-F5344CB8AC3E}">

</xml_diff>

<commit_message>
I lied, previous comment was not final version.  Added slides detailing planned undo, passive, and concurrent states features.  This should be the final version.
Signed-off-by: RichardRoda <RichardRoda@users.noreply.github.com>
</commit_message>
<xml_diff>
--- a/Modeling Workflows with Event Driven DFA.pptx
+++ b/Modeling Workflows with Event Driven DFA.pptx
@@ -5,7 +5,7 @@
     <p:sldMasterId id="2147483648" r:id="rId1"/>
   </p:sldMasterIdLst>
   <p:notesMasterIdLst>
-    <p:notesMasterId r:id="rId29"/>
+    <p:notesMasterId r:id="rId31"/>
   </p:notesMasterIdLst>
   <p:sldIdLst>
     <p:sldId id="256" r:id="rId2"/>
@@ -34,7 +34,9 @@
     <p:sldId id="280" r:id="rId25"/>
     <p:sldId id="282" r:id="rId26"/>
     <p:sldId id="283" r:id="rId27"/>
-    <p:sldId id="281" r:id="rId28"/>
+    <p:sldId id="284" r:id="rId28"/>
+    <p:sldId id="285" r:id="rId29"/>
+    <p:sldId id="281" r:id="rId30"/>
   </p:sldIdLst>
   <p:sldSz cx="9144000" cy="6858000" type="screen4x3"/>
   <p:notesSz cx="6858000" cy="9144000"/>
@@ -234,7 +236,7 @@
           <a:p>
             <a:fld id="{D0F15B3C-1181-4445-BB6A-6BED1DF2958C}" type="datetimeFigureOut">
               <a:rPr lang="en-US" smtClean="0"/>
-              <a:t>4/28/2015</a:t>
+              <a:t>4/29/2015</a:t>
             </a:fld>
             <a:endParaRPr lang="en-US"/>
           </a:p>
@@ -851,7 +853,7 @@
           <a:p>
             <a:fld id="{2927DE08-9B48-44D6-83D4-230A82F93FAE}" type="datetime1">
               <a:rPr lang="en-US" smtClean="0"/>
-              <a:t>4/28/2015</a:t>
+              <a:t>4/29/2015</a:t>
             </a:fld>
             <a:endParaRPr lang="en-US"/>
           </a:p>
@@ -1017,7 +1019,7 @@
           <a:p>
             <a:fld id="{5D95C52C-C3C1-4927-8E70-C103DE1C3321}" type="datetime1">
               <a:rPr lang="en-US" smtClean="0"/>
-              <a:t>4/28/2015</a:t>
+              <a:t>4/29/2015</a:t>
             </a:fld>
             <a:endParaRPr lang="en-US"/>
           </a:p>
@@ -1193,7 +1195,7 @@
           <a:p>
             <a:fld id="{90E3D6A5-38A1-4FEC-A43A-47F48DEDEFD3}" type="datetime1">
               <a:rPr lang="en-US" smtClean="0"/>
-              <a:t>4/28/2015</a:t>
+              <a:t>4/29/2015</a:t>
             </a:fld>
             <a:endParaRPr lang="en-US"/>
           </a:p>
@@ -1359,7 +1361,7 @@
           <a:p>
             <a:fld id="{D8E26438-717D-40FF-AE1C-BA0484F53167}" type="datetime1">
               <a:rPr lang="en-US" smtClean="0"/>
-              <a:t>4/28/2015</a:t>
+              <a:t>4/29/2015</a:t>
             </a:fld>
             <a:endParaRPr lang="en-US"/>
           </a:p>
@@ -1601,7 +1603,7 @@
           <a:p>
             <a:fld id="{204240F7-7708-4F95-8DF5-779CE1EBFAFE}" type="datetime1">
               <a:rPr lang="en-US" smtClean="0"/>
-              <a:t>4/28/2015</a:t>
+              <a:t>4/29/2015</a:t>
             </a:fld>
             <a:endParaRPr lang="en-US"/>
           </a:p>
@@ -1885,7 +1887,7 @@
           <a:p>
             <a:fld id="{9AB1B8F5-007F-4624-9D09-74A4BB144A1B}" type="datetime1">
               <a:rPr lang="en-US" smtClean="0"/>
-              <a:t>4/28/2015</a:t>
+              <a:t>4/29/2015</a:t>
             </a:fld>
             <a:endParaRPr lang="en-US"/>
           </a:p>
@@ -2303,7 +2305,7 @@
           <a:p>
             <a:fld id="{33652302-F773-471B-A447-C9E7D11FB526}" type="datetime1">
               <a:rPr lang="en-US" smtClean="0"/>
-              <a:t>4/28/2015</a:t>
+              <a:t>4/29/2015</a:t>
             </a:fld>
             <a:endParaRPr lang="en-US"/>
           </a:p>
@@ -2417,7 +2419,7 @@
           <a:p>
             <a:fld id="{505FC5C8-7D30-45A5-B6D7-01D5FFF04AAA}" type="datetime1">
               <a:rPr lang="en-US" smtClean="0"/>
-              <a:t>4/28/2015</a:t>
+              <a:t>4/29/2015</a:t>
             </a:fld>
             <a:endParaRPr lang="en-US"/>
           </a:p>
@@ -2508,7 +2510,7 @@
           <a:p>
             <a:fld id="{2203C164-A71A-4152-83A1-27E2B515D187}" type="datetime1">
               <a:rPr lang="en-US" smtClean="0"/>
-              <a:t>4/28/2015</a:t>
+              <a:t>4/29/2015</a:t>
             </a:fld>
             <a:endParaRPr lang="en-US"/>
           </a:p>
@@ -2781,7 +2783,7 @@
           <a:p>
             <a:fld id="{0B77CF3C-9740-4894-A406-34BF11EA8119}" type="datetime1">
               <a:rPr lang="en-US" smtClean="0"/>
-              <a:t>4/28/2015</a:t>
+              <a:t>4/29/2015</a:t>
             </a:fld>
             <a:endParaRPr lang="en-US"/>
           </a:p>
@@ -3030,7 +3032,7 @@
           <a:p>
             <a:fld id="{65AEF08F-C222-4314-9819-054B5D3660D4}" type="datetime1">
               <a:rPr lang="en-US" smtClean="0"/>
-              <a:t>4/28/2015</a:t>
+              <a:t>4/29/2015</a:t>
             </a:fld>
             <a:endParaRPr lang="en-US"/>
           </a:p>
@@ -3239,7 +3241,7 @@
           <a:p>
             <a:fld id="{97CA4D54-662E-4D1F-9D66-59ED33158556}" type="datetime1">
               <a:rPr lang="en-US" smtClean="0"/>
-              <a:t>4/28/2015</a:t>
+              <a:t>4/29/2015</a:t>
             </a:fld>
             <a:endParaRPr lang="en-US"/>
           </a:p>
@@ -5651,19 +5653,7 @@
             </a:pPr>
             <a:r>
               <a:rPr lang="en-US" dirty="0" smtClean="0"/>
-              <a:t>Populate </a:t>
-            </a:r>
-            <a:r>
-              <a:rPr lang="en-US" dirty="0" smtClean="0"/>
-              <a:t>session tables</a:t>
-            </a:r>
-            <a:r>
-              <a:rPr lang="en-US" dirty="0" smtClean="0"/>
-              <a:t> </a:t>
-            </a:r>
-            <a:r>
-              <a:rPr lang="en-US" dirty="0" smtClean="0"/>
-              <a:t>with all of the WORKFLOW IDs that are bound (associated) to the entity.</a:t>
+              <a:t>Populate session tables with all of the WORKFLOW IDs that are bound (associated) to the entity.</a:t>
             </a:r>
           </a:p>
           <a:p>
@@ -5693,11 +5683,7 @@
             </a:pPr>
             <a:r>
               <a:rPr lang="en-US" dirty="0" smtClean="0"/>
-              <a:t>Bind any new DFA_WORKFLOW_IDs found in the session tables to </a:t>
-            </a:r>
-            <a:r>
-              <a:rPr lang="en-US" dirty="0" smtClean="0"/>
-              <a:t>the entity binding table.</a:t>
+              <a:t>Bind any new DFA_WORKFLOW_IDs found in the session tables to the entity binding table.</a:t>
             </a:r>
             <a:endParaRPr lang="en-US" dirty="0"/>
           </a:p>
@@ -6169,16 +6155,11 @@
               <a:rPr lang="en-US" dirty="0" smtClean="0"/>
               <a:t>to parent.</a:t>
             </a:r>
-            <a:endParaRPr lang="en-US" dirty="0" smtClean="0"/>
-          </a:p>
-          <a:p>
-            <a:r>
-              <a:rPr lang="en-US" dirty="0" smtClean="0"/>
-              <a:t>Conditional </a:t>
-            </a:r>
-            <a:r>
-              <a:rPr lang="en-US" dirty="0" smtClean="0"/>
-              <a:t>Processing</a:t>
+          </a:p>
+          <a:p>
+            <a:r>
+              <a:rPr lang="en-US" dirty="0" smtClean="0"/>
+              <a:t>Conditional Processing</a:t>
             </a:r>
           </a:p>
           <a:p>
@@ -6269,6 +6250,289 @@
           <a:p>
             <a:r>
               <a:rPr lang="en-US" dirty="0" smtClean="0"/>
+              <a:t>Additional Features (Continued)</a:t>
+            </a:r>
+            <a:endParaRPr lang="en-US" dirty="0"/>
+          </a:p>
+        </p:txBody>
+      </p:sp>
+      <p:sp>
+        <p:nvSpPr>
+          <p:cNvPr id="3" name="Content Placeholder 2"/>
+          <p:cNvSpPr>
+            <a:spLocks noGrp="1"/>
+          </p:cNvSpPr>
+          <p:nvPr>
+            <p:ph idx="1"/>
+          </p:nvPr>
+        </p:nvSpPr>
+        <p:spPr/>
+        <p:txBody>
+          <a:bodyPr>
+            <a:normAutofit/>
+          </a:bodyPr>
+          <a:lstStyle/>
+          <a:p>
+            <a:r>
+              <a:rPr lang="en-US" dirty="0" smtClean="0"/>
+              <a:t>Undoable Operations</a:t>
+            </a:r>
+          </a:p>
+          <a:p>
+            <a:pPr lvl="1"/>
+            <a:r>
+              <a:rPr lang="en-US" dirty="0" smtClean="0"/>
+              <a:t>Concept of pseudo states – states that are never entered but apply operations to the workflow.</a:t>
+            </a:r>
+          </a:p>
+          <a:p>
+            <a:pPr lvl="1"/>
+            <a:r>
+              <a:rPr lang="en-US" dirty="0" smtClean="0"/>
+              <a:t>Undo pseudo state sends workflow to the previous state.</a:t>
+            </a:r>
+          </a:p>
+          <a:p>
+            <a:r>
+              <a:rPr lang="en-US" dirty="0" smtClean="0"/>
+              <a:t>Passive Events</a:t>
+            </a:r>
+          </a:p>
+          <a:p>
+            <a:pPr lvl="1"/>
+            <a:r>
+              <a:rPr lang="en-US" dirty="0" smtClean="0"/>
+              <a:t>Do not alter the state of the workflow.</a:t>
+            </a:r>
+          </a:p>
+          <a:p>
+            <a:pPr lvl="1"/>
+            <a:r>
+              <a:rPr lang="en-US" dirty="0" smtClean="0"/>
+              <a:t>Used to capture annotations or comments.</a:t>
+            </a:r>
+          </a:p>
+        </p:txBody>
+      </p:sp>
+      <p:sp>
+        <p:nvSpPr>
+          <p:cNvPr id="4" name="Slide Number Placeholder 3"/>
+          <p:cNvSpPr>
+            <a:spLocks noGrp="1"/>
+          </p:cNvSpPr>
+          <p:nvPr>
+            <p:ph type="sldNum" sz="quarter" idx="12"/>
+          </p:nvPr>
+        </p:nvSpPr>
+        <p:spPr/>
+        <p:txBody>
+          <a:bodyPr/>
+          <a:lstStyle/>
+          <a:p>
+            <a:fld id="{B6F15528-21DE-4FAA-801E-634DDDAF4B2B}" type="slidenum">
+              <a:rPr lang="en-US" smtClean="0"/>
+              <a:pPr/>
+              <a:t>27</a:t>
+            </a:fld>
+            <a:endParaRPr lang="en-US"/>
+          </a:p>
+        </p:txBody>
+      </p:sp>
+    </p:spTree>
+    <p:extLst>
+      <p:ext uri="{BB962C8B-B14F-4D97-AF65-F5344CB8AC3E}">
+        <p14:creationId xmlns:p14="http://schemas.microsoft.com/office/powerpoint/2010/main" val="553451812"/>
+      </p:ext>
+    </p:extLst>
+  </p:cSld>
+  <p:clrMapOvr>
+    <a:masterClrMapping/>
+  </p:clrMapOvr>
+</p:sld>
+</file>
+
+<file path=ppt/slides/slide28.xml><?xml version="1.0" encoding="utf-8"?>
+<p:sld xmlns:a="http://schemas.openxmlformats.org/drawingml/2006/main" xmlns:r="http://schemas.openxmlformats.org/officeDocument/2006/relationships" xmlns:p="http://schemas.openxmlformats.org/presentationml/2006/main">
+  <p:cSld>
+    <p:spTree>
+      <p:nvGrpSpPr>
+        <p:cNvPr id="1" name=""/>
+        <p:cNvGrpSpPr/>
+        <p:nvPr/>
+      </p:nvGrpSpPr>
+      <p:grpSpPr>
+        <a:xfrm>
+          <a:off x="0" y="0"/>
+          <a:ext cx="0" cy="0"/>
+          <a:chOff x="0" y="0"/>
+          <a:chExt cx="0" cy="0"/>
+        </a:xfrm>
+      </p:grpSpPr>
+      <p:sp>
+        <p:nvSpPr>
+          <p:cNvPr id="2" name="Title 1"/>
+          <p:cNvSpPr>
+            <a:spLocks noGrp="1"/>
+          </p:cNvSpPr>
+          <p:nvPr>
+            <p:ph type="title"/>
+          </p:nvPr>
+        </p:nvSpPr>
+        <p:spPr/>
+        <p:txBody>
+          <a:bodyPr/>
+          <a:lstStyle/>
+          <a:p>
+            <a:r>
+              <a:rPr lang="en-US" dirty="0" smtClean="0"/>
+              <a:t>Additional Features (Continued 2)</a:t>
+            </a:r>
+            <a:endParaRPr lang="en-US" dirty="0"/>
+          </a:p>
+        </p:txBody>
+      </p:sp>
+      <p:sp>
+        <p:nvSpPr>
+          <p:cNvPr id="3" name="Content Placeholder 2"/>
+          <p:cNvSpPr>
+            <a:spLocks noGrp="1"/>
+          </p:cNvSpPr>
+          <p:nvPr>
+            <p:ph idx="1"/>
+          </p:nvPr>
+        </p:nvSpPr>
+        <p:spPr/>
+        <p:txBody>
+          <a:bodyPr/>
+          <a:lstStyle/>
+          <a:p>
+            <a:r>
+              <a:rPr lang="en-US" dirty="0"/>
+              <a:t>Concurrent Events</a:t>
+            </a:r>
+          </a:p>
+          <a:p>
+            <a:pPr lvl="1"/>
+            <a:r>
+              <a:rPr lang="en-US" dirty="0"/>
+              <a:t>An alternative to sub states when exactly 1 event completes the sub operation.</a:t>
+            </a:r>
+          </a:p>
+          <a:p>
+            <a:pPr lvl="1"/>
+            <a:r>
+              <a:rPr lang="en-US" dirty="0"/>
+              <a:t>Goes to next state when it and all others are completed.</a:t>
+            </a:r>
+          </a:p>
+          <a:p>
+            <a:r>
+              <a:rPr lang="en-US" dirty="0"/>
+              <a:t>Global transitions</a:t>
+            </a:r>
+          </a:p>
+          <a:p>
+            <a:pPr lvl="1"/>
+            <a:r>
+              <a:rPr lang="en-US" dirty="0"/>
+              <a:t>Transitions that are automatically applied to all states</a:t>
+            </a:r>
+            <a:r>
+              <a:rPr lang="en-US" dirty="0" smtClean="0"/>
+              <a:t>.</a:t>
+            </a:r>
+          </a:p>
+          <a:p>
+            <a:pPr lvl="1"/>
+            <a:r>
+              <a:rPr lang="en-US" dirty="0" smtClean="0"/>
+              <a:t>Visibility may be controlled </a:t>
+            </a:r>
+            <a:r>
+              <a:rPr lang="en-US" smtClean="0"/>
+              <a:t>by constraints.</a:t>
+            </a:r>
+            <a:endParaRPr lang="en-US" dirty="0"/>
+          </a:p>
+          <a:p>
+            <a:pPr marL="0" indent="0">
+              <a:buNone/>
+            </a:pPr>
+            <a:endParaRPr lang="en-US" dirty="0"/>
+          </a:p>
+        </p:txBody>
+      </p:sp>
+      <p:sp>
+        <p:nvSpPr>
+          <p:cNvPr id="4" name="Slide Number Placeholder 3"/>
+          <p:cNvSpPr>
+            <a:spLocks noGrp="1"/>
+          </p:cNvSpPr>
+          <p:nvPr>
+            <p:ph type="sldNum" sz="quarter" idx="12"/>
+          </p:nvPr>
+        </p:nvSpPr>
+        <p:spPr/>
+        <p:txBody>
+          <a:bodyPr/>
+          <a:lstStyle/>
+          <a:p>
+            <a:fld id="{B6F15528-21DE-4FAA-801E-634DDDAF4B2B}" type="slidenum">
+              <a:rPr lang="en-US" smtClean="0"/>
+              <a:pPr/>
+              <a:t>28</a:t>
+            </a:fld>
+            <a:endParaRPr lang="en-US"/>
+          </a:p>
+        </p:txBody>
+      </p:sp>
+    </p:spTree>
+    <p:extLst>
+      <p:ext uri="{BB962C8B-B14F-4D97-AF65-F5344CB8AC3E}">
+        <p14:creationId xmlns:p14="http://schemas.microsoft.com/office/powerpoint/2010/main" val="2065264487"/>
+      </p:ext>
+    </p:extLst>
+  </p:cSld>
+  <p:clrMapOvr>
+    <a:masterClrMapping/>
+  </p:clrMapOvr>
+</p:sld>
+</file>
+
+<file path=ppt/slides/slide29.xml><?xml version="1.0" encoding="utf-8"?>
+<p:sld xmlns:a="http://schemas.openxmlformats.org/drawingml/2006/main" xmlns:r="http://schemas.openxmlformats.org/officeDocument/2006/relationships" xmlns:p="http://schemas.openxmlformats.org/presentationml/2006/main">
+  <p:cSld>
+    <p:spTree>
+      <p:nvGrpSpPr>
+        <p:cNvPr id="1" name=""/>
+        <p:cNvGrpSpPr/>
+        <p:nvPr/>
+      </p:nvGrpSpPr>
+      <p:grpSpPr>
+        <a:xfrm>
+          <a:off x="0" y="0"/>
+          <a:ext cx="0" cy="0"/>
+          <a:chOff x="0" y="0"/>
+          <a:chExt cx="0" cy="0"/>
+        </a:xfrm>
+      </p:grpSpPr>
+      <p:sp>
+        <p:nvSpPr>
+          <p:cNvPr id="2" name="Title 1"/>
+          <p:cNvSpPr>
+            <a:spLocks noGrp="1"/>
+          </p:cNvSpPr>
+          <p:nvPr>
+            <p:ph type="title"/>
+          </p:nvPr>
+        </p:nvSpPr>
+        <p:spPr/>
+        <p:txBody>
+          <a:bodyPr/>
+          <a:lstStyle/>
+          <a:p>
+            <a:r>
+              <a:rPr lang="en-US" dirty="0" smtClean="0"/>
               <a:t>My Contact Info</a:t>
             </a:r>
             <a:endParaRPr lang="en-US" dirty="0"/>
@@ -6349,7 +6613,7 @@
             <a:fld id="{B6F15528-21DE-4FAA-801E-634DDDAF4B2B}" type="slidenum">
               <a:rPr lang="en-US" smtClean="0"/>
               <a:pPr/>
-              <a:t>27</a:t>
+              <a:t>29</a:t>
             </a:fld>
             <a:endParaRPr lang="en-US"/>
           </a:p>

</xml_diff>

<commit_message>
Add compute workflow procedure to planned features.
Signed-off-by: RichardRoda <RichardRoda@users.noreply.github.com>
</commit_message>
<xml_diff>
--- a/Modeling Workflows with Event Driven DFA.pptx
+++ b/Modeling Workflows with Event Driven DFA.pptx
@@ -6312,6 +6312,9 @@
               <a:t>Used to capture annotations or comments.</a:t>
             </a:r>
           </a:p>
+          <a:p>
+            <a:endParaRPr lang="en-US" dirty="0" smtClean="0"/>
+          </a:p>
         </p:txBody>
       </p:sp>
       <p:sp>
@@ -6403,12 +6406,32 @@
         </p:nvSpPr>
         <p:spPr/>
         <p:txBody>
-          <a:bodyPr/>
+          <a:bodyPr>
+            <a:normAutofit fontScale="92500" lnSpcReduction="20000"/>
+          </a:bodyPr>
           <a:lstStyle/>
           <a:p>
             <a:r>
               <a:rPr lang="en-US" dirty="0"/>
-              <a:t>Concurrent Events</a:t>
+              <a:t>Compute Workflow Procedure</a:t>
+            </a:r>
+          </a:p>
+          <a:p>
+            <a:pPr lvl="1"/>
+            <a:r>
+              <a:rPr lang="en-US" dirty="0"/>
+              <a:t>Procedure to compute and return the closure of a given state as a result set. </a:t>
+            </a:r>
+            <a:endParaRPr lang="en-US" dirty="0" smtClean="0"/>
+          </a:p>
+          <a:p>
+            <a:r>
+              <a:rPr lang="en-US" dirty="0" smtClean="0"/>
+              <a:t>Concurrent </a:t>
+            </a:r>
+            <a:r>
+              <a:rPr lang="en-US" dirty="0"/>
+              <a:t>Events</a:t>
             </a:r>
           </a:p>
           <a:p>
@@ -6446,11 +6469,7 @@
             <a:pPr lvl="1"/>
             <a:r>
               <a:rPr lang="en-US" dirty="0" smtClean="0"/>
-              <a:t>Visibility may be controlled </a:t>
-            </a:r>
-            <a:r>
-              <a:rPr lang="en-US" smtClean="0"/>
-              <a:t>by constraints.</a:t>
+              <a:t>Visibility may be controlled by constraints.</a:t>
             </a:r>
             <a:endParaRPr lang="en-US" dirty="0"/>
           </a:p>

</xml_diff>